<commit_message>
Add first 2 slides (why and Challenges)
</commit_message>
<xml_diff>
--- a/Outside-In-Diamond TDD.pptx
+++ b/Outside-In-Diamond TDD.pptx
@@ -5,15 +5,17 @@
     <p:sldMasterId id="2147483648" r:id="rId1"/>
   </p:sldMasterIdLst>
   <p:notesMasterIdLst>
-    <p:notesMasterId r:id="rId8"/>
+    <p:notesMasterId r:id="rId10"/>
   </p:notesMasterIdLst>
   <p:sldIdLst>
     <p:sldId id="264" r:id="rId2"/>
     <p:sldId id="263" r:id="rId3"/>
-    <p:sldId id="257" r:id="rId4"/>
-    <p:sldId id="258" r:id="rId5"/>
-    <p:sldId id="262" r:id="rId6"/>
-    <p:sldId id="260" r:id="rId7"/>
+    <p:sldId id="265" r:id="rId4"/>
+    <p:sldId id="266" r:id="rId5"/>
+    <p:sldId id="257" r:id="rId6"/>
+    <p:sldId id="258" r:id="rId7"/>
+    <p:sldId id="262" r:id="rId8"/>
+    <p:sldId id="260" r:id="rId9"/>
   </p:sldIdLst>
   <p:sldSz cx="12192000" cy="6858000"/>
   <p:notesSz cx="6858000" cy="9144000"/>
@@ -202,7 +204,7 @@
           <a:p>
             <a:fld id="{E39AC1E9-3E82-4A62-AF19-0295C6351D44}" type="datetimeFigureOut">
               <a:rPr lang="en-GB" smtClean="0"/>
-              <a:t>05/02/2021</a:t>
+              <a:t>06/02/2021</a:t>
             </a:fld>
             <a:endParaRPr lang="en-GB"/>
           </a:p>
@@ -719,6 +721,21 @@
           <a:p>
             <a:endParaRPr lang="en-GB" dirty="0"/>
           </a:p>
+          <a:p>
+            <a:endParaRPr lang="en-GB" dirty="0"/>
+          </a:p>
+          <a:p>
+            <a:endParaRPr lang="en-GB" dirty="0"/>
+          </a:p>
+          <a:p>
+            <a:r>
+              <a:rPr lang="en-GB" dirty="0"/>
+              <a:t>Image: https://miro.medium.com/max/13440/1*o7WmwGkLVR0dVQUYqfSBeg.jpeg</a:t>
+            </a:r>
+          </a:p>
+          <a:p>
+            <a:endParaRPr lang="en-GB" dirty="0"/>
+          </a:p>
         </p:txBody>
       </p:sp>
       <p:sp>
@@ -728,7 +745,7 @@
             <a:spLocks noGrp="1"/>
           </p:cNvSpPr>
           <p:nvPr>
-            <p:ph type="sldNum" sz="quarter" idx="10"/>
+            <p:ph type="sldNum" sz="quarter" idx="5"/>
           </p:nvPr>
         </p:nvSpPr>
         <p:spPr/>
@@ -747,7 +764,7 @@
     </p:spTree>
     <p:extLst>
       <p:ext uri="{BB962C8B-B14F-4D97-AF65-F5344CB8AC3E}">
-        <p14:creationId xmlns:p14="http://schemas.microsoft.com/office/powerpoint/2010/main" val="1968859658"/>
+        <p14:creationId xmlns:p14="http://schemas.microsoft.com/office/powerpoint/2010/main" val="496188767"/>
       </p:ext>
     </p:extLst>
   </p:cSld>
@@ -801,54 +818,7 @@
           <a:bodyPr/>
           <a:lstStyle/>
           <a:p>
-            <a:r>
-              <a:rPr lang="en-GB" dirty="0"/>
-              <a:t>Blind spots of lots of test strategies is due to the fact that dev doesn’t take lot of time to code integration tests (vs. unit ones)</a:t>
-            </a:r>
-          </a:p>
-          <a:p>
-            <a:r>
-              <a:rPr lang="en-GB" dirty="0"/>
-              <a:t>We trade off former approaches (UT x IT) in </a:t>
-            </a:r>
-            <a:r>
-              <a:rPr lang="en-GB" dirty="0" err="1"/>
-              <a:t>favor</a:t>
-            </a:r>
-            <a:r>
-              <a:rPr lang="en-GB" dirty="0"/>
-              <a:t> of quietness in production whatever the dev team.</a:t>
-            </a:r>
-          </a:p>
-          <a:p>
             <a:endParaRPr lang="en-GB" dirty="0"/>
-          </a:p>
-          <a:p>
-            <a:endParaRPr lang="en-GB" dirty="0"/>
-          </a:p>
-          <a:p>
-            <a:endParaRPr lang="en-GB" dirty="0"/>
-          </a:p>
-          <a:p>
-            <a:endParaRPr lang="en-GB" dirty="0"/>
-          </a:p>
-          <a:p>
-            <a:r>
-              <a:rPr lang="en-GB" dirty="0"/>
-              <a:t>Realizing that We realized that dev took more time to unit test than to integration tests</a:t>
-            </a:r>
-          </a:p>
-          <a:p>
-            <a:endParaRPr lang="en-GB" dirty="0"/>
-          </a:p>
-          <a:p>
-            <a:endParaRPr lang="en-GB" dirty="0"/>
-          </a:p>
-          <a:p>
-            <a:r>
-              <a:rPr lang="en-GB" dirty="0"/>
-              <a:t>Dev dedicate a lot more times to unit test than integration tests</a:t>
-            </a:r>
           </a:p>
         </p:txBody>
       </p:sp>
@@ -869,7 +839,222 @@
           <a:p>
             <a:fld id="{438FB828-7FE4-42D1-BEA2-6A733FD1B12E}" type="slidenum">
               <a:rPr lang="en-GB" smtClean="0"/>
+              <a:t>4</a:t>
+            </a:fld>
+            <a:endParaRPr lang="en-GB"/>
+          </a:p>
+        </p:txBody>
+      </p:sp>
+    </p:spTree>
+    <p:extLst>
+      <p:ext uri="{BB962C8B-B14F-4D97-AF65-F5344CB8AC3E}">
+        <p14:creationId xmlns:p14="http://schemas.microsoft.com/office/powerpoint/2010/main" val="3532446573"/>
+      </p:ext>
+    </p:extLst>
+  </p:cSld>
+  <p:clrMapOvr>
+    <a:masterClrMapping/>
+  </p:clrMapOvr>
+</p:notes>
+</file>
+
+<file path=ppt/notesSlides/notesSlide5.xml><?xml version="1.0" encoding="utf-8"?>
+<p:notes xmlns:a="http://schemas.openxmlformats.org/drawingml/2006/main" xmlns:r="http://schemas.openxmlformats.org/officeDocument/2006/relationships" xmlns:p="http://schemas.openxmlformats.org/presentationml/2006/main">
+  <p:cSld>
+    <p:spTree>
+      <p:nvGrpSpPr>
+        <p:cNvPr id="1" name=""/>
+        <p:cNvGrpSpPr/>
+        <p:nvPr/>
+      </p:nvGrpSpPr>
+      <p:grpSpPr>
+        <a:xfrm>
+          <a:off x="0" y="0"/>
+          <a:ext cx="0" cy="0"/>
+          <a:chOff x="0" y="0"/>
+          <a:chExt cx="0" cy="0"/>
+        </a:xfrm>
+      </p:grpSpPr>
+      <p:sp>
+        <p:nvSpPr>
+          <p:cNvPr id="2" name="Slide Image Placeholder 1"/>
+          <p:cNvSpPr>
+            <a:spLocks noGrp="1" noRot="1" noChangeAspect="1"/>
+          </p:cNvSpPr>
+          <p:nvPr>
+            <p:ph type="sldImg"/>
+          </p:nvPr>
+        </p:nvSpPr>
+        <p:spPr/>
+      </p:sp>
+      <p:sp>
+        <p:nvSpPr>
+          <p:cNvPr id="3" name="Notes Placeholder 2"/>
+          <p:cNvSpPr>
+            <a:spLocks noGrp="1"/>
+          </p:cNvSpPr>
+          <p:nvPr>
+            <p:ph type="body" idx="1"/>
+          </p:nvPr>
+        </p:nvSpPr>
+        <p:spPr/>
+        <p:txBody>
+          <a:bodyPr/>
+          <a:lstStyle/>
+          <a:p>
+            <a:endParaRPr lang="en-GB" dirty="0"/>
+          </a:p>
+        </p:txBody>
+      </p:sp>
+      <p:sp>
+        <p:nvSpPr>
+          <p:cNvPr id="4" name="Slide Number Placeholder 3"/>
+          <p:cNvSpPr>
+            <a:spLocks noGrp="1"/>
+          </p:cNvSpPr>
+          <p:nvPr>
+            <p:ph type="sldNum" sz="quarter" idx="10"/>
+          </p:nvPr>
+        </p:nvSpPr>
+        <p:spPr/>
+        <p:txBody>
+          <a:bodyPr/>
+          <a:lstStyle/>
+          <a:p>
+            <a:fld id="{438FB828-7FE4-42D1-BEA2-6A733FD1B12E}" type="slidenum">
+              <a:rPr lang="en-GB" smtClean="0"/>
               <a:t>5</a:t>
+            </a:fld>
+            <a:endParaRPr lang="en-GB"/>
+          </a:p>
+        </p:txBody>
+      </p:sp>
+    </p:spTree>
+    <p:extLst>
+      <p:ext uri="{BB962C8B-B14F-4D97-AF65-F5344CB8AC3E}">
+        <p14:creationId xmlns:p14="http://schemas.microsoft.com/office/powerpoint/2010/main" val="1968859658"/>
+      </p:ext>
+    </p:extLst>
+  </p:cSld>
+  <p:clrMapOvr>
+    <a:masterClrMapping/>
+  </p:clrMapOvr>
+</p:notes>
+</file>
+
+<file path=ppt/notesSlides/notesSlide6.xml><?xml version="1.0" encoding="utf-8"?>
+<p:notes xmlns:a="http://schemas.openxmlformats.org/drawingml/2006/main" xmlns:r="http://schemas.openxmlformats.org/officeDocument/2006/relationships" xmlns:p="http://schemas.openxmlformats.org/presentationml/2006/main">
+  <p:cSld>
+    <p:spTree>
+      <p:nvGrpSpPr>
+        <p:cNvPr id="1" name=""/>
+        <p:cNvGrpSpPr/>
+        <p:nvPr/>
+      </p:nvGrpSpPr>
+      <p:grpSpPr>
+        <a:xfrm>
+          <a:off x="0" y="0"/>
+          <a:ext cx="0" cy="0"/>
+          <a:chOff x="0" y="0"/>
+          <a:chExt cx="0" cy="0"/>
+        </a:xfrm>
+      </p:grpSpPr>
+      <p:sp>
+        <p:nvSpPr>
+          <p:cNvPr id="2" name="Slide Image Placeholder 1"/>
+          <p:cNvSpPr>
+            <a:spLocks noGrp="1" noRot="1" noChangeAspect="1"/>
+          </p:cNvSpPr>
+          <p:nvPr>
+            <p:ph type="sldImg"/>
+          </p:nvPr>
+        </p:nvSpPr>
+        <p:spPr/>
+      </p:sp>
+      <p:sp>
+        <p:nvSpPr>
+          <p:cNvPr id="3" name="Notes Placeholder 2"/>
+          <p:cNvSpPr>
+            <a:spLocks noGrp="1"/>
+          </p:cNvSpPr>
+          <p:nvPr>
+            <p:ph type="body" idx="1"/>
+          </p:nvPr>
+        </p:nvSpPr>
+        <p:spPr/>
+        <p:txBody>
+          <a:bodyPr/>
+          <a:lstStyle/>
+          <a:p>
+            <a:r>
+              <a:rPr lang="en-GB" dirty="0"/>
+              <a:t>Blind spots of lots of test strategies is due to the fact that dev doesn’t take lot of time to code integration tests (vs. unit ones)</a:t>
+            </a:r>
+          </a:p>
+          <a:p>
+            <a:r>
+              <a:rPr lang="en-GB" dirty="0"/>
+              <a:t>We trade off former approaches (UT x IT) in </a:t>
+            </a:r>
+            <a:r>
+              <a:rPr lang="en-GB" dirty="0" err="1"/>
+              <a:t>favor</a:t>
+            </a:r>
+            <a:r>
+              <a:rPr lang="en-GB" dirty="0"/>
+              <a:t> of quietness in production whatever the dev team.</a:t>
+            </a:r>
+          </a:p>
+          <a:p>
+            <a:endParaRPr lang="en-GB" dirty="0"/>
+          </a:p>
+          <a:p>
+            <a:endParaRPr lang="en-GB" dirty="0"/>
+          </a:p>
+          <a:p>
+            <a:endParaRPr lang="en-GB" dirty="0"/>
+          </a:p>
+          <a:p>
+            <a:endParaRPr lang="en-GB" dirty="0"/>
+          </a:p>
+          <a:p>
+            <a:r>
+              <a:rPr lang="en-GB" dirty="0"/>
+              <a:t>Realizing that We realized that dev took more time to unit test than to integration tests</a:t>
+            </a:r>
+          </a:p>
+          <a:p>
+            <a:endParaRPr lang="en-GB" dirty="0"/>
+          </a:p>
+          <a:p>
+            <a:endParaRPr lang="en-GB" dirty="0"/>
+          </a:p>
+          <a:p>
+            <a:r>
+              <a:rPr lang="en-GB" dirty="0"/>
+              <a:t>Dev dedicate a lot more times to unit test than integration tests</a:t>
+            </a:r>
+          </a:p>
+        </p:txBody>
+      </p:sp>
+      <p:sp>
+        <p:nvSpPr>
+          <p:cNvPr id="4" name="Slide Number Placeholder 3"/>
+          <p:cNvSpPr>
+            <a:spLocks noGrp="1"/>
+          </p:cNvSpPr>
+          <p:nvPr>
+            <p:ph type="sldNum" sz="quarter" idx="5"/>
+          </p:nvPr>
+        </p:nvSpPr>
+        <p:spPr/>
+        <p:txBody>
+          <a:bodyPr/>
+          <a:lstStyle/>
+          <a:p>
+            <a:fld id="{438FB828-7FE4-42D1-BEA2-6A733FD1B12E}" type="slidenum">
+              <a:rPr lang="en-GB" smtClean="0"/>
+              <a:t>7</a:t>
             </a:fld>
             <a:endParaRPr lang="en-GB"/>
           </a:p>
@@ -1261,7 +1446,7 @@
           <a:p>
             <a:fld id="{C3070225-B319-4CE6-A337-0510C50468FF}" type="datetimeFigureOut">
               <a:rPr lang="en-GB" smtClean="0"/>
-              <a:t>05/02/2021</a:t>
+              <a:t>06/02/2021</a:t>
             </a:fld>
             <a:endParaRPr lang="en-GB"/>
           </a:p>
@@ -1567,7 +1752,7 @@
           <a:p>
             <a:fld id="{C3070225-B319-4CE6-A337-0510C50468FF}" type="datetimeFigureOut">
               <a:rPr lang="en-GB" smtClean="0"/>
-              <a:t>05/02/2021</a:t>
+              <a:t>06/02/2021</a:t>
             </a:fld>
             <a:endParaRPr lang="en-GB"/>
           </a:p>
@@ -1945,7 +2130,7 @@
           <a:p>
             <a:fld id="{C3070225-B319-4CE6-A337-0510C50468FF}" type="datetimeFigureOut">
               <a:rPr lang="en-GB" smtClean="0"/>
-              <a:t>05/02/2021</a:t>
+              <a:t>06/02/2021</a:t>
             </a:fld>
             <a:endParaRPr lang="en-GB"/>
           </a:p>
@@ -2438,7 +2623,7 @@
           <a:p>
             <a:fld id="{C3070225-B319-4CE6-A337-0510C50468FF}" type="datetimeFigureOut">
               <a:rPr lang="en-GB" smtClean="0"/>
-              <a:t>05/02/2021</a:t>
+              <a:t>06/02/2021</a:t>
             </a:fld>
             <a:endParaRPr lang="en-GB"/>
           </a:p>
@@ -2602,7 +2787,7 @@
           <a:p>
             <a:fld id="{C3070225-B319-4CE6-A337-0510C50468FF}" type="datetimeFigureOut">
               <a:rPr lang="en-GB" smtClean="0"/>
-              <a:t>05/02/2021</a:t>
+              <a:t>06/02/2021</a:t>
             </a:fld>
             <a:endParaRPr lang="en-GB"/>
           </a:p>
@@ -4613,7 +4798,7 @@
           </a:xfrm>
         </p:spPr>
         <p:txBody>
-          <a:bodyPr/>
+          <a:bodyPr anchor="t"/>
           <a:lstStyle/>
           <a:p>
             <a:r>
@@ -4641,8 +4826,8 @@
         </p:nvSpPr>
         <p:spPr>
           <a:xfrm>
-            <a:off x="838200" y="3991462"/>
-            <a:ext cx="10515600" cy="2015044"/>
+            <a:off x="838200" y="3479006"/>
+            <a:ext cx="10515600" cy="2527500"/>
           </a:xfrm>
         </p:spPr>
         <p:txBody>
@@ -4660,7 +4845,7 @@
               </a:spcBef>
             </a:pPr>
             <a:r>
-              <a:rPr lang="en-GB" sz="1600" dirty="0">
+              <a:rPr lang="en-GB" sz="3600" dirty="0">
                 <a:solidFill>
                   <a:schemeClr val="bg1"/>
                 </a:solidFill>
@@ -4669,7 +4854,7 @@
             </a:r>
             <a:r>
               <a:rPr lang="en-GB" sz="1600" b="0" dirty="0"/>
-              <a:t>. Your testing strategy &amp; techniques must always be chosen accordingly to your context (both human &amp; technical)</a:t>
+              <a:t> Your testing strategy &amp; techniques must always be chosen accordingly to your context (both human &amp; technical)</a:t>
             </a:r>
           </a:p>
           <a:p>
@@ -4692,6 +4877,17 @@
                 <a:spcPts val="0"/>
               </a:spcBef>
             </a:pPr>
+            <a:endParaRPr lang="en-GB" sz="1600" b="0" dirty="0"/>
+          </a:p>
+          <a:p>
+            <a:pPr algn="just">
+              <a:lnSpc>
+                <a:spcPct val="120000"/>
+              </a:lnSpc>
+              <a:spcBef>
+                <a:spcPts val="0"/>
+              </a:spcBef>
+            </a:pPr>
             <a:r>
               <a:rPr lang="en-GB" sz="1600" b="0" dirty="0"/>
               <a:t>Thanks to </a:t>
@@ -4737,7 +4933,7 @@
               <a:t> for their great source of inspiration over the years  </a:t>
             </a:r>
             <a:r>
-              <a:rPr lang="en-GB" sz="1600" dirty="0">
+              <a:rPr lang="en-GB" sz="3600" dirty="0">
                 <a:solidFill>
                   <a:schemeClr val="bg1"/>
                 </a:solidFill>
@@ -4761,6 +4957,683 @@
 </file>
 
 <file path=ppt/slides/slide3.xml><?xml version="1.0" encoding="utf-8"?>
+<p:sld xmlns:a="http://schemas.openxmlformats.org/drawingml/2006/main" xmlns:r="http://schemas.openxmlformats.org/officeDocument/2006/relationships" xmlns:p="http://schemas.openxmlformats.org/presentationml/2006/main">
+  <p:cSld>
+    <p:spTree>
+      <p:nvGrpSpPr>
+        <p:cNvPr id="1" name=""/>
+        <p:cNvGrpSpPr/>
+        <p:nvPr/>
+      </p:nvGrpSpPr>
+      <p:grpSpPr>
+        <a:xfrm>
+          <a:off x="0" y="0"/>
+          <a:ext cx="0" cy="0"/>
+          <a:chOff x="0" y="0"/>
+          <a:chExt cx="0" cy="0"/>
+        </a:xfrm>
+      </p:grpSpPr>
+      <p:pic>
+        <p:nvPicPr>
+          <p:cNvPr id="6" name="Picture 5">
+            <a:extLst>
+              <a:ext uri="{FF2B5EF4-FFF2-40B4-BE49-F238E27FC236}">
+                <a16:creationId xmlns:a16="http://schemas.microsoft.com/office/drawing/2014/main" id="{A1A8DB38-3DF5-4F40-987D-1ACEDE55C7A8}"/>
+              </a:ext>
+            </a:extLst>
+          </p:cNvPr>
+          <p:cNvPicPr>
+            <a:picLocks noChangeAspect="1"/>
+          </p:cNvPicPr>
+          <p:nvPr/>
+        </p:nvPicPr>
+        <p:blipFill>
+          <a:blip r:embed="rId3">
+            <a:extLst>
+              <a:ext uri="{28A0092B-C50C-407E-A947-70E740481C1C}">
+                <a14:useLocalDpi xmlns:a14="http://schemas.microsoft.com/office/drawing/2010/main" val="0"/>
+              </a:ext>
+            </a:extLst>
+          </a:blip>
+          <a:stretch>
+            <a:fillRect/>
+          </a:stretch>
+        </p:blipFill>
+        <p:spPr>
+          <a:xfrm>
+            <a:off x="1485900" y="-123000"/>
+            <a:ext cx="11304056" cy="7534154"/>
+          </a:xfrm>
+          <a:prstGeom prst="rect">
+            <a:avLst/>
+          </a:prstGeom>
+        </p:spPr>
+      </p:pic>
+      <p:sp>
+        <p:nvSpPr>
+          <p:cNvPr id="22" name="Rectangle 21">
+            <a:extLst>
+              <a:ext uri="{FF2B5EF4-FFF2-40B4-BE49-F238E27FC236}">
+                <a16:creationId xmlns:a16="http://schemas.microsoft.com/office/drawing/2014/main" id="{9B8FE816-88E5-475F-88A8-9C86ABEB3A60}"/>
+              </a:ext>
+            </a:extLst>
+          </p:cNvPr>
+          <p:cNvSpPr/>
+          <p:nvPr/>
+        </p:nvSpPr>
+        <p:spPr>
+          <a:xfrm>
+            <a:off x="1154244" y="-553154"/>
+            <a:ext cx="11782268" cy="7411154"/>
+          </a:xfrm>
+          <a:prstGeom prst="rect">
+            <a:avLst/>
+          </a:prstGeom>
+          <a:solidFill>
+            <a:schemeClr val="accent1">
+              <a:alpha val="70000"/>
+            </a:schemeClr>
+          </a:solidFill>
+        </p:spPr>
+        <p:style>
+          <a:lnRef idx="2">
+            <a:schemeClr val="accent1">
+              <a:shade val="50000"/>
+            </a:schemeClr>
+          </a:lnRef>
+          <a:fillRef idx="1">
+            <a:schemeClr val="accent1"/>
+          </a:fillRef>
+          <a:effectRef idx="0">
+            <a:schemeClr val="accent1"/>
+          </a:effectRef>
+          <a:fontRef idx="minor">
+            <a:schemeClr val="lt1"/>
+          </a:fontRef>
+        </p:style>
+        <p:txBody>
+          <a:bodyPr rtlCol="0" anchor="ctr"/>
+          <a:lstStyle/>
+          <a:p>
+            <a:pPr algn="ctr"/>
+            <a:endParaRPr lang="en-GB"/>
+          </a:p>
+        </p:txBody>
+      </p:sp>
+      <p:sp>
+        <p:nvSpPr>
+          <p:cNvPr id="26" name="Right Triangle 25">
+            <a:extLst>
+              <a:ext uri="{FF2B5EF4-FFF2-40B4-BE49-F238E27FC236}">
+                <a16:creationId xmlns:a16="http://schemas.microsoft.com/office/drawing/2014/main" id="{2E000F22-633A-4FCB-BE40-19CE29ACB096}"/>
+              </a:ext>
+            </a:extLst>
+          </p:cNvPr>
+          <p:cNvSpPr/>
+          <p:nvPr/>
+        </p:nvSpPr>
+        <p:spPr>
+          <a:xfrm flipV="1">
+            <a:off x="-1004970" y="-2187981"/>
+            <a:ext cx="11455541" cy="11802707"/>
+          </a:xfrm>
+          <a:prstGeom prst="rtTriangle">
+            <a:avLst/>
+          </a:prstGeom>
+          <a:solidFill>
+            <a:schemeClr val="tx1"/>
+          </a:solidFill>
+          <a:ln>
+            <a:noFill/>
+          </a:ln>
+        </p:spPr>
+        <p:style>
+          <a:lnRef idx="2">
+            <a:schemeClr val="accent1">
+              <a:shade val="50000"/>
+            </a:schemeClr>
+          </a:lnRef>
+          <a:fillRef idx="1">
+            <a:schemeClr val="accent1"/>
+          </a:fillRef>
+          <a:effectRef idx="0">
+            <a:schemeClr val="accent1"/>
+          </a:effectRef>
+          <a:fontRef idx="minor">
+            <a:schemeClr val="lt1"/>
+          </a:fontRef>
+        </p:style>
+        <p:txBody>
+          <a:bodyPr rtlCol="0" anchor="ctr"/>
+          <a:lstStyle/>
+          <a:p>
+            <a:pPr algn="ctr"/>
+            <a:endParaRPr lang="en-GB"/>
+          </a:p>
+        </p:txBody>
+      </p:sp>
+      <p:sp>
+        <p:nvSpPr>
+          <p:cNvPr id="4" name="Title 3">
+            <a:extLst>
+              <a:ext uri="{FF2B5EF4-FFF2-40B4-BE49-F238E27FC236}">
+                <a16:creationId xmlns:a16="http://schemas.microsoft.com/office/drawing/2014/main" id="{A53721E9-2B05-4512-A2FF-8CC1EF9E817F}"/>
+              </a:ext>
+            </a:extLst>
+          </p:cNvPr>
+          <p:cNvSpPr>
+            <a:spLocks noGrp="1"/>
+          </p:cNvSpPr>
+          <p:nvPr>
+            <p:ph type="ctrTitle" idx="4294967295"/>
+          </p:nvPr>
+        </p:nvSpPr>
+        <p:spPr>
+          <a:xfrm>
+            <a:off x="781318" y="4689447"/>
+            <a:ext cx="6045004" cy="1196804"/>
+          </a:xfrm>
+        </p:spPr>
+        <p:txBody>
+          <a:bodyPr anchor="t">
+            <a:normAutofit/>
+          </a:bodyPr>
+          <a:lstStyle/>
+          <a:p>
+            <a:r>
+              <a:rPr lang="en-US" sz="2800" dirty="0">
+                <a:solidFill>
+                  <a:schemeClr val="bg1"/>
+                </a:solidFill>
+              </a:rPr>
+              <a:t>Why</a:t>
+            </a:r>
+            <a:endParaRPr lang="en-GB" sz="1800" dirty="0">
+              <a:solidFill>
+                <a:schemeClr val="bg1"/>
+              </a:solidFill>
+            </a:endParaRPr>
+          </a:p>
+        </p:txBody>
+      </p:sp>
+      <p:sp>
+        <p:nvSpPr>
+          <p:cNvPr id="5" name="Subtitle 4">
+            <a:extLst>
+              <a:ext uri="{FF2B5EF4-FFF2-40B4-BE49-F238E27FC236}">
+                <a16:creationId xmlns:a16="http://schemas.microsoft.com/office/drawing/2014/main" id="{656E8172-EA62-43D4-BC99-784C1B085A76}"/>
+              </a:ext>
+            </a:extLst>
+          </p:cNvPr>
+          <p:cNvSpPr>
+            <a:spLocks noGrp="1"/>
+          </p:cNvSpPr>
+          <p:nvPr>
+            <p:ph type="subTitle" idx="4294967295"/>
+          </p:nvPr>
+        </p:nvSpPr>
+        <p:spPr>
+          <a:xfrm>
+            <a:off x="360238" y="5720588"/>
+            <a:ext cx="2521507" cy="831850"/>
+          </a:xfrm>
+        </p:spPr>
+        <p:txBody>
+          <a:bodyPr>
+            <a:normAutofit/>
+          </a:bodyPr>
+          <a:lstStyle/>
+          <a:p>
+            <a:r>
+              <a:rPr lang="en-GB" sz="1100" dirty="0"/>
+              <a:t>THOMAS PIERRAIN (</a:t>
+            </a:r>
+            <a:r>
+              <a:rPr lang="cs-CZ" sz="1100" dirty="0"/>
+              <a:t>@</a:t>
+            </a:r>
+            <a:r>
+              <a:rPr lang="en-GB" sz="1100" dirty="0"/>
+              <a:t>TPIERRAIN)</a:t>
+            </a:r>
+          </a:p>
+        </p:txBody>
+      </p:sp>
+      <p:sp>
+        <p:nvSpPr>
+          <p:cNvPr id="27" name="Title 3">
+            <a:extLst>
+              <a:ext uri="{FF2B5EF4-FFF2-40B4-BE49-F238E27FC236}">
+                <a16:creationId xmlns:a16="http://schemas.microsoft.com/office/drawing/2014/main" id="{BA403CED-F306-413C-9C9E-D5033F60163F}"/>
+              </a:ext>
+            </a:extLst>
+          </p:cNvPr>
+          <p:cNvSpPr txBox="1">
+            <a:spLocks/>
+          </p:cNvSpPr>
+          <p:nvPr/>
+        </p:nvSpPr>
+        <p:spPr>
+          <a:xfrm>
+            <a:off x="727023" y="124769"/>
+            <a:ext cx="4773892" cy="3304231"/>
+          </a:xfrm>
+          <a:prstGeom prst="rect">
+            <a:avLst/>
+          </a:prstGeom>
+        </p:spPr>
+        <p:txBody>
+          <a:bodyPr vert="horz" lIns="91440" tIns="45720" rIns="91440" bIns="45720" rtlCol="0" anchor="t">
+            <a:noAutofit/>
+          </a:bodyPr>
+          <a:lstStyle>
+            <a:lvl1pPr algn="l" defTabSz="914400" rtl="0" eaLnBrk="1" latinLnBrk="0" hangingPunct="1">
+              <a:lnSpc>
+                <a:spcPct val="90000"/>
+              </a:lnSpc>
+              <a:spcBef>
+                <a:spcPct val="0"/>
+              </a:spcBef>
+              <a:buNone/>
+              <a:defRPr sz="4400" b="1" kern="1200">
+                <a:solidFill>
+                  <a:schemeClr val="tx1"/>
+                </a:solidFill>
+                <a:latin typeface="Alte Haas Grotesk" panose="02000503000000020004" pitchFamily="2" charset="0"/>
+                <a:ea typeface="+mj-ea"/>
+                <a:cs typeface="+mj-cs"/>
+              </a:defRPr>
+            </a:lvl1pPr>
+          </a:lstStyle>
+          <a:p>
+            <a:r>
+              <a:rPr lang="en-US" sz="7200" cap="all" dirty="0">
+                <a:solidFill>
+                  <a:srgbClr val="2E8EE4"/>
+                </a:solidFill>
+              </a:rPr>
+              <a:t>Test Driven</a:t>
+            </a:r>
+          </a:p>
+          <a:p>
+            <a:r>
+              <a:rPr lang="en-US" sz="7200" cap="all" dirty="0">
+                <a:solidFill>
+                  <a:srgbClr val="2E8EE4"/>
+                </a:solidFill>
+              </a:rPr>
+              <a:t>development</a:t>
+            </a:r>
+            <a:endParaRPr lang="en-GB" sz="7200" dirty="0">
+              <a:solidFill>
+                <a:schemeClr val="bg1"/>
+              </a:solidFill>
+            </a:endParaRPr>
+          </a:p>
+        </p:txBody>
+      </p:sp>
+    </p:spTree>
+    <p:extLst>
+      <p:ext uri="{BB962C8B-B14F-4D97-AF65-F5344CB8AC3E}">
+        <p14:creationId xmlns:p14="http://schemas.microsoft.com/office/powerpoint/2010/main" val="3999718904"/>
+      </p:ext>
+    </p:extLst>
+  </p:cSld>
+  <p:clrMapOvr>
+    <a:masterClrMapping/>
+  </p:clrMapOvr>
+</p:sld>
+</file>
+
+<file path=ppt/slides/slide4.xml><?xml version="1.0" encoding="utf-8"?>
+<p:sld xmlns:a="http://schemas.openxmlformats.org/drawingml/2006/main" xmlns:r="http://schemas.openxmlformats.org/officeDocument/2006/relationships" xmlns:p="http://schemas.openxmlformats.org/presentationml/2006/main">
+  <p:cSld>
+    <p:spTree>
+      <p:nvGrpSpPr>
+        <p:cNvPr id="1" name=""/>
+        <p:cNvGrpSpPr/>
+        <p:nvPr/>
+      </p:nvGrpSpPr>
+      <p:grpSpPr>
+        <a:xfrm>
+          <a:off x="0" y="0"/>
+          <a:ext cx="0" cy="0"/>
+          <a:chOff x="0" y="0"/>
+          <a:chExt cx="0" cy="0"/>
+        </a:xfrm>
+      </p:grpSpPr>
+      <p:pic>
+        <p:nvPicPr>
+          <p:cNvPr id="3" name="Picture 2">
+            <a:extLst>
+              <a:ext uri="{FF2B5EF4-FFF2-40B4-BE49-F238E27FC236}">
+                <a16:creationId xmlns:a16="http://schemas.microsoft.com/office/drawing/2014/main" id="{976C9F55-AED3-4FA5-BD8A-7E468AD374AD}"/>
+              </a:ext>
+            </a:extLst>
+          </p:cNvPr>
+          <p:cNvPicPr>
+            <a:picLocks noChangeAspect="1"/>
+          </p:cNvPicPr>
+          <p:nvPr/>
+        </p:nvPicPr>
+        <p:blipFill>
+          <a:blip r:embed="rId3">
+            <a:extLst>
+              <a:ext uri="{28A0092B-C50C-407E-A947-70E740481C1C}">
+                <a14:useLocalDpi xmlns:a14="http://schemas.microsoft.com/office/drawing/2010/main" val="0"/>
+              </a:ext>
+            </a:extLst>
+          </a:blip>
+          <a:stretch>
+            <a:fillRect/>
+          </a:stretch>
+        </p:blipFill>
+        <p:spPr>
+          <a:xfrm>
+            <a:off x="1566300" y="-1308278"/>
+            <a:ext cx="12183188" cy="8208423"/>
+          </a:xfrm>
+          <a:prstGeom prst="rect">
+            <a:avLst/>
+          </a:prstGeom>
+        </p:spPr>
+      </p:pic>
+      <p:sp>
+        <p:nvSpPr>
+          <p:cNvPr id="22" name="Rectangle 21">
+            <a:extLst>
+              <a:ext uri="{FF2B5EF4-FFF2-40B4-BE49-F238E27FC236}">
+                <a16:creationId xmlns:a16="http://schemas.microsoft.com/office/drawing/2014/main" id="{9B8FE816-88E5-475F-88A8-9C86ABEB3A60}"/>
+              </a:ext>
+            </a:extLst>
+          </p:cNvPr>
+          <p:cNvSpPr/>
+          <p:nvPr/>
+        </p:nvSpPr>
+        <p:spPr>
+          <a:xfrm>
+            <a:off x="1509904" y="-511009"/>
+            <a:ext cx="11782268" cy="7411154"/>
+          </a:xfrm>
+          <a:prstGeom prst="rect">
+            <a:avLst/>
+          </a:prstGeom>
+          <a:solidFill>
+            <a:schemeClr val="accent1">
+              <a:alpha val="70000"/>
+            </a:schemeClr>
+          </a:solidFill>
+        </p:spPr>
+        <p:style>
+          <a:lnRef idx="2">
+            <a:schemeClr val="accent1">
+              <a:shade val="50000"/>
+            </a:schemeClr>
+          </a:lnRef>
+          <a:fillRef idx="1">
+            <a:schemeClr val="accent1"/>
+          </a:fillRef>
+          <a:effectRef idx="0">
+            <a:schemeClr val="accent1"/>
+          </a:effectRef>
+          <a:fontRef idx="minor">
+            <a:schemeClr val="lt1"/>
+          </a:fontRef>
+        </p:style>
+        <p:txBody>
+          <a:bodyPr rtlCol="0" anchor="ctr"/>
+          <a:lstStyle/>
+          <a:p>
+            <a:pPr algn="ctr"/>
+            <a:endParaRPr lang="en-GB"/>
+          </a:p>
+        </p:txBody>
+      </p:sp>
+      <p:sp>
+        <p:nvSpPr>
+          <p:cNvPr id="26" name="Right Triangle 25">
+            <a:extLst>
+              <a:ext uri="{FF2B5EF4-FFF2-40B4-BE49-F238E27FC236}">
+                <a16:creationId xmlns:a16="http://schemas.microsoft.com/office/drawing/2014/main" id="{2E000F22-633A-4FCB-BE40-19CE29ACB096}"/>
+              </a:ext>
+            </a:extLst>
+          </p:cNvPr>
+          <p:cNvSpPr/>
+          <p:nvPr/>
+        </p:nvSpPr>
+        <p:spPr>
+          <a:xfrm flipV="1">
+            <a:off x="-1004970" y="-2187981"/>
+            <a:ext cx="11455541" cy="11802707"/>
+          </a:xfrm>
+          <a:prstGeom prst="rtTriangle">
+            <a:avLst/>
+          </a:prstGeom>
+          <a:solidFill>
+            <a:schemeClr val="tx1"/>
+          </a:solidFill>
+          <a:ln>
+            <a:noFill/>
+          </a:ln>
+        </p:spPr>
+        <p:style>
+          <a:lnRef idx="2">
+            <a:schemeClr val="accent1">
+              <a:shade val="50000"/>
+            </a:schemeClr>
+          </a:lnRef>
+          <a:fillRef idx="1">
+            <a:schemeClr val="accent1"/>
+          </a:fillRef>
+          <a:effectRef idx="0">
+            <a:schemeClr val="accent1"/>
+          </a:effectRef>
+          <a:fontRef idx="minor">
+            <a:schemeClr val="lt1"/>
+          </a:fontRef>
+        </p:style>
+        <p:txBody>
+          <a:bodyPr rtlCol="0" anchor="ctr"/>
+          <a:lstStyle/>
+          <a:p>
+            <a:pPr algn="ctr"/>
+            <a:endParaRPr lang="en-GB"/>
+          </a:p>
+        </p:txBody>
+      </p:sp>
+      <p:sp>
+        <p:nvSpPr>
+          <p:cNvPr id="5" name="Subtitle 4">
+            <a:extLst>
+              <a:ext uri="{FF2B5EF4-FFF2-40B4-BE49-F238E27FC236}">
+                <a16:creationId xmlns:a16="http://schemas.microsoft.com/office/drawing/2014/main" id="{656E8172-EA62-43D4-BC99-784C1B085A76}"/>
+              </a:ext>
+            </a:extLst>
+          </p:cNvPr>
+          <p:cNvSpPr>
+            <a:spLocks noGrp="1"/>
+          </p:cNvSpPr>
+          <p:nvPr>
+            <p:ph type="subTitle" idx="4294967295"/>
+          </p:nvPr>
+        </p:nvSpPr>
+        <p:spPr>
+          <a:xfrm>
+            <a:off x="360238" y="5720588"/>
+            <a:ext cx="2521507" cy="831850"/>
+          </a:xfrm>
+        </p:spPr>
+        <p:txBody>
+          <a:bodyPr>
+            <a:normAutofit/>
+          </a:bodyPr>
+          <a:lstStyle/>
+          <a:p>
+            <a:r>
+              <a:rPr lang="en-GB" sz="1100" dirty="0"/>
+              <a:t>THOMAS PIERRAIN (</a:t>
+            </a:r>
+            <a:r>
+              <a:rPr lang="cs-CZ" sz="1100" dirty="0"/>
+              <a:t>@</a:t>
+            </a:r>
+            <a:r>
+              <a:rPr lang="en-GB" sz="1100" dirty="0"/>
+              <a:t>TPIERRAIN)</a:t>
+            </a:r>
+          </a:p>
+        </p:txBody>
+      </p:sp>
+      <p:sp>
+        <p:nvSpPr>
+          <p:cNvPr id="10" name="Title 3">
+            <a:extLst>
+              <a:ext uri="{FF2B5EF4-FFF2-40B4-BE49-F238E27FC236}">
+                <a16:creationId xmlns:a16="http://schemas.microsoft.com/office/drawing/2014/main" id="{9E9BE21C-871E-4AE9-B4A6-EC12A9176179}"/>
+              </a:ext>
+            </a:extLst>
+          </p:cNvPr>
+          <p:cNvSpPr txBox="1">
+            <a:spLocks/>
+          </p:cNvSpPr>
+          <p:nvPr/>
+        </p:nvSpPr>
+        <p:spPr>
+          <a:xfrm>
+            <a:off x="781318" y="4689447"/>
+            <a:ext cx="6045004" cy="1196804"/>
+          </a:xfrm>
+          <a:prstGeom prst="rect">
+            <a:avLst/>
+          </a:prstGeom>
+        </p:spPr>
+        <p:txBody>
+          <a:bodyPr vert="horz" lIns="91440" tIns="45720" rIns="91440" bIns="45720" rtlCol="0" anchor="t">
+            <a:normAutofit/>
+          </a:bodyPr>
+          <a:lstStyle>
+            <a:lvl1pPr algn="l" defTabSz="914400" rtl="0" eaLnBrk="1" latinLnBrk="0" hangingPunct="1">
+              <a:lnSpc>
+                <a:spcPct val="90000"/>
+              </a:lnSpc>
+              <a:spcBef>
+                <a:spcPct val="0"/>
+              </a:spcBef>
+              <a:buNone/>
+              <a:defRPr sz="4400" b="1" kern="1200">
+                <a:solidFill>
+                  <a:schemeClr val="tx1"/>
+                </a:solidFill>
+                <a:latin typeface="Alte Haas Grotesk" panose="02000503000000020004" pitchFamily="2" charset="0"/>
+                <a:ea typeface="+mj-ea"/>
+                <a:cs typeface="+mj-cs"/>
+              </a:defRPr>
+            </a:lvl1pPr>
+          </a:lstStyle>
+          <a:p>
+            <a:r>
+              <a:rPr lang="en-US" sz="2800" dirty="0">
+                <a:solidFill>
+                  <a:schemeClr val="bg1"/>
+                </a:solidFill>
+              </a:rPr>
+              <a:t>Challenges</a:t>
+            </a:r>
+            <a:endParaRPr lang="en-GB" sz="1800" dirty="0">
+              <a:solidFill>
+                <a:schemeClr val="bg1"/>
+              </a:solidFill>
+            </a:endParaRPr>
+          </a:p>
+        </p:txBody>
+      </p:sp>
+      <p:sp>
+        <p:nvSpPr>
+          <p:cNvPr id="11" name="Title 3">
+            <a:extLst>
+              <a:ext uri="{FF2B5EF4-FFF2-40B4-BE49-F238E27FC236}">
+                <a16:creationId xmlns:a16="http://schemas.microsoft.com/office/drawing/2014/main" id="{602ACB4C-FD32-44AA-8680-CD5BCE6DA11E}"/>
+              </a:ext>
+            </a:extLst>
+          </p:cNvPr>
+          <p:cNvSpPr txBox="1">
+            <a:spLocks/>
+          </p:cNvSpPr>
+          <p:nvPr/>
+        </p:nvSpPr>
+        <p:spPr>
+          <a:xfrm>
+            <a:off x="727023" y="124769"/>
+            <a:ext cx="4773892" cy="3304231"/>
+          </a:xfrm>
+          <a:prstGeom prst="rect">
+            <a:avLst/>
+          </a:prstGeom>
+        </p:spPr>
+        <p:txBody>
+          <a:bodyPr vert="horz" lIns="91440" tIns="45720" rIns="91440" bIns="45720" rtlCol="0" anchor="t">
+            <a:noAutofit/>
+          </a:bodyPr>
+          <a:lstStyle>
+            <a:lvl1pPr algn="l" defTabSz="914400" rtl="0" eaLnBrk="1" latinLnBrk="0" hangingPunct="1">
+              <a:lnSpc>
+                <a:spcPct val="90000"/>
+              </a:lnSpc>
+              <a:spcBef>
+                <a:spcPct val="0"/>
+              </a:spcBef>
+              <a:buNone/>
+              <a:defRPr sz="4400" b="1" kern="1200">
+                <a:solidFill>
+                  <a:schemeClr val="tx1"/>
+                </a:solidFill>
+                <a:latin typeface="Alte Haas Grotesk" panose="02000503000000020004" pitchFamily="2" charset="0"/>
+                <a:ea typeface="+mj-ea"/>
+                <a:cs typeface="+mj-cs"/>
+              </a:defRPr>
+            </a:lvl1pPr>
+          </a:lstStyle>
+          <a:p>
+            <a:r>
+              <a:rPr lang="en-US" sz="7200" cap="all" dirty="0">
+                <a:solidFill>
+                  <a:srgbClr val="2E8EE4"/>
+                </a:solidFill>
+              </a:rPr>
+              <a:t>Test Driven</a:t>
+            </a:r>
+          </a:p>
+          <a:p>
+            <a:r>
+              <a:rPr lang="en-US" sz="7200" cap="all" dirty="0">
+                <a:solidFill>
+                  <a:srgbClr val="2E8EE4"/>
+                </a:solidFill>
+              </a:rPr>
+              <a:t>development</a:t>
+            </a:r>
+            <a:endParaRPr lang="en-GB" sz="7200" dirty="0">
+              <a:solidFill>
+                <a:schemeClr val="bg1"/>
+              </a:solidFill>
+            </a:endParaRPr>
+          </a:p>
+        </p:txBody>
+      </p:sp>
+    </p:spTree>
+    <p:extLst>
+      <p:ext uri="{BB962C8B-B14F-4D97-AF65-F5344CB8AC3E}">
+        <p14:creationId xmlns:p14="http://schemas.microsoft.com/office/powerpoint/2010/main" val="969841885"/>
+      </p:ext>
+    </p:extLst>
+  </p:cSld>
+  <p:clrMapOvr>
+    <a:masterClrMapping/>
+  </p:clrMapOvr>
+</p:sld>
+</file>
+
+<file path=ppt/slides/slide5.xml><?xml version="1.0" encoding="utf-8"?>
 <p:sld xmlns:a="http://schemas.openxmlformats.org/drawingml/2006/main" xmlns:r="http://schemas.openxmlformats.org/officeDocument/2006/relationships" xmlns:p="http://schemas.openxmlformats.org/presentationml/2006/main">
   <p:cSld>
     <p:spTree>
@@ -6934,7 +7807,7 @@
 </p:sld>
 </file>
 
-<file path=ppt/slides/slide4.xml><?xml version="1.0" encoding="utf-8"?>
+<file path=ppt/slides/slide6.xml><?xml version="1.0" encoding="utf-8"?>
 <p:sld xmlns:a="http://schemas.openxmlformats.org/drawingml/2006/main" xmlns:r="http://schemas.openxmlformats.org/officeDocument/2006/relationships" xmlns:p="http://schemas.openxmlformats.org/presentationml/2006/main">
   <p:cSld>
     <p:spTree>
@@ -7503,7 +8376,7 @@
 </p:sld>
 </file>
 
-<file path=ppt/slides/slide5.xml><?xml version="1.0" encoding="utf-8"?>
+<file path=ppt/slides/slide7.xml><?xml version="1.0" encoding="utf-8"?>
 <p:sld xmlns:a="http://schemas.openxmlformats.org/drawingml/2006/main" xmlns:r="http://schemas.openxmlformats.org/officeDocument/2006/relationships" xmlns:p="http://schemas.openxmlformats.org/presentationml/2006/main">
   <p:cSld>
     <p:spTree>
@@ -9114,7 +9987,7 @@
 </p:sld>
 </file>
 
-<file path=ppt/slides/slide6.xml><?xml version="1.0" encoding="utf-8"?>
+<file path=ppt/slides/slide8.xml><?xml version="1.0" encoding="utf-8"?>
 <p:sld xmlns:a="http://schemas.openxmlformats.org/drawingml/2006/main" xmlns:r="http://schemas.openxmlformats.org/officeDocument/2006/relationships" xmlns:p="http://schemas.openxmlformats.org/presentationml/2006/main">
   <p:cSld>
     <p:spTree>

</xml_diff>

<commit_message>
Improve the existing slides
</commit_message>
<xml_diff>
--- a/Outside-In-Diamond TDD.pptx
+++ b/Outside-In-Diamond TDD.pptx
@@ -5645,7 +5645,7 @@
           </a:prstGeom>
           <a:solidFill>
             <a:schemeClr val="tx1">
-              <a:alpha val="70000"/>
+              <a:alpha val="57000"/>
             </a:schemeClr>
           </a:solidFill>
           <a:ln>
@@ -7772,6 +7772,41 @@
           </a:p>
         </p:txBody>
       </p:sp>
+      <p:sp>
+        <p:nvSpPr>
+          <p:cNvPr id="48" name="TextBox 47">
+            <a:extLst>
+              <a:ext uri="{FF2B5EF4-FFF2-40B4-BE49-F238E27FC236}">
+                <a16:creationId xmlns:a16="http://schemas.microsoft.com/office/drawing/2014/main" id="{8FD61833-A074-43E2-90FF-E2767A48C70F}"/>
+              </a:ext>
+            </a:extLst>
+          </p:cNvPr>
+          <p:cNvSpPr txBox="1"/>
+          <p:nvPr/>
+        </p:nvSpPr>
+        <p:spPr>
+          <a:xfrm>
+            <a:off x="7402664" y="3403160"/>
+            <a:ext cx="659456" cy="369332"/>
+          </a:xfrm>
+          <a:prstGeom prst="rect">
+            <a:avLst/>
+          </a:prstGeom>
+          <a:noFill/>
+        </p:spPr>
+        <p:txBody>
+          <a:bodyPr wrap="square" rtlCol="0">
+            <a:spAutoFit/>
+          </a:bodyPr>
+          <a:lstStyle/>
+          <a:p>
+            <a:r>
+              <a:rPr lang="en-GB" dirty="0"/>
+              <a:t>uses</a:t>
+            </a:r>
+          </a:p>
+        </p:txBody>
+      </p:sp>
     </p:spTree>
     <p:extLst>
       <p:ext uri="{BB962C8B-B14F-4D97-AF65-F5344CB8AC3E}">
@@ -7860,7 +7895,7 @@
           </a:prstGeom>
           <a:solidFill>
             <a:schemeClr val="tx1">
-              <a:alpha val="70000"/>
+              <a:alpha val="57000"/>
             </a:schemeClr>
           </a:solidFill>
           <a:ln>
@@ -9995,6 +10030,41 @@
               <a:t>😕</a:t>
             </a:r>
             <a:endParaRPr lang="en-GB" sz="4800" dirty="0"/>
+          </a:p>
+        </p:txBody>
+      </p:sp>
+      <p:sp>
+        <p:nvSpPr>
+          <p:cNvPr id="48" name="TextBox 47">
+            <a:extLst>
+              <a:ext uri="{FF2B5EF4-FFF2-40B4-BE49-F238E27FC236}">
+                <a16:creationId xmlns:a16="http://schemas.microsoft.com/office/drawing/2014/main" id="{20FF1799-F83F-449B-9834-D04EDE1A7697}"/>
+              </a:ext>
+            </a:extLst>
+          </p:cNvPr>
+          <p:cNvSpPr txBox="1"/>
+          <p:nvPr/>
+        </p:nvSpPr>
+        <p:spPr>
+          <a:xfrm>
+            <a:off x="7402664" y="3403160"/>
+            <a:ext cx="659456" cy="369332"/>
+          </a:xfrm>
+          <a:prstGeom prst="rect">
+            <a:avLst/>
+          </a:prstGeom>
+          <a:noFill/>
+        </p:spPr>
+        <p:txBody>
+          <a:bodyPr wrap="square" rtlCol="0">
+            <a:spAutoFit/>
+          </a:bodyPr>
+          <a:lstStyle/>
+          <a:p>
+            <a:r>
+              <a:rPr lang="en-GB" dirty="0"/>
+              <a:t>uses</a:t>
+            </a:r>
           </a:p>
         </p:txBody>
       </p:sp>
@@ -16150,7 +16220,7 @@
           </a:prstGeom>
           <a:solidFill>
             <a:schemeClr val="tx1">
-              <a:alpha val="70000"/>
+              <a:alpha val="57000"/>
             </a:schemeClr>
           </a:solidFill>
           <a:ln>
@@ -16513,132 +16583,425 @@
                   <a:schemeClr val="bg1"/>
                 </a:solidFill>
               </a:rPr>
-              <a:t>Boredom</a:t>
+              <a:t>Non deterministic </a:t>
             </a:r>
           </a:p>
         </p:txBody>
       </p:sp>
-      <p:cxnSp>
-        <p:nvCxnSpPr>
-          <p:cNvPr id="4" name="Connector: Curved 3">
-            <a:extLst>
-              <a:ext uri="{FF2B5EF4-FFF2-40B4-BE49-F238E27FC236}">
-                <a16:creationId xmlns:a16="http://schemas.microsoft.com/office/drawing/2014/main" id="{6F202DC3-9F46-4F54-A72A-F97AB16753F9}"/>
-              </a:ext>
-            </a:extLst>
-          </p:cNvPr>
-          <p:cNvCxnSpPr>
-            <a:cxnSpLocks/>
-            <a:stCxn id="6" idx="2"/>
-          </p:cNvCxnSpPr>
+      <p:grpSp>
+        <p:nvGrpSpPr>
+          <p:cNvPr id="28" name="Group 27">
+            <a:extLst>
+              <a:ext uri="{FF2B5EF4-FFF2-40B4-BE49-F238E27FC236}">
+                <a16:creationId xmlns:a16="http://schemas.microsoft.com/office/drawing/2014/main" id="{EAD9D6F7-FB20-48C6-9805-C23A4A60512B}"/>
+              </a:ext>
+            </a:extLst>
+          </p:cNvPr>
+          <p:cNvGrpSpPr/>
           <p:nvPr/>
-        </p:nvCxnSpPr>
-        <p:spPr>
-          <a:xfrm rot="16200000" flipH="1">
-            <a:off x="8655273" y="3229965"/>
-            <a:ext cx="2491140" cy="1319808"/>
-          </a:xfrm>
-          <a:prstGeom prst="curvedConnector3">
-            <a:avLst/>
-          </a:prstGeom>
-          <a:ln w="19050">
-            <a:solidFill>
-              <a:schemeClr val="bg1"/>
-            </a:solidFill>
-          </a:ln>
-        </p:spPr>
-        <p:style>
-          <a:lnRef idx="1">
-            <a:schemeClr val="accent1"/>
-          </a:lnRef>
-          <a:fillRef idx="0">
-            <a:schemeClr val="accent1"/>
-          </a:fillRef>
-          <a:effectRef idx="0">
-            <a:schemeClr val="accent1"/>
-          </a:effectRef>
-          <a:fontRef idx="minor">
-            <a:schemeClr val="tx1"/>
-          </a:fontRef>
-        </p:style>
-      </p:cxnSp>
-      <p:sp>
-        <p:nvSpPr>
-          <p:cNvPr id="6" name="TextBox 5">
-            <a:extLst>
-              <a:ext uri="{FF2B5EF4-FFF2-40B4-BE49-F238E27FC236}">
-                <a16:creationId xmlns:a16="http://schemas.microsoft.com/office/drawing/2014/main" id="{334D83A5-B851-491B-A13F-4DD80BA723F0}"/>
-              </a:ext>
-            </a:extLst>
-          </p:cNvPr>
-          <p:cNvSpPr txBox="1"/>
-          <p:nvPr/>
-        </p:nvSpPr>
-        <p:spPr>
+        </p:nvGrpSpPr>
+        <p:grpSpPr>
           <a:xfrm>
-            <a:off x="7232908" y="1997968"/>
-            <a:ext cx="4016061" cy="646331"/>
-          </a:xfrm>
-          <a:prstGeom prst="rect">
-            <a:avLst/>
-          </a:prstGeom>
-          <a:noFill/>
-        </p:spPr>
-        <p:txBody>
-          <a:bodyPr wrap="square" rtlCol="0" anchor="ctr">
-            <a:spAutoFit/>
-          </a:bodyPr>
-          <a:lstStyle/>
-          <a:p>
-            <a:pPr algn="ctr"/>
-            <a:r>
-              <a:rPr lang="en-GB" dirty="0">
+            <a:off x="7619001" y="1145046"/>
+            <a:ext cx="4016061" cy="3959167"/>
+            <a:chOff x="7619001" y="1145046"/>
+            <a:chExt cx="4016061" cy="3959167"/>
+          </a:xfrm>
+        </p:grpSpPr>
+        <p:cxnSp>
+          <p:nvCxnSpPr>
+            <p:cNvPr id="4" name="Connector: Curved 3">
+              <a:extLst>
+                <a:ext uri="{FF2B5EF4-FFF2-40B4-BE49-F238E27FC236}">
+                  <a16:creationId xmlns:a16="http://schemas.microsoft.com/office/drawing/2014/main" id="{6F202DC3-9F46-4F54-A72A-F97AB16753F9}"/>
+                </a:ext>
+              </a:extLst>
+            </p:cNvPr>
+            <p:cNvCxnSpPr>
+              <a:cxnSpLocks/>
+              <a:stCxn id="6" idx="2"/>
+            </p:cNvCxnSpPr>
+            <p:nvPr/>
+          </p:nvCxnSpPr>
+          <p:spPr>
+            <a:xfrm rot="16200000" flipH="1">
+              <a:off x="8505029" y="2851824"/>
+              <a:ext cx="3374392" cy="1130386"/>
+            </a:xfrm>
+            <a:prstGeom prst="curvedConnector3">
+              <a:avLst/>
+            </a:prstGeom>
+            <a:ln w="19050">
+              <a:solidFill>
+                <a:schemeClr val="bg1"/>
+              </a:solidFill>
+            </a:ln>
+          </p:spPr>
+          <p:style>
+            <a:lnRef idx="1">
+              <a:schemeClr val="accent1"/>
+            </a:lnRef>
+            <a:fillRef idx="0">
+              <a:schemeClr val="accent1"/>
+            </a:fillRef>
+            <a:effectRef idx="0">
+              <a:schemeClr val="accent1"/>
+            </a:effectRef>
+            <a:fontRef idx="minor">
+              <a:schemeClr val="tx1"/>
+            </a:fontRef>
+          </p:style>
+        </p:cxnSp>
+        <p:sp>
+          <p:nvSpPr>
+            <p:cNvPr id="6" name="TextBox 5">
+              <a:extLst>
+                <a:ext uri="{FF2B5EF4-FFF2-40B4-BE49-F238E27FC236}">
+                  <a16:creationId xmlns:a16="http://schemas.microsoft.com/office/drawing/2014/main" id="{334D83A5-B851-491B-A13F-4DD80BA723F0}"/>
+                </a:ext>
+              </a:extLst>
+            </p:cNvPr>
+            <p:cNvSpPr txBox="1"/>
+            <p:nvPr/>
+          </p:nvSpPr>
+          <p:spPr>
+            <a:xfrm>
+              <a:off x="7619001" y="1145046"/>
+              <a:ext cx="4016061" cy="584775"/>
+            </a:xfrm>
+            <a:prstGeom prst="rect">
+              <a:avLst/>
+            </a:prstGeom>
+            <a:noFill/>
+          </p:spPr>
+          <p:txBody>
+            <a:bodyPr wrap="square" rtlCol="0" anchor="ctr">
+              <a:spAutoFit/>
+            </a:bodyPr>
+            <a:lstStyle/>
+            <a:p>
+              <a:pPr algn="ctr"/>
+              <a:r>
+                <a:rPr lang="en-GB" sz="1600" dirty="0">
+                  <a:solidFill>
+                    <a:schemeClr val="bg1"/>
+                  </a:solidFill>
+                  <a:latin typeface="DK More Or Less" pitchFamily="50" charset="0"/>
+                </a:rPr>
+                <a:t>When we test Implementations instead of behaviours  ; - (</a:t>
+              </a:r>
+              <a:endParaRPr lang="en-GB" sz="1600" dirty="0">
                 <a:solidFill>
                   <a:schemeClr val="bg1"/>
                 </a:solidFill>
-                <a:latin typeface="DK More Or Less" pitchFamily="50" charset="0"/>
-              </a:rPr>
-              <a:t>When we test Implementations instead of behaviours  ; - (</a:t>
-            </a:r>
-            <a:endParaRPr lang="en-GB" dirty="0">
+              </a:endParaRPr>
+            </a:p>
+          </p:txBody>
+        </p:sp>
+      </p:grpSp>
+      <p:grpSp>
+        <p:nvGrpSpPr>
+          <p:cNvPr id="29" name="Group 28">
+            <a:extLst>
+              <a:ext uri="{FF2B5EF4-FFF2-40B4-BE49-F238E27FC236}">
+                <a16:creationId xmlns:a16="http://schemas.microsoft.com/office/drawing/2014/main" id="{991BBC39-FA17-47BD-988A-5E90E33F8E1C}"/>
+              </a:ext>
+            </a:extLst>
+          </p:cNvPr>
+          <p:cNvGrpSpPr/>
+          <p:nvPr/>
+        </p:nvGrpSpPr>
+        <p:grpSpPr>
+          <a:xfrm>
+            <a:off x="5692417" y="2418122"/>
+            <a:ext cx="3914969" cy="3342985"/>
+            <a:chOff x="5692417" y="2418122"/>
+            <a:chExt cx="3914969" cy="3342985"/>
+          </a:xfrm>
+        </p:grpSpPr>
+        <p:sp>
+          <p:nvSpPr>
+            <p:cNvPr id="12" name="TextBox 11">
+              <a:extLst>
+                <a:ext uri="{FF2B5EF4-FFF2-40B4-BE49-F238E27FC236}">
+                  <a16:creationId xmlns:a16="http://schemas.microsoft.com/office/drawing/2014/main" id="{0A29BD5C-AB21-412D-A2F9-7D204007FBA1}"/>
+                </a:ext>
+              </a:extLst>
+            </p:cNvPr>
+            <p:cNvSpPr txBox="1"/>
+            <p:nvPr/>
+          </p:nvSpPr>
+          <p:spPr>
+            <a:xfrm>
+              <a:off x="5692417" y="2418122"/>
+              <a:ext cx="2895663" cy="892552"/>
+            </a:xfrm>
+            <a:prstGeom prst="rect">
+              <a:avLst/>
+            </a:prstGeom>
+            <a:noFill/>
+          </p:spPr>
+          <p:txBody>
+            <a:bodyPr wrap="square" rtlCol="0" anchor="ctr">
+              <a:spAutoFit/>
+            </a:bodyPr>
+            <a:lstStyle/>
+            <a:p>
+              <a:pPr algn="ctr"/>
+              <a:r>
+                <a:rPr lang="en-GB" sz="1600" dirty="0">
+                  <a:solidFill>
+                    <a:schemeClr val="accent5">
+                      <a:lumMod val="40000"/>
+                      <a:lumOff val="60000"/>
+                    </a:schemeClr>
+                  </a:solidFill>
+                  <a:latin typeface="DK More Or Less" pitchFamily="50" charset="0"/>
+                </a:rPr>
+                <a:t>When </a:t>
+              </a:r>
+              <a:r>
+                <a:rPr lang="en-GB" sz="2000" dirty="0">
+                  <a:solidFill>
+                    <a:schemeClr val="accent5">
+                      <a:lumMod val="40000"/>
+                      <a:lumOff val="60000"/>
+                    </a:schemeClr>
+                  </a:solidFill>
+                  <a:latin typeface="DK More Or Less" pitchFamily="50" charset="0"/>
+                </a:rPr>
+                <a:t>(</a:t>
+              </a:r>
+              <a:r>
+                <a:rPr lang="en-GB" sz="1600" dirty="0">
+                  <a:solidFill>
+                    <a:schemeClr val="accent5">
+                      <a:lumMod val="40000"/>
+                      <a:lumOff val="60000"/>
+                    </a:schemeClr>
+                  </a:solidFill>
+                  <a:latin typeface="DK More Or Less" pitchFamily="50" charset="0"/>
+                </a:rPr>
+                <a:t> Unit </a:t>
+              </a:r>
+              <a:r>
+                <a:rPr lang="en-GB" sz="1100" dirty="0">
+                  <a:solidFill>
+                    <a:schemeClr val="accent5">
+                      <a:lumMod val="40000"/>
+                      <a:lumOff val="60000"/>
+                    </a:schemeClr>
+                  </a:solidFill>
+                  <a:latin typeface="DK More Or Less" pitchFamily="50" charset="0"/>
+                </a:rPr>
+                <a:t>x</a:t>
+              </a:r>
+              <a:r>
+                <a:rPr lang="en-GB" sz="1600" dirty="0">
+                  <a:solidFill>
+                    <a:schemeClr val="accent5">
+                      <a:lumMod val="40000"/>
+                      <a:lumOff val="60000"/>
+                    </a:schemeClr>
+                  </a:solidFill>
+                  <a:latin typeface="DK More Or Less" pitchFamily="50" charset="0"/>
+                </a:rPr>
+                <a:t> Integration</a:t>
+              </a:r>
+              <a:r>
+                <a:rPr lang="en-GB" sz="2000" dirty="0">
+                  <a:solidFill>
+                    <a:schemeClr val="accent5">
+                      <a:lumMod val="40000"/>
+                      <a:lumOff val="60000"/>
+                    </a:schemeClr>
+                  </a:solidFill>
+                  <a:latin typeface="DK More Or Less" pitchFamily="50" charset="0"/>
+                </a:rPr>
+                <a:t> )</a:t>
+              </a:r>
+              <a:r>
+                <a:rPr lang="en-GB" sz="1600" dirty="0">
+                  <a:solidFill>
+                    <a:schemeClr val="accent5">
+                      <a:lumMod val="40000"/>
+                      <a:lumOff val="60000"/>
+                    </a:schemeClr>
+                  </a:solidFill>
+                  <a:latin typeface="DK More Or Less" pitchFamily="50" charset="0"/>
+                </a:rPr>
+                <a:t> </a:t>
+              </a:r>
+            </a:p>
+            <a:p>
+              <a:pPr algn="ctr"/>
+              <a:r>
+                <a:rPr lang="fr-FR" sz="1600" dirty="0">
+                  <a:solidFill>
+                    <a:schemeClr val="accent5">
+                      <a:lumMod val="40000"/>
+                      <a:lumOff val="60000"/>
+                    </a:schemeClr>
+                  </a:solidFill>
+                  <a:latin typeface="DK More Or Less" pitchFamily="50" charset="0"/>
+                </a:rPr>
+                <a:t>Test</a:t>
+              </a:r>
+              <a:r>
+                <a:rPr lang="en-GB" sz="1600" dirty="0">
+                  <a:solidFill>
+                    <a:schemeClr val="accent5">
+                      <a:lumMod val="40000"/>
+                      <a:lumOff val="60000"/>
+                    </a:schemeClr>
+                  </a:solidFill>
+                  <a:latin typeface="DK More Or Less" pitchFamily="50" charset="0"/>
+                </a:rPr>
+                <a:t> coverage is </a:t>
+              </a:r>
+              <a:br>
+                <a:rPr lang="en-GB" sz="1600" dirty="0">
+                  <a:solidFill>
+                    <a:schemeClr val="accent5">
+                      <a:lumMod val="40000"/>
+                      <a:lumOff val="60000"/>
+                    </a:schemeClr>
+                  </a:solidFill>
+                  <a:latin typeface="DK More Or Less" pitchFamily="50" charset="0"/>
+                </a:rPr>
+              </a:br>
+              <a:r>
+                <a:rPr lang="en-GB" sz="1600" dirty="0">
+                  <a:solidFill>
+                    <a:schemeClr val="accent5">
+                      <a:lumMod val="40000"/>
+                      <a:lumOff val="60000"/>
+                    </a:schemeClr>
+                  </a:solidFill>
+                  <a:latin typeface="DK More Or Less" pitchFamily="50" charset="0"/>
+                </a:rPr>
+                <a:t>not enough</a:t>
+              </a:r>
+              <a:endParaRPr lang="en-GB" sz="1600" dirty="0">
+                <a:solidFill>
+                  <a:schemeClr val="accent5">
+                    <a:lumMod val="40000"/>
+                    <a:lumOff val="60000"/>
+                  </a:schemeClr>
+                </a:solidFill>
+              </a:endParaRPr>
+            </a:p>
+          </p:txBody>
+        </p:sp>
+        <p:cxnSp>
+          <p:nvCxnSpPr>
+            <p:cNvPr id="13" name="Connector: Curved 12">
+              <a:extLst>
+                <a:ext uri="{FF2B5EF4-FFF2-40B4-BE49-F238E27FC236}">
+                  <a16:creationId xmlns:a16="http://schemas.microsoft.com/office/drawing/2014/main" id="{16F6BB6D-B5A3-49D8-A155-DE5437751188}"/>
+                </a:ext>
+              </a:extLst>
+            </p:cNvPr>
+            <p:cNvCxnSpPr>
+              <a:cxnSpLocks/>
+            </p:cNvCxnSpPr>
+            <p:nvPr/>
+          </p:nvCxnSpPr>
+          <p:spPr>
+            <a:xfrm rot="16200000" flipH="1">
+              <a:off x="7198949" y="3352670"/>
+              <a:ext cx="2359124" cy="2457750"/>
+            </a:xfrm>
+            <a:prstGeom prst="curvedConnector2">
+              <a:avLst/>
+            </a:prstGeom>
+            <a:ln w="19050">
               <a:solidFill>
-                <a:schemeClr val="bg1"/>
+                <a:schemeClr val="accent5">
+                  <a:lumMod val="40000"/>
+                  <a:lumOff val="60000"/>
+                </a:schemeClr>
               </a:solidFill>
-            </a:endParaRPr>
-          </a:p>
-        </p:txBody>
-      </p:sp>
-      <p:sp>
-        <p:nvSpPr>
-          <p:cNvPr id="12" name="TextBox 11">
-            <a:extLst>
-              <a:ext uri="{FF2B5EF4-FFF2-40B4-BE49-F238E27FC236}">
-                <a16:creationId xmlns:a16="http://schemas.microsoft.com/office/drawing/2014/main" id="{0A29BD5C-AB21-412D-A2F9-7D204007FBA1}"/>
-              </a:ext>
-            </a:extLst>
-          </p:cNvPr>
-          <p:cNvSpPr txBox="1"/>
+            </a:ln>
+          </p:spPr>
+          <p:style>
+            <a:lnRef idx="1">
+              <a:schemeClr val="accent1"/>
+            </a:lnRef>
+            <a:fillRef idx="0">
+              <a:schemeClr val="accent1"/>
+            </a:fillRef>
+            <a:effectRef idx="0">
+              <a:schemeClr val="accent1"/>
+            </a:effectRef>
+            <a:fontRef idx="minor">
+              <a:schemeClr val="tx1"/>
+            </a:fontRef>
+          </p:style>
+        </p:cxnSp>
+      </p:grpSp>
+      <p:grpSp>
+        <p:nvGrpSpPr>
+          <p:cNvPr id="30" name="Group 29">
+            <a:extLst>
+              <a:ext uri="{FF2B5EF4-FFF2-40B4-BE49-F238E27FC236}">
+                <a16:creationId xmlns:a16="http://schemas.microsoft.com/office/drawing/2014/main" id="{E639B539-A4FE-4E8B-932E-C63290B2585F}"/>
+              </a:ext>
+            </a:extLst>
+          </p:cNvPr>
+          <p:cNvGrpSpPr/>
           <p:nvPr/>
-        </p:nvSpPr>
-        <p:spPr>
+        </p:nvGrpSpPr>
+        <p:grpSpPr>
           <a:xfrm>
-            <a:off x="5576219" y="3184594"/>
-            <a:ext cx="2895663" cy="923330"/>
-          </a:xfrm>
-          <a:prstGeom prst="rect">
-            <a:avLst/>
-          </a:prstGeom>
-          <a:noFill/>
-        </p:spPr>
-        <p:txBody>
-          <a:bodyPr wrap="square" rtlCol="0" anchor="ctr">
-            <a:spAutoFit/>
-          </a:bodyPr>
-          <a:lstStyle/>
-          <a:p>
-            <a:pPr algn="ctr"/>
-            <a:r>
-              <a:rPr lang="en-GB" dirty="0">
+            <a:off x="4193946" y="4141009"/>
+            <a:ext cx="5372079" cy="1620097"/>
+            <a:chOff x="4193946" y="4141009"/>
+            <a:chExt cx="5372079" cy="1620097"/>
+          </a:xfrm>
+        </p:grpSpPr>
+        <p:sp>
+          <p:nvSpPr>
+            <p:cNvPr id="16" name="TextBox 15">
+              <a:extLst>
+                <a:ext uri="{FF2B5EF4-FFF2-40B4-BE49-F238E27FC236}">
+                  <a16:creationId xmlns:a16="http://schemas.microsoft.com/office/drawing/2014/main" id="{2EF66E52-98EE-4E29-96EB-06FBE5E89850}"/>
+                </a:ext>
+              </a:extLst>
+            </p:cNvPr>
+            <p:cNvSpPr txBox="1"/>
+            <p:nvPr/>
+          </p:nvSpPr>
+          <p:spPr>
+            <a:xfrm>
+              <a:off x="4193946" y="4141009"/>
+              <a:ext cx="2895663" cy="830997"/>
+            </a:xfrm>
+            <a:prstGeom prst="rect">
+              <a:avLst/>
+            </a:prstGeom>
+            <a:noFill/>
+          </p:spPr>
+          <p:txBody>
+            <a:bodyPr wrap="square" rtlCol="0" anchor="ctr">
+              <a:spAutoFit/>
+            </a:bodyPr>
+            <a:lstStyle/>
+            <a:p>
+              <a:pPr algn="ctr"/>
+              <a:r>
+                <a:rPr lang="en-US" sz="1600" dirty="0">
+                  <a:solidFill>
+                    <a:schemeClr val="accent5">
+                      <a:lumMod val="40000"/>
+                      <a:lumOff val="60000"/>
+                    </a:schemeClr>
+                  </a:solidFill>
+                  <a:latin typeface="DK More Or Less" pitchFamily="50" charset="0"/>
+                </a:rPr>
+                <a:t>We tend to overlook some boring but crucial areas like adapters code</a:t>
+              </a:r>
+              <a:endParaRPr lang="en-GB" sz="1600" dirty="0">
                 <a:solidFill>
                   <a:schemeClr val="accent5">
                     <a:lumMod val="40000"/>
@@ -16646,227 +17009,168 @@
                   </a:schemeClr>
                 </a:solidFill>
                 <a:latin typeface="DK More Or Less" pitchFamily="50" charset="0"/>
-              </a:rPr>
-              <a:t>When Unit </a:t>
-            </a:r>
-            <a:r>
-              <a:rPr lang="en-GB" sz="1200" dirty="0">
-                <a:solidFill>
-                  <a:schemeClr val="accent5">
-                    <a:lumMod val="40000"/>
-                    <a:lumOff val="60000"/>
-                  </a:schemeClr>
-                </a:solidFill>
-                <a:latin typeface="DK More Or Less" pitchFamily="50" charset="0"/>
-              </a:rPr>
-              <a:t>x</a:t>
-            </a:r>
-            <a:r>
-              <a:rPr lang="en-GB" dirty="0">
-                <a:solidFill>
-                  <a:schemeClr val="accent5">
-                    <a:lumMod val="40000"/>
-                    <a:lumOff val="60000"/>
-                  </a:schemeClr>
-                </a:solidFill>
-                <a:latin typeface="DK More Or Less" pitchFamily="50" charset="0"/>
-              </a:rPr>
-              <a:t> Integration </a:t>
-            </a:r>
-            <a:r>
-              <a:rPr lang="fr-FR" dirty="0">
-                <a:solidFill>
-                  <a:schemeClr val="accent5">
-                    <a:lumMod val="40000"/>
-                    <a:lumOff val="60000"/>
-                  </a:schemeClr>
-                </a:solidFill>
-                <a:latin typeface="DK More Or Less" pitchFamily="50" charset="0"/>
-              </a:rPr>
-              <a:t>Tests</a:t>
-            </a:r>
-            <a:r>
-              <a:rPr lang="en-GB" dirty="0">
-                <a:solidFill>
-                  <a:schemeClr val="accent5">
-                    <a:lumMod val="40000"/>
-                    <a:lumOff val="60000"/>
-                  </a:schemeClr>
-                </a:solidFill>
-                <a:latin typeface="DK More Or Less" pitchFamily="50" charset="0"/>
-              </a:rPr>
-              <a:t> coverage is </a:t>
-            </a:r>
-            <a:br>
-              <a:rPr lang="en-GB" dirty="0">
-                <a:solidFill>
-                  <a:schemeClr val="accent5">
-                    <a:lumMod val="40000"/>
-                    <a:lumOff val="60000"/>
-                  </a:schemeClr>
-                </a:solidFill>
-                <a:latin typeface="DK More Or Less" pitchFamily="50" charset="0"/>
-              </a:rPr>
-            </a:br>
-            <a:r>
-              <a:rPr lang="en-GB" dirty="0">
-                <a:solidFill>
-                  <a:schemeClr val="accent5">
-                    <a:lumMod val="40000"/>
-                    <a:lumOff val="60000"/>
-                  </a:schemeClr>
-                </a:solidFill>
-                <a:latin typeface="DK More Or Less" pitchFamily="50" charset="0"/>
-              </a:rPr>
-              <a:t>not enough</a:t>
-            </a:r>
-            <a:endParaRPr lang="en-GB" dirty="0">
+              </a:endParaRPr>
+            </a:p>
+          </p:txBody>
+        </p:sp>
+        <p:cxnSp>
+          <p:nvCxnSpPr>
+            <p:cNvPr id="17" name="Connector: Curved 16">
+              <a:extLst>
+                <a:ext uri="{FF2B5EF4-FFF2-40B4-BE49-F238E27FC236}">
+                  <a16:creationId xmlns:a16="http://schemas.microsoft.com/office/drawing/2014/main" id="{8219ED84-7AA9-4C8C-A84E-4D3370519A58}"/>
+                </a:ext>
+              </a:extLst>
+            </p:cNvPr>
+            <p:cNvCxnSpPr>
+              <a:cxnSpLocks/>
+              <a:stCxn id="16" idx="2"/>
+            </p:cNvCxnSpPr>
+            <p:nvPr/>
+          </p:nvCxnSpPr>
+          <p:spPr>
+            <a:xfrm rot="16200000" flipH="1">
+              <a:off x="7209351" y="3404433"/>
+              <a:ext cx="789101" cy="3924246"/>
+            </a:xfrm>
+            <a:prstGeom prst="curvedConnector2">
+              <a:avLst/>
+            </a:prstGeom>
+            <a:ln w="19050">
               <a:solidFill>
                 <a:schemeClr val="accent5">
                   <a:lumMod val="40000"/>
                   <a:lumOff val="60000"/>
                 </a:schemeClr>
               </a:solidFill>
-            </a:endParaRPr>
-          </a:p>
-        </p:txBody>
-      </p:sp>
-      <p:cxnSp>
-        <p:nvCxnSpPr>
-          <p:cNvPr id="13" name="Connector: Curved 12">
-            <a:extLst>
-              <a:ext uri="{FF2B5EF4-FFF2-40B4-BE49-F238E27FC236}">
-                <a16:creationId xmlns:a16="http://schemas.microsoft.com/office/drawing/2014/main" id="{16F6BB6D-B5A3-49D8-A155-DE5437751188}"/>
-              </a:ext>
-            </a:extLst>
-          </p:cNvPr>
-          <p:cNvCxnSpPr>
-            <a:cxnSpLocks/>
-          </p:cNvCxnSpPr>
+            </a:ln>
+          </p:spPr>
+          <p:style>
+            <a:lnRef idx="1">
+              <a:schemeClr val="accent1"/>
+            </a:lnRef>
+            <a:fillRef idx="0">
+              <a:schemeClr val="accent1"/>
+            </a:fillRef>
+            <a:effectRef idx="0">
+              <a:schemeClr val="accent1"/>
+            </a:effectRef>
+            <a:fontRef idx="minor">
+              <a:schemeClr val="tx1"/>
+            </a:fontRef>
+          </p:style>
+        </p:cxnSp>
+      </p:grpSp>
+      <p:grpSp>
+        <p:nvGrpSpPr>
+          <p:cNvPr id="31" name="Group 30">
+            <a:extLst>
+              <a:ext uri="{FF2B5EF4-FFF2-40B4-BE49-F238E27FC236}">
+                <a16:creationId xmlns:a16="http://schemas.microsoft.com/office/drawing/2014/main" id="{228D1D88-5597-4E26-9CD3-FDB3698AC3EF}"/>
+              </a:ext>
+            </a:extLst>
+          </p:cNvPr>
+          <p:cNvGrpSpPr/>
           <p:nvPr/>
-        </p:nvCxnSpPr>
-        <p:spPr>
-          <a:xfrm rot="16200000" flipH="1">
-            <a:off x="7454448" y="3583071"/>
-            <a:ext cx="1642712" cy="2678610"/>
-          </a:xfrm>
-          <a:prstGeom prst="curvedConnector2">
-            <a:avLst/>
-          </a:prstGeom>
-          <a:ln w="19050">
-            <a:solidFill>
-              <a:schemeClr val="accent5">
-                <a:lumMod val="40000"/>
-                <a:lumOff val="60000"/>
-              </a:schemeClr>
-            </a:solidFill>
-          </a:ln>
-        </p:spPr>
-        <p:style>
-          <a:lnRef idx="1">
-            <a:schemeClr val="accent1"/>
-          </a:lnRef>
-          <a:fillRef idx="0">
-            <a:schemeClr val="accent1"/>
-          </a:fillRef>
-          <a:effectRef idx="0">
-            <a:schemeClr val="accent1"/>
-          </a:effectRef>
-          <a:fontRef idx="minor">
-            <a:schemeClr val="tx1"/>
-          </a:fontRef>
-        </p:style>
-      </p:cxnSp>
-      <p:sp>
-        <p:nvSpPr>
-          <p:cNvPr id="16" name="TextBox 15">
-            <a:extLst>
-              <a:ext uri="{FF2B5EF4-FFF2-40B4-BE49-F238E27FC236}">
-                <a16:creationId xmlns:a16="http://schemas.microsoft.com/office/drawing/2014/main" id="{2EF66E52-98EE-4E29-96EB-06FBE5E89850}"/>
-              </a:ext>
-            </a:extLst>
-          </p:cNvPr>
-          <p:cNvSpPr txBox="1"/>
-          <p:nvPr/>
-        </p:nvSpPr>
-        <p:spPr>
+        </p:nvGrpSpPr>
+        <p:grpSpPr>
           <a:xfrm>
-            <a:off x="3466003" y="4883409"/>
-            <a:ext cx="2895663" cy="646331"/>
-          </a:xfrm>
-          <a:prstGeom prst="rect">
-            <a:avLst/>
-          </a:prstGeom>
-          <a:noFill/>
-        </p:spPr>
-        <p:txBody>
-          <a:bodyPr wrap="square" rtlCol="0" anchor="ctr">
-            <a:spAutoFit/>
-          </a:bodyPr>
-          <a:lstStyle/>
-          <a:p>
-            <a:pPr algn="ctr"/>
-            <a:r>
-              <a:rPr lang="en-GB" dirty="0">
+            <a:off x="2511911" y="5882819"/>
+            <a:ext cx="6076169" cy="338554"/>
+            <a:chOff x="2511911" y="5882819"/>
+            <a:chExt cx="6076169" cy="338554"/>
+          </a:xfrm>
+        </p:grpSpPr>
+        <p:sp>
+          <p:nvSpPr>
+            <p:cNvPr id="23" name="TextBox 22">
+              <a:extLst>
+                <a:ext uri="{FF2B5EF4-FFF2-40B4-BE49-F238E27FC236}">
+                  <a16:creationId xmlns:a16="http://schemas.microsoft.com/office/drawing/2014/main" id="{84AB31DD-9C8A-4DD1-A000-D97975DFF162}"/>
+                </a:ext>
+              </a:extLst>
+            </p:cNvPr>
+            <p:cNvSpPr txBox="1"/>
+            <p:nvPr/>
+          </p:nvSpPr>
+          <p:spPr>
+            <a:xfrm>
+              <a:off x="2511911" y="5882819"/>
+              <a:ext cx="4016061" cy="338554"/>
+            </a:xfrm>
+            <a:prstGeom prst="rect">
+              <a:avLst/>
+            </a:prstGeom>
+            <a:noFill/>
+          </p:spPr>
+          <p:txBody>
+            <a:bodyPr wrap="square" rtlCol="0" anchor="ctr">
+              <a:spAutoFit/>
+            </a:bodyPr>
+            <a:lstStyle/>
+            <a:p>
+              <a:pPr algn="ctr"/>
+              <a:r>
+                <a:rPr lang="en-US" sz="1600" dirty="0">
+                  <a:solidFill>
+                    <a:schemeClr val="bg1"/>
+                  </a:solidFill>
+                  <a:latin typeface="DK More Or Less" pitchFamily="50" charset="0"/>
+                </a:rPr>
+                <a:t>The team must be confident in their tests</a:t>
+              </a:r>
+              <a:endParaRPr lang="en-GB" sz="1600" dirty="0">
                 <a:solidFill>
                   <a:schemeClr val="bg1"/>
                 </a:solidFill>
-                <a:latin typeface="DK More Or Less" pitchFamily="50" charset="0"/>
-              </a:rPr>
-              <a:t>Beware of Bugs located in stupid code (e.g. Adapters)</a:t>
-            </a:r>
-            <a:endParaRPr lang="en-GB" dirty="0">
+              </a:endParaRPr>
+            </a:p>
+          </p:txBody>
+        </p:sp>
+        <p:cxnSp>
+          <p:nvCxnSpPr>
+            <p:cNvPr id="24" name="Connector: Curved 23">
+              <a:extLst>
+                <a:ext uri="{FF2B5EF4-FFF2-40B4-BE49-F238E27FC236}">
+                  <a16:creationId xmlns:a16="http://schemas.microsoft.com/office/drawing/2014/main" id="{716D702A-7524-4DF8-A5FE-66318DCD382D}"/>
+                </a:ext>
+              </a:extLst>
+            </p:cNvPr>
+            <p:cNvCxnSpPr>
+              <a:cxnSpLocks/>
+            </p:cNvCxnSpPr>
+            <p:nvPr/>
+          </p:nvCxnSpPr>
+          <p:spPr>
+            <a:xfrm>
+              <a:off x="6434181" y="6070081"/>
+              <a:ext cx="2153899" cy="126646"/>
+            </a:xfrm>
+            <a:prstGeom prst="curvedConnector3">
+              <a:avLst/>
+            </a:prstGeom>
+            <a:ln w="19050">
               <a:solidFill>
                 <a:schemeClr val="bg1"/>
               </a:solidFill>
-            </a:endParaRPr>
-          </a:p>
-        </p:txBody>
-      </p:sp>
-      <p:cxnSp>
-        <p:nvCxnSpPr>
-          <p:cNvPr id="17" name="Connector: Curved 16">
-            <a:extLst>
-              <a:ext uri="{FF2B5EF4-FFF2-40B4-BE49-F238E27FC236}">
-                <a16:creationId xmlns:a16="http://schemas.microsoft.com/office/drawing/2014/main" id="{8219ED84-7AA9-4C8C-A84E-4D3370519A58}"/>
-              </a:ext>
-            </a:extLst>
-          </p:cNvPr>
-          <p:cNvCxnSpPr>
-            <a:cxnSpLocks/>
-            <a:stCxn id="16" idx="2"/>
-          </p:cNvCxnSpPr>
-          <p:nvPr/>
-        </p:nvCxnSpPr>
-        <p:spPr>
-          <a:xfrm rot="16200000" flipH="1">
-            <a:off x="7123294" y="3320281"/>
-            <a:ext cx="688970" cy="5107888"/>
-          </a:xfrm>
-          <a:prstGeom prst="curvedConnector2">
-            <a:avLst/>
-          </a:prstGeom>
-          <a:ln w="19050">
-            <a:solidFill>
-              <a:schemeClr val="bg1"/>
-            </a:solidFill>
-          </a:ln>
-        </p:spPr>
-        <p:style>
-          <a:lnRef idx="1">
-            <a:schemeClr val="accent1"/>
-          </a:lnRef>
-          <a:fillRef idx="0">
-            <a:schemeClr val="accent1"/>
-          </a:fillRef>
-          <a:effectRef idx="0">
-            <a:schemeClr val="accent1"/>
-          </a:effectRef>
-          <a:fontRef idx="minor">
-            <a:schemeClr val="tx1"/>
-          </a:fontRef>
-        </p:style>
-      </p:cxnSp>
+            </a:ln>
+          </p:spPr>
+          <p:style>
+            <a:lnRef idx="1">
+              <a:schemeClr val="accent1"/>
+            </a:lnRef>
+            <a:fillRef idx="0">
+              <a:schemeClr val="accent1"/>
+            </a:fillRef>
+            <a:effectRef idx="0">
+              <a:schemeClr val="accent1"/>
+            </a:effectRef>
+            <a:fontRef idx="minor">
+              <a:schemeClr val="tx1"/>
+            </a:fontRef>
+          </p:style>
+        </p:cxnSp>
+      </p:grpSp>
     </p:spTree>
     <p:extLst>
       <p:ext uri="{BB962C8B-B14F-4D97-AF65-F5344CB8AC3E}">
@@ -16960,34 +17264,7 @@
                                           </p:stCondLst>
                                         </p:cTn>
                                         <p:tgtEl>
-                                          <p:spTgt spid="4"/>
-                                        </p:tgtEl>
-                                        <p:attrNameLst>
-                                          <p:attrName>style.visibility</p:attrName>
-                                        </p:attrNameLst>
-                                      </p:cBhvr>
-                                      <p:to>
-                                        <p:strVal val="visible"/>
-                                      </p:to>
-                                    </p:set>
-                                  </p:childTnLst>
-                                </p:cTn>
-                              </p:par>
-                              <p:par>
-                                <p:cTn id="11" presetID="1" presetClass="entr" presetSubtype="0" fill="hold" grpId="0" nodeType="withEffect">
-                                  <p:stCondLst>
-                                    <p:cond delay="0"/>
-                                  </p:stCondLst>
-                                  <p:childTnLst>
-                                    <p:set>
-                                      <p:cBhvr>
-                                        <p:cTn id="12" dur="1" fill="hold">
-                                          <p:stCondLst>
-                                            <p:cond delay="0"/>
-                                          </p:stCondLst>
-                                        </p:cTn>
-                                        <p:tgtEl>
-                                          <p:spTgt spid="6"/>
+                                          <p:spTgt spid="28"/>
                                         </p:tgtEl>
                                         <p:attrNameLst>
                                           <p:attrName>style.visibility</p:attrName>
@@ -17007,26 +17284,26 @@
                     </p:cTn>
                   </p:par>
                   <p:par>
-                    <p:cTn id="13" fill="hold">
+                    <p:cTn id="11" fill="hold">
                       <p:stCondLst>
                         <p:cond delay="indefinite"/>
                       </p:stCondLst>
                       <p:childTnLst>
                         <p:par>
-                          <p:cTn id="14" fill="hold">
+                          <p:cTn id="12" fill="hold">
                             <p:stCondLst>
                               <p:cond delay="0"/>
                             </p:stCondLst>
                             <p:childTnLst>
                               <p:par>
-                                <p:cTn id="15" presetID="1" presetClass="entr" presetSubtype="0" fill="hold" nodeType="clickEffect">
+                                <p:cTn id="13" presetID="1" presetClass="entr" presetSubtype="0" fill="hold" nodeType="clickEffect">
                                   <p:stCondLst>
                                     <p:cond delay="0"/>
                                   </p:stCondLst>
                                   <p:childTnLst>
                                     <p:set>
                                       <p:cBhvr>
-                                        <p:cTn id="16" dur="1" fill="hold">
+                                        <p:cTn id="14" dur="1" fill="hold">
                                           <p:stCondLst>
                                             <p:cond delay="0"/>
                                           </p:stCondLst>
@@ -17056,32 +17333,32 @@
                     </p:cTn>
                   </p:par>
                   <p:par>
-                    <p:cTn id="17" fill="hold">
+                    <p:cTn id="15" fill="hold">
                       <p:stCondLst>
                         <p:cond delay="indefinite"/>
                       </p:stCondLst>
                       <p:childTnLst>
                         <p:par>
-                          <p:cTn id="18" fill="hold">
+                          <p:cTn id="16" fill="hold">
                             <p:stCondLst>
                               <p:cond delay="0"/>
                             </p:stCondLst>
                             <p:childTnLst>
                               <p:par>
-                                <p:cTn id="19" presetID="1" presetClass="entr" presetSubtype="0" fill="hold" nodeType="clickEffect">
+                                <p:cTn id="17" presetID="1" presetClass="entr" presetSubtype="0" fill="hold" nodeType="clickEffect">
                                   <p:stCondLst>
                                     <p:cond delay="0"/>
                                   </p:stCondLst>
                                   <p:childTnLst>
                                     <p:set>
                                       <p:cBhvr>
-                                        <p:cTn id="20" dur="1" fill="hold">
+                                        <p:cTn id="18" dur="1" fill="hold">
                                           <p:stCondLst>
                                             <p:cond delay="0"/>
                                           </p:stCondLst>
                                         </p:cTn>
                                         <p:tgtEl>
-                                          <p:spTgt spid="13"/>
+                                          <p:spTgt spid="29"/>
                                         </p:tgtEl>
                                         <p:attrNameLst>
                                           <p:attrName>style.visibility</p:attrName>
@@ -17094,8 +17371,26 @@
                                   </p:childTnLst>
                                 </p:cTn>
                               </p:par>
+                            </p:childTnLst>
+                          </p:cTn>
+                        </p:par>
+                      </p:childTnLst>
+                    </p:cTn>
+                  </p:par>
+                  <p:par>
+                    <p:cTn id="19" fill="hold">
+                      <p:stCondLst>
+                        <p:cond delay="indefinite"/>
+                      </p:stCondLst>
+                      <p:childTnLst>
+                        <p:par>
+                          <p:cTn id="20" fill="hold">
+                            <p:stCondLst>
+                              <p:cond delay="0"/>
+                            </p:stCondLst>
+                            <p:childTnLst>
                               <p:par>
-                                <p:cTn id="21" presetID="1" presetClass="entr" presetSubtype="0" fill="hold" grpId="0" nodeType="withEffect">
+                                <p:cTn id="21" presetID="1" presetClass="entr" presetSubtype="0" fill="hold" nodeType="clickEffect">
                                   <p:stCondLst>
                                     <p:cond delay="0"/>
                                   </p:stCondLst>
@@ -17108,7 +17403,7 @@
                                           </p:stCondLst>
                                         </p:cTn>
                                         <p:tgtEl>
-                                          <p:spTgt spid="12"/>
+                                          <p:spTgt spid="30"/>
                                         </p:tgtEl>
                                         <p:attrNameLst>
                                           <p:attrName>style.visibility</p:attrName>
@@ -17202,34 +17497,7 @@
                                           </p:stCondLst>
                                         </p:cTn>
                                         <p:tgtEl>
-                                          <p:spTgt spid="17"/>
-                                        </p:tgtEl>
-                                        <p:attrNameLst>
-                                          <p:attrName>style.visibility</p:attrName>
-                                        </p:attrNameLst>
-                                      </p:cBhvr>
-                                      <p:to>
-                                        <p:strVal val="visible"/>
-                                      </p:to>
-                                    </p:set>
-                                  </p:childTnLst>
-                                </p:cTn>
-                              </p:par>
-                              <p:par>
-                                <p:cTn id="31" presetID="1" presetClass="entr" presetSubtype="0" fill="hold" grpId="0" nodeType="withEffect">
-                                  <p:stCondLst>
-                                    <p:cond delay="0"/>
-                                  </p:stCondLst>
-                                  <p:childTnLst>
-                                    <p:set>
-                                      <p:cBhvr>
-                                        <p:cTn id="32" dur="1" fill="hold">
-                                          <p:stCondLst>
-                                            <p:cond delay="0"/>
-                                          </p:stCondLst>
-                                        </p:cTn>
-                                        <p:tgtEl>
-                                          <p:spTgt spid="16"/>
+                                          <p:spTgt spid="31"/>
                                         </p:tgtEl>
                                         <p:attrNameLst>
                                           <p:attrName>style.visibility</p:attrName>
@@ -17269,11 +17537,6 @@
         </p:cTn>
       </p:par>
     </p:tnLst>
-    <p:bldLst>
-      <p:bldP spid="6" grpId="0"/>
-      <p:bldP spid="12" grpId="0"/>
-      <p:bldP spid="16" grpId="0"/>
-    </p:bldLst>
   </p:timing>
 </p:sld>
 </file>
@@ -17353,7 +17616,7 @@
           </a:prstGeom>
           <a:solidFill>
             <a:schemeClr val="tx1">
-              <a:alpha val="70000"/>
+              <a:alpha val="57000"/>
             </a:schemeClr>
           </a:solidFill>
           <a:ln>
@@ -18626,7 +18889,7 @@
           </a:prstGeom>
           <a:solidFill>
             <a:schemeClr val="tx1">
-              <a:alpha val="70000"/>
+              <a:alpha val="57000"/>
             </a:schemeClr>
           </a:solidFill>
           <a:ln>
@@ -20561,6 +20824,41 @@
           </a:p>
         </p:txBody>
       </p:sp>
+      <p:sp>
+        <p:nvSpPr>
+          <p:cNvPr id="41" name="TextBox 40">
+            <a:extLst>
+              <a:ext uri="{FF2B5EF4-FFF2-40B4-BE49-F238E27FC236}">
+                <a16:creationId xmlns:a16="http://schemas.microsoft.com/office/drawing/2014/main" id="{2B80CE2F-FE04-45C3-A18B-378704BEC15D}"/>
+              </a:ext>
+            </a:extLst>
+          </p:cNvPr>
+          <p:cNvSpPr txBox="1"/>
+          <p:nvPr/>
+        </p:nvSpPr>
+        <p:spPr>
+          <a:xfrm>
+            <a:off x="7402664" y="3403160"/>
+            <a:ext cx="659456" cy="369332"/>
+          </a:xfrm>
+          <a:prstGeom prst="rect">
+            <a:avLst/>
+          </a:prstGeom>
+          <a:noFill/>
+        </p:spPr>
+        <p:txBody>
+          <a:bodyPr wrap="square" rtlCol="0">
+            <a:spAutoFit/>
+          </a:bodyPr>
+          <a:lstStyle/>
+          <a:p>
+            <a:r>
+              <a:rPr lang="en-GB" dirty="0"/>
+              <a:t>uses</a:t>
+            </a:r>
+          </a:p>
+        </p:txBody>
+      </p:sp>
     </p:spTree>
     <p:extLst>
       <p:ext uri="{BB962C8B-B14F-4D97-AF65-F5344CB8AC3E}">
@@ -20649,7 +20947,7 @@
           </a:prstGeom>
           <a:solidFill>
             <a:schemeClr val="tx1">
-              <a:alpha val="70000"/>
+              <a:alpha val="57000"/>
             </a:schemeClr>
           </a:solidFill>
           <a:ln>
@@ -22584,6 +22882,41 @@
           </a:p>
         </p:txBody>
       </p:sp>
+      <p:sp>
+        <p:nvSpPr>
+          <p:cNvPr id="41" name="TextBox 40">
+            <a:extLst>
+              <a:ext uri="{FF2B5EF4-FFF2-40B4-BE49-F238E27FC236}">
+                <a16:creationId xmlns:a16="http://schemas.microsoft.com/office/drawing/2014/main" id="{46229447-4767-409D-89E9-58DDC5883099}"/>
+              </a:ext>
+            </a:extLst>
+          </p:cNvPr>
+          <p:cNvSpPr txBox="1"/>
+          <p:nvPr/>
+        </p:nvSpPr>
+        <p:spPr>
+          <a:xfrm>
+            <a:off x="7402664" y="3403160"/>
+            <a:ext cx="659456" cy="369332"/>
+          </a:xfrm>
+          <a:prstGeom prst="rect">
+            <a:avLst/>
+          </a:prstGeom>
+          <a:noFill/>
+        </p:spPr>
+        <p:txBody>
+          <a:bodyPr wrap="square" rtlCol="0">
+            <a:spAutoFit/>
+          </a:bodyPr>
+          <a:lstStyle/>
+          <a:p>
+            <a:r>
+              <a:rPr lang="en-GB" dirty="0"/>
+              <a:t>uses</a:t>
+            </a:r>
+          </a:p>
+        </p:txBody>
+      </p:sp>
     </p:spTree>
     <p:extLst>
       <p:ext uri="{BB962C8B-B14F-4D97-AF65-F5344CB8AC3E}">
@@ -22600,6 +22933,16 @@
 <file path=ppt/slides/slide9.xml><?xml version="1.0" encoding="utf-8"?>
 <p:sld xmlns:a="http://schemas.openxmlformats.org/drawingml/2006/main" xmlns:r="http://schemas.openxmlformats.org/officeDocument/2006/relationships" xmlns:p="http://schemas.openxmlformats.org/presentationml/2006/main">
   <p:cSld>
+    <p:bg>
+      <p:bgPr>
+        <a:solidFill>
+          <a:schemeClr val="bg1">
+            <a:alpha val="57000"/>
+          </a:schemeClr>
+        </a:solidFill>
+        <a:effectLst/>
+      </p:bgPr>
+    </p:bg>
     <p:spTree>
       <p:nvGrpSpPr>
         <p:cNvPr id="1" name=""/>
@@ -22672,7 +23015,7 @@
           </a:prstGeom>
           <a:solidFill>
             <a:schemeClr val="tx1">
-              <a:alpha val="70000"/>
+              <a:alpha val="57000"/>
             </a:schemeClr>
           </a:solidFill>
           <a:ln>
@@ -24616,6 +24959,41 @@
           <a:p>
             <a:pPr algn="ctr"/>
             <a:endParaRPr lang="en-GB"/>
+          </a:p>
+        </p:txBody>
+      </p:sp>
+      <p:sp>
+        <p:nvSpPr>
+          <p:cNvPr id="41" name="TextBox 40">
+            <a:extLst>
+              <a:ext uri="{FF2B5EF4-FFF2-40B4-BE49-F238E27FC236}">
+                <a16:creationId xmlns:a16="http://schemas.microsoft.com/office/drawing/2014/main" id="{C32BC32C-9AFE-4027-8B1C-D73B7AEABE20}"/>
+              </a:ext>
+            </a:extLst>
+          </p:cNvPr>
+          <p:cNvSpPr txBox="1"/>
+          <p:nvPr/>
+        </p:nvSpPr>
+        <p:spPr>
+          <a:xfrm>
+            <a:off x="7402664" y="3403160"/>
+            <a:ext cx="659456" cy="369332"/>
+          </a:xfrm>
+          <a:prstGeom prst="rect">
+            <a:avLst/>
+          </a:prstGeom>
+          <a:noFill/>
+        </p:spPr>
+        <p:txBody>
+          <a:bodyPr wrap="square" rtlCol="0">
+            <a:spAutoFit/>
+          </a:bodyPr>
+          <a:lstStyle/>
+          <a:p>
+            <a:r>
+              <a:rPr lang="en-GB" dirty="0"/>
+              <a:t>uses</a:t>
+            </a:r>
           </a:p>
         </p:txBody>
       </p:sp>

</xml_diff>

<commit_message>
add wifi and db icons, improve the 3 beware of
</commit_message>
<xml_diff>
--- a/Outside-In-Diamond TDD.pptx
+++ b/Outside-In-Diamond TDD.pptx
@@ -5,7 +5,7 @@
     <p:sldMasterId id="2147483648" r:id="rId1"/>
   </p:sldMasterIdLst>
   <p:notesMasterIdLst>
-    <p:notesMasterId r:id="rId17"/>
+    <p:notesMasterId r:id="rId18"/>
   </p:notesMasterIdLst>
   <p:sldIdLst>
     <p:sldId id="264" r:id="rId2"/>
@@ -23,6 +23,7 @@
     <p:sldId id="258" r:id="rId14"/>
     <p:sldId id="262" r:id="rId15"/>
     <p:sldId id="260" r:id="rId16"/>
+    <p:sldId id="274" r:id="rId17"/>
   </p:sldIdLst>
   <p:sldSz cx="12192000" cy="6858000"/>
   <p:notesSz cx="6858000" cy="9144000"/>
@@ -211,7 +212,7 @@
           <a:p>
             <a:fld id="{E39AC1E9-3E82-4A62-AF19-0295C6351D44}" type="datetimeFigureOut">
               <a:rPr lang="en-GB" smtClean="0"/>
-              <a:t>07/02/2021</a:t>
+              <a:t>08/02/2021</a:t>
             </a:fld>
             <a:endParaRPr lang="en-GB"/>
           </a:p>
@@ -972,6 +973,90 @@
 </p:notes>
 </file>
 
+<file path=ppt/notesSlides/notesSlide14.xml><?xml version="1.0" encoding="utf-8"?>
+<p:notes xmlns:a="http://schemas.openxmlformats.org/drawingml/2006/main" xmlns:r="http://schemas.openxmlformats.org/officeDocument/2006/relationships" xmlns:p="http://schemas.openxmlformats.org/presentationml/2006/main">
+  <p:cSld>
+    <p:spTree>
+      <p:nvGrpSpPr>
+        <p:cNvPr id="1" name=""/>
+        <p:cNvGrpSpPr/>
+        <p:nvPr/>
+      </p:nvGrpSpPr>
+      <p:grpSpPr>
+        <a:xfrm>
+          <a:off x="0" y="0"/>
+          <a:ext cx="0" cy="0"/>
+          <a:chOff x="0" y="0"/>
+          <a:chExt cx="0" cy="0"/>
+        </a:xfrm>
+      </p:grpSpPr>
+      <p:sp>
+        <p:nvSpPr>
+          <p:cNvPr id="2" name="Slide Image Placeholder 1"/>
+          <p:cNvSpPr>
+            <a:spLocks noGrp="1" noRot="1" noChangeAspect="1"/>
+          </p:cNvSpPr>
+          <p:nvPr>
+            <p:ph type="sldImg"/>
+          </p:nvPr>
+        </p:nvSpPr>
+        <p:spPr/>
+      </p:sp>
+      <p:sp>
+        <p:nvSpPr>
+          <p:cNvPr id="3" name="Notes Placeholder 2"/>
+          <p:cNvSpPr>
+            <a:spLocks noGrp="1"/>
+          </p:cNvSpPr>
+          <p:nvPr>
+            <p:ph type="body" idx="1"/>
+          </p:nvPr>
+        </p:nvSpPr>
+        <p:spPr/>
+        <p:txBody>
+          <a:bodyPr/>
+          <a:lstStyle/>
+          <a:p>
+            <a:endParaRPr lang="en-GB" dirty="0"/>
+          </a:p>
+        </p:txBody>
+      </p:sp>
+      <p:sp>
+        <p:nvSpPr>
+          <p:cNvPr id="4" name="Slide Number Placeholder 3"/>
+          <p:cNvSpPr>
+            <a:spLocks noGrp="1"/>
+          </p:cNvSpPr>
+          <p:nvPr>
+            <p:ph type="sldNum" sz="quarter" idx="5"/>
+          </p:nvPr>
+        </p:nvSpPr>
+        <p:spPr/>
+        <p:txBody>
+          <a:bodyPr/>
+          <a:lstStyle/>
+          <a:p>
+            <a:fld id="{438FB828-7FE4-42D1-BEA2-6A733FD1B12E}" type="slidenum">
+              <a:rPr lang="en-GB" smtClean="0"/>
+              <a:t>16</a:t>
+            </a:fld>
+            <a:endParaRPr lang="en-GB"/>
+          </a:p>
+        </p:txBody>
+      </p:sp>
+    </p:spTree>
+    <p:extLst>
+      <p:ext uri="{BB962C8B-B14F-4D97-AF65-F5344CB8AC3E}">
+        <p14:creationId xmlns:p14="http://schemas.microsoft.com/office/powerpoint/2010/main" val="839372585"/>
+      </p:ext>
+    </p:extLst>
+  </p:cSld>
+  <p:clrMapOvr>
+    <a:masterClrMapping/>
+  </p:clrMapOvr>
+</p:notes>
+</file>
+
 <file path=ppt/notesSlides/notesSlide2.xml><?xml version="1.0" encoding="utf-8"?>
 <p:notes xmlns:a="http://schemas.openxmlformats.org/drawingml/2006/main" xmlns:r="http://schemas.openxmlformats.org/officeDocument/2006/relationships" xmlns:p="http://schemas.openxmlformats.org/presentationml/2006/main">
   <p:cSld>
@@ -1335,6 +1420,149 @@
               <a:tabLst/>
               <a:defRPr/>
             </a:pPr>
+            <a:endParaRPr lang="en-US" sz="1200" dirty="0">
+              <a:solidFill>
+                <a:schemeClr val="bg1"/>
+              </a:solidFill>
+            </a:endParaRPr>
+          </a:p>
+          <a:p>
+            <a:pPr marL="0" marR="0" lvl="0" indent="0" algn="l" defTabSz="914400" rtl="0" eaLnBrk="1" fontAlgn="auto" latinLnBrk="0" hangingPunct="1">
+              <a:lnSpc>
+                <a:spcPct val="100000"/>
+              </a:lnSpc>
+              <a:spcBef>
+                <a:spcPts val="0"/>
+              </a:spcBef>
+              <a:spcAft>
+                <a:spcPts val="0"/>
+              </a:spcAft>
+              <a:buClrTx/>
+              <a:buSzTx/>
+              <a:buFontTx/>
+              <a:buNone/>
+              <a:tabLst/>
+              <a:defRPr/>
+            </a:pPr>
+            <a:r>
+              <a:rPr lang="en-US" sz="1200" dirty="0">
+                <a:solidFill>
+                  <a:schemeClr val="bg1"/>
+                </a:solidFill>
+              </a:rPr>
+              <a:t>Cognitive overload reduce stamina </a:t>
+            </a:r>
+            <a:r>
+              <a:rPr lang="en-US" sz="1200" dirty="0">
+                <a:solidFill>
+                  <a:schemeClr val="bg1"/>
+                </a:solidFill>
+                <a:sym typeface="Wingdings" panose="05000000000000000000" pitchFamily="2" charset="2"/>
+              </a:rPr>
+              <a:t> </a:t>
+            </a:r>
+            <a:r>
+              <a:rPr lang="en-US" sz="1200" dirty="0">
+                <a:solidFill>
+                  <a:schemeClr val="bg1"/>
+                </a:solidFill>
+              </a:rPr>
+              <a:t>Pit of failure. Like a broken window syndrome.</a:t>
+            </a:r>
+          </a:p>
+          <a:p>
+            <a:pPr marL="0" marR="0" lvl="0" indent="0" algn="l" defTabSz="914400" rtl="0" eaLnBrk="1" fontAlgn="auto" latinLnBrk="0" hangingPunct="1">
+              <a:lnSpc>
+                <a:spcPct val="100000"/>
+              </a:lnSpc>
+              <a:spcBef>
+                <a:spcPts val="0"/>
+              </a:spcBef>
+              <a:spcAft>
+                <a:spcPts val="0"/>
+              </a:spcAft>
+              <a:buClrTx/>
+              <a:buSzTx/>
+              <a:buFontTx/>
+              <a:buNone/>
+              <a:tabLst/>
+              <a:defRPr/>
+            </a:pPr>
+            <a:endParaRPr lang="en-US" sz="1200" dirty="0">
+              <a:solidFill>
+                <a:schemeClr val="bg1"/>
+              </a:solidFill>
+            </a:endParaRPr>
+          </a:p>
+          <a:p>
+            <a:pPr marL="0" marR="0" lvl="0" indent="0" algn="l" defTabSz="914400" rtl="0" eaLnBrk="1" fontAlgn="auto" latinLnBrk="0" hangingPunct="1">
+              <a:lnSpc>
+                <a:spcPct val="100000"/>
+              </a:lnSpc>
+              <a:spcBef>
+                <a:spcPts val="0"/>
+              </a:spcBef>
+              <a:spcAft>
+                <a:spcPts val="0"/>
+              </a:spcAft>
+              <a:buClrTx/>
+              <a:buSzTx/>
+              <a:buFontTx/>
+              <a:buNone/>
+              <a:tabLst/>
+              <a:defRPr/>
+            </a:pPr>
+            <a:r>
+              <a:rPr lang="en-US" sz="1200" dirty="0">
+                <a:solidFill>
+                  <a:schemeClr val="bg1"/>
+                </a:solidFill>
+              </a:rPr>
+              <a:t>https://www.welcometothejungle.com/en/articles/cognitive-overload-at-work</a:t>
+            </a:r>
+          </a:p>
+          <a:p>
+            <a:pPr marL="0" marR="0" lvl="0" indent="0" algn="l" defTabSz="914400" rtl="0" eaLnBrk="1" fontAlgn="auto" latinLnBrk="0" hangingPunct="1">
+              <a:lnSpc>
+                <a:spcPct val="100000"/>
+              </a:lnSpc>
+              <a:spcBef>
+                <a:spcPts val="0"/>
+              </a:spcBef>
+              <a:spcAft>
+                <a:spcPts val="0"/>
+              </a:spcAft>
+              <a:buClrTx/>
+              <a:buSzTx/>
+              <a:buFontTx/>
+              <a:buNone/>
+              <a:tabLst/>
+              <a:defRPr/>
+            </a:pPr>
+            <a:endParaRPr lang="en-US" sz="1200" dirty="0">
+              <a:solidFill>
+                <a:schemeClr val="bg1"/>
+              </a:solidFill>
+            </a:endParaRPr>
+          </a:p>
+          <a:p>
+            <a:pPr marL="0" marR="0" lvl="0" indent="0" algn="l" defTabSz="914400" rtl="0" eaLnBrk="1" fontAlgn="auto" latinLnBrk="0" hangingPunct="1">
+              <a:lnSpc>
+                <a:spcPct val="100000"/>
+              </a:lnSpc>
+              <a:spcBef>
+                <a:spcPts val="0"/>
+              </a:spcBef>
+              <a:spcAft>
+                <a:spcPts val="0"/>
+              </a:spcAft>
+              <a:buClrTx/>
+              <a:buSzTx/>
+              <a:buFontTx/>
+              <a:buNone/>
+              <a:tabLst/>
+              <a:defRPr/>
+            </a:pPr>
             <a:r>
               <a:rPr lang="en-US" sz="1200" dirty="0">
                 <a:solidFill>
@@ -1343,6 +1571,114 @@
               </a:rPr>
               <a:t>I could have added</a:t>
             </a:r>
+          </a:p>
+          <a:p>
+            <a:pPr marL="0" marR="0" lvl="0" indent="0" algn="l" defTabSz="914400" rtl="0" eaLnBrk="1" fontAlgn="auto" latinLnBrk="0" hangingPunct="1">
+              <a:lnSpc>
+                <a:spcPct val="100000"/>
+              </a:lnSpc>
+              <a:spcBef>
+                <a:spcPts val="0"/>
+              </a:spcBef>
+              <a:spcAft>
+                <a:spcPts val="0"/>
+              </a:spcAft>
+              <a:buClrTx/>
+              <a:buSzTx/>
+              <a:buFontTx/>
+              <a:buNone/>
+              <a:tabLst/>
+              <a:defRPr/>
+            </a:pPr>
+            <a:endParaRPr lang="en-US" sz="1200" dirty="0">
+              <a:solidFill>
+                <a:schemeClr val="bg1"/>
+              </a:solidFill>
+            </a:endParaRPr>
+          </a:p>
+          <a:p>
+            <a:pPr marL="0" marR="0" lvl="0" indent="0" algn="l" defTabSz="914400" rtl="0" eaLnBrk="1" fontAlgn="auto" latinLnBrk="0" hangingPunct="1">
+              <a:lnSpc>
+                <a:spcPct val="100000"/>
+              </a:lnSpc>
+              <a:spcBef>
+                <a:spcPts val="0"/>
+              </a:spcBef>
+              <a:spcAft>
+                <a:spcPts val="0"/>
+              </a:spcAft>
+              <a:buClrTx/>
+              <a:buSzTx/>
+              <a:buFontTx/>
+              <a:buNone/>
+              <a:tabLst/>
+              <a:defRPr/>
+            </a:pPr>
+            <a:r>
+              <a:rPr lang="en-US" sz="1200" dirty="0">
+                <a:solidFill>
+                  <a:schemeClr val="bg1"/>
+                </a:solidFill>
+              </a:rPr>
+              <a:t>Non deterministic </a:t>
+            </a:r>
+          </a:p>
+          <a:p>
+            <a:pPr marL="0" marR="0" lvl="0" indent="0" algn="l" defTabSz="914400" rtl="0" eaLnBrk="1" fontAlgn="auto" latinLnBrk="0" hangingPunct="1">
+              <a:lnSpc>
+                <a:spcPct val="100000"/>
+              </a:lnSpc>
+              <a:spcBef>
+                <a:spcPts val="0"/>
+              </a:spcBef>
+              <a:spcAft>
+                <a:spcPts val="0"/>
+              </a:spcAft>
+              <a:buClrTx/>
+              <a:buSzTx/>
+              <a:buFontTx/>
+              <a:buNone/>
+              <a:tabLst/>
+              <a:defRPr/>
+            </a:pPr>
+            <a:r>
+              <a:rPr lang="en-US" sz="1200" dirty="0">
+                <a:solidFill>
+                  <a:schemeClr val="bg1"/>
+                </a:solidFill>
+                <a:latin typeface="DK More Or Less" pitchFamily="50" charset="0"/>
+              </a:rPr>
+              <a:t> The team must be confident in their tests</a:t>
+            </a:r>
+            <a:endParaRPr lang="en-GB" sz="1200" dirty="0">
+              <a:solidFill>
+                <a:schemeClr val="bg1"/>
+              </a:solidFill>
+            </a:endParaRPr>
+          </a:p>
+          <a:p>
+            <a:pPr marL="0" marR="0" lvl="0" indent="0" algn="l" defTabSz="914400" rtl="0" eaLnBrk="1" fontAlgn="auto" latinLnBrk="0" hangingPunct="1">
+              <a:lnSpc>
+                <a:spcPct val="100000"/>
+              </a:lnSpc>
+              <a:spcBef>
+                <a:spcPts val="0"/>
+              </a:spcBef>
+              <a:spcAft>
+                <a:spcPts val="0"/>
+              </a:spcAft>
+              <a:buClrTx/>
+              <a:buSzTx/>
+              <a:buFontTx/>
+              <a:buNone/>
+              <a:tabLst/>
+              <a:defRPr/>
+            </a:pPr>
+            <a:endParaRPr lang="en-US" sz="1200" dirty="0">
+              <a:solidFill>
+                <a:schemeClr val="bg1"/>
+              </a:solidFill>
+            </a:endParaRPr>
           </a:p>
           <a:p>
             <a:pPr marL="0" marR="0" lvl="0" indent="0" algn="l" defTabSz="914400" rtl="0" eaLnBrk="1" fontAlgn="auto" latinLnBrk="0" hangingPunct="1">
@@ -2258,7 +2594,7 @@
           <a:p>
             <a:fld id="{C3070225-B319-4CE6-A337-0510C50468FF}" type="datetimeFigureOut">
               <a:rPr lang="en-GB" smtClean="0"/>
-              <a:t>07/02/2021</a:t>
+              <a:t>08/02/2021</a:t>
             </a:fld>
             <a:endParaRPr lang="en-GB"/>
           </a:p>
@@ -2564,7 +2900,7 @@
           <a:p>
             <a:fld id="{C3070225-B319-4CE6-A337-0510C50468FF}" type="datetimeFigureOut">
               <a:rPr lang="en-GB" smtClean="0"/>
-              <a:t>07/02/2021</a:t>
+              <a:t>08/02/2021</a:t>
             </a:fld>
             <a:endParaRPr lang="en-GB"/>
           </a:p>
@@ -2942,7 +3278,7 @@
           <a:p>
             <a:fld id="{C3070225-B319-4CE6-A337-0510C50468FF}" type="datetimeFigureOut">
               <a:rPr lang="en-GB" smtClean="0"/>
-              <a:t>07/02/2021</a:t>
+              <a:t>08/02/2021</a:t>
             </a:fld>
             <a:endParaRPr lang="en-GB"/>
           </a:p>
@@ -3435,7 +3771,7 @@
           <a:p>
             <a:fld id="{C3070225-B319-4CE6-A337-0510C50468FF}" type="datetimeFigureOut">
               <a:rPr lang="en-GB" smtClean="0"/>
-              <a:t>07/02/2021</a:t>
+              <a:t>08/02/2021</a:t>
             </a:fld>
             <a:endParaRPr lang="en-GB"/>
           </a:p>
@@ -3599,7 +3935,7 @@
           <a:p>
             <a:fld id="{C3070225-B319-4CE6-A337-0510C50468FF}" type="datetimeFigureOut">
               <a:rPr lang="en-GB" smtClean="0"/>
-              <a:t>07/02/2021</a:t>
+              <a:t>08/02/2021</a:t>
             </a:fld>
             <a:endParaRPr lang="en-GB"/>
           </a:p>
@@ -7807,6 +8143,43 @@
           </a:p>
         </p:txBody>
       </p:sp>
+      <p:sp>
+        <p:nvSpPr>
+          <p:cNvPr id="49" name="TextBox 48">
+            <a:extLst>
+              <a:ext uri="{FF2B5EF4-FFF2-40B4-BE49-F238E27FC236}">
+                <a16:creationId xmlns:a16="http://schemas.microsoft.com/office/drawing/2014/main" id="{75C54B74-4D0D-4180-966F-5EC7F878C3C0}"/>
+              </a:ext>
+            </a:extLst>
+          </p:cNvPr>
+          <p:cNvSpPr txBox="1"/>
+          <p:nvPr/>
+        </p:nvSpPr>
+        <p:spPr>
+          <a:xfrm>
+            <a:off x="9988550" y="2508250"/>
+            <a:ext cx="596900" cy="369332"/>
+          </a:xfrm>
+          <a:prstGeom prst="rect">
+            <a:avLst/>
+          </a:prstGeom>
+          <a:noFill/>
+        </p:spPr>
+        <p:txBody>
+          <a:bodyPr wrap="square" rtlCol="0">
+            <a:spAutoFit/>
+          </a:bodyPr>
+          <a:lstStyle/>
+          <a:p>
+            <a:r>
+              <a:rPr lang="en-GB" b="1" dirty="0">
+                <a:latin typeface="Alte Haas Grotesk" panose="02000503000000020004" pitchFamily="2" charset="0"/>
+              </a:rPr>
+              <a:t>API</a:t>
+            </a:r>
+          </a:p>
+        </p:txBody>
+      </p:sp>
     </p:spTree>
     <p:extLst>
       <p:ext uri="{BB962C8B-B14F-4D97-AF65-F5344CB8AC3E}">
@@ -10064,6 +10437,43 @@
             <a:r>
               <a:rPr lang="en-GB" dirty="0"/>
               <a:t>uses</a:t>
+            </a:r>
+          </a:p>
+        </p:txBody>
+      </p:sp>
+      <p:sp>
+        <p:nvSpPr>
+          <p:cNvPr id="49" name="TextBox 48">
+            <a:extLst>
+              <a:ext uri="{FF2B5EF4-FFF2-40B4-BE49-F238E27FC236}">
+                <a16:creationId xmlns:a16="http://schemas.microsoft.com/office/drawing/2014/main" id="{5DA4EE5C-A876-4E3A-AFAA-C96D3416E783}"/>
+              </a:ext>
+            </a:extLst>
+          </p:cNvPr>
+          <p:cNvSpPr txBox="1"/>
+          <p:nvPr/>
+        </p:nvSpPr>
+        <p:spPr>
+          <a:xfrm>
+            <a:off x="9988550" y="2508250"/>
+            <a:ext cx="596900" cy="369332"/>
+          </a:xfrm>
+          <a:prstGeom prst="rect">
+            <a:avLst/>
+          </a:prstGeom>
+          <a:noFill/>
+        </p:spPr>
+        <p:txBody>
+          <a:bodyPr wrap="square" rtlCol="0">
+            <a:spAutoFit/>
+          </a:bodyPr>
+          <a:lstStyle/>
+          <a:p>
+            <a:r>
+              <a:rPr lang="en-GB" b="1" dirty="0">
+                <a:latin typeface="Alte Haas Grotesk" panose="02000503000000020004" pitchFamily="2" charset="0"/>
+              </a:rPr>
+              <a:t>API</a:t>
             </a:r>
           </a:p>
         </p:txBody>
@@ -14563,6 +14973,1022 @@
 </p:sld>
 </file>
 
+<file path=ppt/slides/slide16.xml><?xml version="1.0" encoding="utf-8"?>
+<p:sld xmlns:a="http://schemas.openxmlformats.org/drawingml/2006/main" xmlns:r="http://schemas.openxmlformats.org/officeDocument/2006/relationships" xmlns:p="http://schemas.openxmlformats.org/presentationml/2006/main">
+  <p:cSld>
+    <p:bg>
+      <p:bgPr>
+        <a:solidFill>
+          <a:schemeClr val="tx1"/>
+        </a:solidFill>
+        <a:effectLst/>
+      </p:bgPr>
+    </p:bg>
+    <p:spTree>
+      <p:nvGrpSpPr>
+        <p:cNvPr id="1" name=""/>
+        <p:cNvGrpSpPr/>
+        <p:nvPr/>
+      </p:nvGrpSpPr>
+      <p:grpSpPr>
+        <a:xfrm>
+          <a:off x="0" y="0"/>
+          <a:ext cx="0" cy="0"/>
+          <a:chOff x="0" y="0"/>
+          <a:chExt cx="0" cy="0"/>
+        </a:xfrm>
+      </p:grpSpPr>
+      <p:sp>
+        <p:nvSpPr>
+          <p:cNvPr id="2" name="Flowchart: Magnetic Disk 1">
+            <a:extLst>
+              <a:ext uri="{FF2B5EF4-FFF2-40B4-BE49-F238E27FC236}">
+                <a16:creationId xmlns:a16="http://schemas.microsoft.com/office/drawing/2014/main" id="{DA91C794-7AC0-40C3-9A17-238CC87E3259}"/>
+              </a:ext>
+            </a:extLst>
+          </p:cNvPr>
+          <p:cNvSpPr/>
+          <p:nvPr/>
+        </p:nvSpPr>
+        <p:spPr>
+          <a:xfrm>
+            <a:off x="3698923" y="3220992"/>
+            <a:ext cx="331656" cy="416016"/>
+          </a:xfrm>
+          <a:prstGeom prst="flowChartMagneticDisk">
+            <a:avLst/>
+          </a:prstGeom>
+          <a:solidFill>
+            <a:srgbClr val="BF9000"/>
+          </a:solidFill>
+          <a:ln>
+            <a:solidFill>
+              <a:schemeClr val="bg1"/>
+            </a:solidFill>
+          </a:ln>
+        </p:spPr>
+        <p:style>
+          <a:lnRef idx="2">
+            <a:schemeClr val="accent1">
+              <a:shade val="50000"/>
+            </a:schemeClr>
+          </a:lnRef>
+          <a:fillRef idx="1">
+            <a:schemeClr val="accent1"/>
+          </a:fillRef>
+          <a:effectRef idx="0">
+            <a:schemeClr val="accent1"/>
+          </a:effectRef>
+          <a:fontRef idx="minor">
+            <a:schemeClr val="lt1"/>
+          </a:fontRef>
+        </p:style>
+        <p:txBody>
+          <a:bodyPr rtlCol="0" anchor="ctr"/>
+          <a:lstStyle/>
+          <a:p>
+            <a:pPr algn="ctr"/>
+            <a:endParaRPr lang="en-GB"/>
+          </a:p>
+        </p:txBody>
+      </p:sp>
+      <p:sp>
+        <p:nvSpPr>
+          <p:cNvPr id="7" name="Oval 6">
+            <a:extLst>
+              <a:ext uri="{FF2B5EF4-FFF2-40B4-BE49-F238E27FC236}">
+                <a16:creationId xmlns:a16="http://schemas.microsoft.com/office/drawing/2014/main" id="{0BAF997D-3F0D-42FD-8C53-4CAE1402940E}"/>
+              </a:ext>
+            </a:extLst>
+          </p:cNvPr>
+          <p:cNvSpPr/>
+          <p:nvPr/>
+        </p:nvSpPr>
+        <p:spPr>
+          <a:xfrm>
+            <a:off x="4999629" y="3220992"/>
+            <a:ext cx="1039625" cy="1039625"/>
+          </a:xfrm>
+          <a:prstGeom prst="ellipse">
+            <a:avLst/>
+          </a:prstGeom>
+          <a:solidFill>
+            <a:srgbClr val="BF9000"/>
+          </a:solidFill>
+          <a:ln w="44450">
+            <a:solidFill>
+              <a:schemeClr val="bg1"/>
+            </a:solidFill>
+          </a:ln>
+        </p:spPr>
+        <p:style>
+          <a:lnRef idx="2">
+            <a:schemeClr val="accent1">
+              <a:shade val="50000"/>
+            </a:schemeClr>
+          </a:lnRef>
+          <a:fillRef idx="1">
+            <a:schemeClr val="accent1"/>
+          </a:fillRef>
+          <a:effectRef idx="0">
+            <a:schemeClr val="accent1"/>
+          </a:effectRef>
+          <a:fontRef idx="minor">
+            <a:schemeClr val="lt1"/>
+          </a:fontRef>
+        </p:style>
+        <p:txBody>
+          <a:bodyPr rtlCol="0" anchor="ctr"/>
+          <a:lstStyle/>
+          <a:p>
+            <a:pPr algn="ctr"/>
+            <a:endParaRPr lang="en-GB"/>
+          </a:p>
+        </p:txBody>
+      </p:sp>
+      <p:sp>
+        <p:nvSpPr>
+          <p:cNvPr id="22" name="Oval 21">
+            <a:extLst>
+              <a:ext uri="{FF2B5EF4-FFF2-40B4-BE49-F238E27FC236}">
+                <a16:creationId xmlns:a16="http://schemas.microsoft.com/office/drawing/2014/main" id="{9CFE85D8-E8C4-4548-9CB8-384539171106}"/>
+              </a:ext>
+            </a:extLst>
+          </p:cNvPr>
+          <p:cNvSpPr/>
+          <p:nvPr/>
+        </p:nvSpPr>
+        <p:spPr>
+          <a:xfrm>
+            <a:off x="5129284" y="3373393"/>
+            <a:ext cx="770978" cy="770978"/>
+          </a:xfrm>
+          <a:prstGeom prst="ellipse">
+            <a:avLst/>
+          </a:prstGeom>
+          <a:solidFill>
+            <a:srgbClr val="BF9000"/>
+          </a:solidFill>
+          <a:ln w="44450">
+            <a:solidFill>
+              <a:schemeClr val="bg1"/>
+            </a:solidFill>
+          </a:ln>
+        </p:spPr>
+        <p:style>
+          <a:lnRef idx="2">
+            <a:schemeClr val="accent1">
+              <a:shade val="50000"/>
+            </a:schemeClr>
+          </a:lnRef>
+          <a:fillRef idx="1">
+            <a:schemeClr val="accent1"/>
+          </a:fillRef>
+          <a:effectRef idx="0">
+            <a:schemeClr val="accent1"/>
+          </a:effectRef>
+          <a:fontRef idx="minor">
+            <a:schemeClr val="lt1"/>
+          </a:fontRef>
+        </p:style>
+        <p:txBody>
+          <a:bodyPr rtlCol="0" anchor="ctr"/>
+          <a:lstStyle/>
+          <a:p>
+            <a:pPr algn="ctr"/>
+            <a:endParaRPr lang="en-GB"/>
+          </a:p>
+        </p:txBody>
+      </p:sp>
+      <p:sp>
+        <p:nvSpPr>
+          <p:cNvPr id="23" name="Oval 22">
+            <a:extLst>
+              <a:ext uri="{FF2B5EF4-FFF2-40B4-BE49-F238E27FC236}">
+                <a16:creationId xmlns:a16="http://schemas.microsoft.com/office/drawing/2014/main" id="{B7FC929D-3BFB-4DEF-8047-246E75D4EA13}"/>
+              </a:ext>
+            </a:extLst>
+          </p:cNvPr>
+          <p:cNvSpPr/>
+          <p:nvPr/>
+        </p:nvSpPr>
+        <p:spPr>
+          <a:xfrm>
+            <a:off x="5250975" y="3525792"/>
+            <a:ext cx="540225" cy="540225"/>
+          </a:xfrm>
+          <a:prstGeom prst="ellipse">
+            <a:avLst/>
+          </a:prstGeom>
+          <a:solidFill>
+            <a:srgbClr val="BF9000"/>
+          </a:solidFill>
+          <a:ln w="44450">
+            <a:solidFill>
+              <a:schemeClr val="bg1"/>
+            </a:solidFill>
+          </a:ln>
+        </p:spPr>
+        <p:style>
+          <a:lnRef idx="2">
+            <a:schemeClr val="accent1">
+              <a:shade val="50000"/>
+            </a:schemeClr>
+          </a:lnRef>
+          <a:fillRef idx="1">
+            <a:schemeClr val="accent1"/>
+          </a:fillRef>
+          <a:effectRef idx="0">
+            <a:schemeClr val="accent1"/>
+          </a:effectRef>
+          <a:fontRef idx="minor">
+            <a:schemeClr val="lt1"/>
+          </a:fontRef>
+        </p:style>
+        <p:txBody>
+          <a:bodyPr rtlCol="0" anchor="ctr"/>
+          <a:lstStyle/>
+          <a:p>
+            <a:pPr algn="ctr"/>
+            <a:endParaRPr lang="en-GB"/>
+          </a:p>
+        </p:txBody>
+      </p:sp>
+      <p:sp>
+        <p:nvSpPr>
+          <p:cNvPr id="3" name="Partial Circle 2">
+            <a:extLst>
+              <a:ext uri="{FF2B5EF4-FFF2-40B4-BE49-F238E27FC236}">
+                <a16:creationId xmlns:a16="http://schemas.microsoft.com/office/drawing/2014/main" id="{FE009069-3E71-43BC-B220-6816391BFD93}"/>
+              </a:ext>
+            </a:extLst>
+          </p:cNvPr>
+          <p:cNvSpPr/>
+          <p:nvPr/>
+        </p:nvSpPr>
+        <p:spPr>
+          <a:xfrm rot="18900000">
+            <a:off x="4958014" y="3184883"/>
+            <a:ext cx="1127406" cy="1127406"/>
+          </a:xfrm>
+          <a:prstGeom prst="pie">
+            <a:avLst/>
+          </a:prstGeom>
+          <a:solidFill>
+            <a:schemeClr val="tx1"/>
+          </a:solidFill>
+          <a:ln>
+            <a:noFill/>
+          </a:ln>
+        </p:spPr>
+        <p:style>
+          <a:lnRef idx="2">
+            <a:schemeClr val="accent1">
+              <a:shade val="50000"/>
+            </a:schemeClr>
+          </a:lnRef>
+          <a:fillRef idx="1">
+            <a:schemeClr val="accent1"/>
+          </a:fillRef>
+          <a:effectRef idx="0">
+            <a:schemeClr val="accent1"/>
+          </a:effectRef>
+          <a:fontRef idx="minor">
+            <a:schemeClr val="lt1"/>
+          </a:fontRef>
+        </p:style>
+        <p:txBody>
+          <a:bodyPr rtlCol="0" anchor="ctr"/>
+          <a:lstStyle/>
+          <a:p>
+            <a:pPr algn="ctr"/>
+            <a:endParaRPr lang="en-GB">
+              <a:solidFill>
+                <a:schemeClr val="tx1"/>
+              </a:solidFill>
+            </a:endParaRPr>
+          </a:p>
+        </p:txBody>
+      </p:sp>
+      <p:sp>
+        <p:nvSpPr>
+          <p:cNvPr id="25" name="Oval 24">
+            <a:extLst>
+              <a:ext uri="{FF2B5EF4-FFF2-40B4-BE49-F238E27FC236}">
+                <a16:creationId xmlns:a16="http://schemas.microsoft.com/office/drawing/2014/main" id="{1305BF0A-1D79-4CB2-8FD8-F77E172653A9}"/>
+              </a:ext>
+            </a:extLst>
+          </p:cNvPr>
+          <p:cNvSpPr/>
+          <p:nvPr/>
+        </p:nvSpPr>
+        <p:spPr>
+          <a:xfrm>
+            <a:off x="7640471" y="3234643"/>
+            <a:ext cx="1039625" cy="1039625"/>
+          </a:xfrm>
+          <a:prstGeom prst="ellipse">
+            <a:avLst/>
+          </a:prstGeom>
+          <a:solidFill>
+            <a:schemeClr val="bg1"/>
+          </a:solidFill>
+          <a:ln w="44450">
+            <a:solidFill>
+              <a:srgbClr val="BF9000"/>
+            </a:solidFill>
+          </a:ln>
+        </p:spPr>
+        <p:style>
+          <a:lnRef idx="2">
+            <a:schemeClr val="accent1">
+              <a:shade val="50000"/>
+            </a:schemeClr>
+          </a:lnRef>
+          <a:fillRef idx="1">
+            <a:schemeClr val="accent1"/>
+          </a:fillRef>
+          <a:effectRef idx="0">
+            <a:schemeClr val="accent1"/>
+          </a:effectRef>
+          <a:fontRef idx="minor">
+            <a:schemeClr val="lt1"/>
+          </a:fontRef>
+        </p:style>
+        <p:txBody>
+          <a:bodyPr rtlCol="0" anchor="ctr"/>
+          <a:lstStyle/>
+          <a:p>
+            <a:pPr algn="ctr"/>
+            <a:endParaRPr lang="en-GB"/>
+          </a:p>
+        </p:txBody>
+      </p:sp>
+      <p:sp>
+        <p:nvSpPr>
+          <p:cNvPr id="27" name="Oval 26">
+            <a:extLst>
+              <a:ext uri="{FF2B5EF4-FFF2-40B4-BE49-F238E27FC236}">
+                <a16:creationId xmlns:a16="http://schemas.microsoft.com/office/drawing/2014/main" id="{BFAB367F-3347-40CC-87D5-F94B71A7A49E}"/>
+              </a:ext>
+            </a:extLst>
+          </p:cNvPr>
+          <p:cNvSpPr/>
+          <p:nvPr/>
+        </p:nvSpPr>
+        <p:spPr>
+          <a:xfrm>
+            <a:off x="7770126" y="3387044"/>
+            <a:ext cx="770978" cy="770978"/>
+          </a:xfrm>
+          <a:prstGeom prst="ellipse">
+            <a:avLst/>
+          </a:prstGeom>
+          <a:solidFill>
+            <a:schemeClr val="bg1"/>
+          </a:solidFill>
+          <a:ln w="44450">
+            <a:solidFill>
+              <a:srgbClr val="BF9000"/>
+            </a:solidFill>
+          </a:ln>
+        </p:spPr>
+        <p:style>
+          <a:lnRef idx="2">
+            <a:schemeClr val="accent1">
+              <a:shade val="50000"/>
+            </a:schemeClr>
+          </a:lnRef>
+          <a:fillRef idx="1">
+            <a:schemeClr val="accent1"/>
+          </a:fillRef>
+          <a:effectRef idx="0">
+            <a:schemeClr val="accent1"/>
+          </a:effectRef>
+          <a:fontRef idx="minor">
+            <a:schemeClr val="lt1"/>
+          </a:fontRef>
+        </p:style>
+        <p:txBody>
+          <a:bodyPr rtlCol="0" anchor="ctr"/>
+          <a:lstStyle/>
+          <a:p>
+            <a:pPr algn="ctr"/>
+            <a:endParaRPr lang="en-GB"/>
+          </a:p>
+        </p:txBody>
+      </p:sp>
+      <p:sp>
+        <p:nvSpPr>
+          <p:cNvPr id="28" name="Oval 27">
+            <a:extLst>
+              <a:ext uri="{FF2B5EF4-FFF2-40B4-BE49-F238E27FC236}">
+                <a16:creationId xmlns:a16="http://schemas.microsoft.com/office/drawing/2014/main" id="{88C89A24-4A51-4298-AED8-1C048C697448}"/>
+              </a:ext>
+            </a:extLst>
+          </p:cNvPr>
+          <p:cNvSpPr/>
+          <p:nvPr/>
+        </p:nvSpPr>
+        <p:spPr>
+          <a:xfrm>
+            <a:off x="7891817" y="3539443"/>
+            <a:ext cx="540225" cy="540225"/>
+          </a:xfrm>
+          <a:prstGeom prst="ellipse">
+            <a:avLst/>
+          </a:prstGeom>
+          <a:solidFill>
+            <a:schemeClr val="bg1"/>
+          </a:solidFill>
+          <a:ln w="44450">
+            <a:solidFill>
+              <a:srgbClr val="BF9000"/>
+            </a:solidFill>
+          </a:ln>
+        </p:spPr>
+        <p:style>
+          <a:lnRef idx="2">
+            <a:schemeClr val="accent1">
+              <a:shade val="50000"/>
+            </a:schemeClr>
+          </a:lnRef>
+          <a:fillRef idx="1">
+            <a:schemeClr val="accent1"/>
+          </a:fillRef>
+          <a:effectRef idx="0">
+            <a:schemeClr val="accent1"/>
+          </a:effectRef>
+          <a:fontRef idx="minor">
+            <a:schemeClr val="lt1"/>
+          </a:fontRef>
+        </p:style>
+        <p:txBody>
+          <a:bodyPr rtlCol="0" anchor="ctr"/>
+          <a:lstStyle/>
+          <a:p>
+            <a:pPr algn="ctr"/>
+            <a:endParaRPr lang="en-GB"/>
+          </a:p>
+        </p:txBody>
+      </p:sp>
+      <p:sp>
+        <p:nvSpPr>
+          <p:cNvPr id="29" name="Oval 28">
+            <a:extLst>
+              <a:ext uri="{FF2B5EF4-FFF2-40B4-BE49-F238E27FC236}">
+                <a16:creationId xmlns:a16="http://schemas.microsoft.com/office/drawing/2014/main" id="{10B218A3-34B8-487E-B03A-11A3C771DCE1}"/>
+              </a:ext>
+            </a:extLst>
+          </p:cNvPr>
+          <p:cNvSpPr/>
+          <p:nvPr/>
+        </p:nvSpPr>
+        <p:spPr>
+          <a:xfrm flipH="1">
+            <a:off x="8122693" y="3687294"/>
+            <a:ext cx="76199" cy="76199"/>
+          </a:xfrm>
+          <a:prstGeom prst="ellipse">
+            <a:avLst/>
+          </a:prstGeom>
+          <a:solidFill>
+            <a:srgbClr val="BF9000"/>
+          </a:solidFill>
+          <a:ln w="44450">
+            <a:solidFill>
+              <a:srgbClr val="BF9000"/>
+            </a:solidFill>
+          </a:ln>
+        </p:spPr>
+        <p:style>
+          <a:lnRef idx="2">
+            <a:schemeClr val="accent1">
+              <a:shade val="50000"/>
+            </a:schemeClr>
+          </a:lnRef>
+          <a:fillRef idx="1">
+            <a:schemeClr val="accent1"/>
+          </a:fillRef>
+          <a:effectRef idx="0">
+            <a:schemeClr val="accent1"/>
+          </a:effectRef>
+          <a:fontRef idx="minor">
+            <a:schemeClr val="lt1"/>
+          </a:fontRef>
+        </p:style>
+        <p:txBody>
+          <a:bodyPr rtlCol="0" anchor="ctr"/>
+          <a:lstStyle/>
+          <a:p>
+            <a:pPr algn="ctr"/>
+            <a:endParaRPr lang="en-GB"/>
+          </a:p>
+        </p:txBody>
+      </p:sp>
+      <p:sp>
+        <p:nvSpPr>
+          <p:cNvPr id="30" name="Partial Circle 29">
+            <a:extLst>
+              <a:ext uri="{FF2B5EF4-FFF2-40B4-BE49-F238E27FC236}">
+                <a16:creationId xmlns:a16="http://schemas.microsoft.com/office/drawing/2014/main" id="{132AF28A-6ED5-464A-9FF7-F0BB7CBE86F5}"/>
+              </a:ext>
+            </a:extLst>
+          </p:cNvPr>
+          <p:cNvSpPr/>
+          <p:nvPr/>
+        </p:nvSpPr>
+        <p:spPr>
+          <a:xfrm rot="18900000">
+            <a:off x="7598856" y="3198534"/>
+            <a:ext cx="1127406" cy="1127406"/>
+          </a:xfrm>
+          <a:prstGeom prst="pie">
+            <a:avLst/>
+          </a:prstGeom>
+          <a:solidFill>
+            <a:schemeClr val="tx1"/>
+          </a:solidFill>
+          <a:ln>
+            <a:noFill/>
+          </a:ln>
+        </p:spPr>
+        <p:style>
+          <a:lnRef idx="2">
+            <a:schemeClr val="accent1">
+              <a:shade val="50000"/>
+            </a:schemeClr>
+          </a:lnRef>
+          <a:fillRef idx="1">
+            <a:schemeClr val="accent1"/>
+          </a:fillRef>
+          <a:effectRef idx="0">
+            <a:schemeClr val="accent1"/>
+          </a:effectRef>
+          <a:fontRef idx="minor">
+            <a:schemeClr val="lt1"/>
+          </a:fontRef>
+        </p:style>
+        <p:txBody>
+          <a:bodyPr rtlCol="0" anchor="ctr"/>
+          <a:lstStyle/>
+          <a:p>
+            <a:pPr algn="ctr"/>
+            <a:endParaRPr lang="en-GB">
+              <a:solidFill>
+                <a:schemeClr val="tx1"/>
+              </a:solidFill>
+            </a:endParaRPr>
+          </a:p>
+        </p:txBody>
+      </p:sp>
+      <p:sp>
+        <p:nvSpPr>
+          <p:cNvPr id="24" name="Oval 23">
+            <a:extLst>
+              <a:ext uri="{FF2B5EF4-FFF2-40B4-BE49-F238E27FC236}">
+                <a16:creationId xmlns:a16="http://schemas.microsoft.com/office/drawing/2014/main" id="{50459FC4-1D4A-462E-84D6-672D42F634F9}"/>
+              </a:ext>
+            </a:extLst>
+          </p:cNvPr>
+          <p:cNvSpPr/>
+          <p:nvPr/>
+        </p:nvSpPr>
+        <p:spPr>
+          <a:xfrm flipH="1">
+            <a:off x="5481851" y="3673643"/>
+            <a:ext cx="76199" cy="76199"/>
+          </a:xfrm>
+          <a:prstGeom prst="ellipse">
+            <a:avLst/>
+          </a:prstGeom>
+          <a:solidFill>
+            <a:schemeClr val="bg1"/>
+          </a:solidFill>
+          <a:ln w="44450">
+            <a:solidFill>
+              <a:schemeClr val="bg1"/>
+            </a:solidFill>
+          </a:ln>
+        </p:spPr>
+        <p:style>
+          <a:lnRef idx="2">
+            <a:schemeClr val="accent1">
+              <a:shade val="50000"/>
+            </a:schemeClr>
+          </a:lnRef>
+          <a:fillRef idx="1">
+            <a:schemeClr val="accent1"/>
+          </a:fillRef>
+          <a:effectRef idx="0">
+            <a:schemeClr val="accent1"/>
+          </a:effectRef>
+          <a:fontRef idx="minor">
+            <a:schemeClr val="lt1"/>
+          </a:fontRef>
+        </p:style>
+        <p:txBody>
+          <a:bodyPr rtlCol="0" anchor="ctr"/>
+          <a:lstStyle/>
+          <a:p>
+            <a:pPr algn="ctr"/>
+            <a:endParaRPr lang="en-GB"/>
+          </a:p>
+        </p:txBody>
+      </p:sp>
+      <p:sp>
+        <p:nvSpPr>
+          <p:cNvPr id="37" name="Oval 36">
+            <a:extLst>
+              <a:ext uri="{FF2B5EF4-FFF2-40B4-BE49-F238E27FC236}">
+                <a16:creationId xmlns:a16="http://schemas.microsoft.com/office/drawing/2014/main" id="{40F552FC-03BB-4B91-8BA5-78704F6DEC85}"/>
+              </a:ext>
+            </a:extLst>
+          </p:cNvPr>
+          <p:cNvSpPr/>
+          <p:nvPr/>
+        </p:nvSpPr>
+        <p:spPr>
+          <a:xfrm>
+            <a:off x="1603610" y="4561047"/>
+            <a:ext cx="1039625" cy="1039625"/>
+          </a:xfrm>
+          <a:prstGeom prst="ellipse">
+            <a:avLst/>
+          </a:prstGeom>
+          <a:solidFill>
+            <a:schemeClr val="tx1"/>
+          </a:solidFill>
+          <a:ln w="69850">
+            <a:solidFill>
+              <a:srgbClr val="BF9000"/>
+            </a:solidFill>
+          </a:ln>
+        </p:spPr>
+        <p:style>
+          <a:lnRef idx="2">
+            <a:schemeClr val="accent1">
+              <a:shade val="50000"/>
+            </a:schemeClr>
+          </a:lnRef>
+          <a:fillRef idx="1">
+            <a:schemeClr val="accent1"/>
+          </a:fillRef>
+          <a:effectRef idx="0">
+            <a:schemeClr val="accent1"/>
+          </a:effectRef>
+          <a:fontRef idx="minor">
+            <a:schemeClr val="lt1"/>
+          </a:fontRef>
+        </p:style>
+        <p:txBody>
+          <a:bodyPr rtlCol="0" anchor="ctr"/>
+          <a:lstStyle/>
+          <a:p>
+            <a:pPr algn="ctr"/>
+            <a:endParaRPr lang="en-GB"/>
+          </a:p>
+        </p:txBody>
+      </p:sp>
+      <p:sp>
+        <p:nvSpPr>
+          <p:cNvPr id="38" name="Oval 37">
+            <a:extLst>
+              <a:ext uri="{FF2B5EF4-FFF2-40B4-BE49-F238E27FC236}">
+                <a16:creationId xmlns:a16="http://schemas.microsoft.com/office/drawing/2014/main" id="{1CCAEBBA-350F-4BCC-9247-A87357D5CB59}"/>
+              </a:ext>
+            </a:extLst>
+          </p:cNvPr>
+          <p:cNvSpPr/>
+          <p:nvPr/>
+        </p:nvSpPr>
+        <p:spPr>
+          <a:xfrm>
+            <a:off x="1733265" y="4713448"/>
+            <a:ext cx="770978" cy="770978"/>
+          </a:xfrm>
+          <a:prstGeom prst="ellipse">
+            <a:avLst/>
+          </a:prstGeom>
+          <a:solidFill>
+            <a:schemeClr val="tx1"/>
+          </a:solidFill>
+          <a:ln w="69850">
+            <a:solidFill>
+              <a:srgbClr val="BF9000"/>
+            </a:solidFill>
+          </a:ln>
+        </p:spPr>
+        <p:style>
+          <a:lnRef idx="2">
+            <a:schemeClr val="accent1">
+              <a:shade val="50000"/>
+            </a:schemeClr>
+          </a:lnRef>
+          <a:fillRef idx="1">
+            <a:schemeClr val="accent1"/>
+          </a:fillRef>
+          <a:effectRef idx="0">
+            <a:schemeClr val="accent1"/>
+          </a:effectRef>
+          <a:fontRef idx="minor">
+            <a:schemeClr val="lt1"/>
+          </a:fontRef>
+        </p:style>
+        <p:txBody>
+          <a:bodyPr rtlCol="0" anchor="ctr"/>
+          <a:lstStyle/>
+          <a:p>
+            <a:pPr algn="ctr"/>
+            <a:endParaRPr lang="en-GB"/>
+          </a:p>
+        </p:txBody>
+      </p:sp>
+      <p:sp>
+        <p:nvSpPr>
+          <p:cNvPr id="39" name="Oval 38">
+            <a:extLst>
+              <a:ext uri="{FF2B5EF4-FFF2-40B4-BE49-F238E27FC236}">
+                <a16:creationId xmlns:a16="http://schemas.microsoft.com/office/drawing/2014/main" id="{02632437-32BA-48F3-8D4F-D1CA740B90FF}"/>
+              </a:ext>
+            </a:extLst>
+          </p:cNvPr>
+          <p:cNvSpPr/>
+          <p:nvPr/>
+        </p:nvSpPr>
+        <p:spPr>
+          <a:xfrm>
+            <a:off x="1854956" y="4865847"/>
+            <a:ext cx="540225" cy="540225"/>
+          </a:xfrm>
+          <a:prstGeom prst="ellipse">
+            <a:avLst/>
+          </a:prstGeom>
+          <a:solidFill>
+            <a:schemeClr val="tx1"/>
+          </a:solidFill>
+          <a:ln w="69850">
+            <a:solidFill>
+              <a:srgbClr val="BF9000"/>
+            </a:solidFill>
+          </a:ln>
+        </p:spPr>
+        <p:style>
+          <a:lnRef idx="2">
+            <a:schemeClr val="accent1">
+              <a:shade val="50000"/>
+            </a:schemeClr>
+          </a:lnRef>
+          <a:fillRef idx="1">
+            <a:schemeClr val="accent1"/>
+          </a:fillRef>
+          <a:effectRef idx="0">
+            <a:schemeClr val="accent1"/>
+          </a:effectRef>
+          <a:fontRef idx="minor">
+            <a:schemeClr val="lt1"/>
+          </a:fontRef>
+        </p:style>
+        <p:txBody>
+          <a:bodyPr rtlCol="0" anchor="ctr"/>
+          <a:lstStyle/>
+          <a:p>
+            <a:pPr algn="ctr"/>
+            <a:endParaRPr lang="en-GB"/>
+          </a:p>
+        </p:txBody>
+      </p:sp>
+      <p:sp>
+        <p:nvSpPr>
+          <p:cNvPr id="40" name="Partial Circle 39">
+            <a:extLst>
+              <a:ext uri="{FF2B5EF4-FFF2-40B4-BE49-F238E27FC236}">
+                <a16:creationId xmlns:a16="http://schemas.microsoft.com/office/drawing/2014/main" id="{092A2B99-3523-42E7-9F1C-CE87B546E921}"/>
+              </a:ext>
+            </a:extLst>
+          </p:cNvPr>
+          <p:cNvSpPr/>
+          <p:nvPr/>
+        </p:nvSpPr>
+        <p:spPr>
+          <a:xfrm rot="18900000">
+            <a:off x="1561995" y="4524938"/>
+            <a:ext cx="1127406" cy="1127406"/>
+          </a:xfrm>
+          <a:prstGeom prst="pie">
+            <a:avLst/>
+          </a:prstGeom>
+          <a:solidFill>
+            <a:schemeClr val="tx1"/>
+          </a:solidFill>
+          <a:ln>
+            <a:noFill/>
+          </a:ln>
+        </p:spPr>
+        <p:style>
+          <a:lnRef idx="2">
+            <a:schemeClr val="accent1">
+              <a:shade val="50000"/>
+            </a:schemeClr>
+          </a:lnRef>
+          <a:fillRef idx="1">
+            <a:schemeClr val="accent1"/>
+          </a:fillRef>
+          <a:effectRef idx="0">
+            <a:schemeClr val="accent1"/>
+          </a:effectRef>
+          <a:fontRef idx="minor">
+            <a:schemeClr val="lt1"/>
+          </a:fontRef>
+        </p:style>
+        <p:txBody>
+          <a:bodyPr rtlCol="0" anchor="ctr"/>
+          <a:lstStyle/>
+          <a:p>
+            <a:pPr algn="ctr"/>
+            <a:endParaRPr lang="en-GB">
+              <a:solidFill>
+                <a:schemeClr val="tx1"/>
+              </a:solidFill>
+            </a:endParaRPr>
+          </a:p>
+        </p:txBody>
+      </p:sp>
+      <p:sp>
+        <p:nvSpPr>
+          <p:cNvPr id="41" name="Oval 40">
+            <a:extLst>
+              <a:ext uri="{FF2B5EF4-FFF2-40B4-BE49-F238E27FC236}">
+                <a16:creationId xmlns:a16="http://schemas.microsoft.com/office/drawing/2014/main" id="{55F01158-A9BE-4968-800F-9A5B8B3A89F4}"/>
+              </a:ext>
+            </a:extLst>
+          </p:cNvPr>
+          <p:cNvSpPr/>
+          <p:nvPr/>
+        </p:nvSpPr>
+        <p:spPr>
+          <a:xfrm flipH="1">
+            <a:off x="2085832" y="5013698"/>
+            <a:ext cx="76199" cy="76199"/>
+          </a:xfrm>
+          <a:prstGeom prst="ellipse">
+            <a:avLst/>
+          </a:prstGeom>
+          <a:solidFill>
+            <a:srgbClr val="BF9000"/>
+          </a:solidFill>
+          <a:ln w="44450">
+            <a:solidFill>
+              <a:srgbClr val="BF9000"/>
+            </a:solidFill>
+          </a:ln>
+        </p:spPr>
+        <p:style>
+          <a:lnRef idx="2">
+            <a:schemeClr val="accent1">
+              <a:shade val="50000"/>
+            </a:schemeClr>
+          </a:lnRef>
+          <a:fillRef idx="1">
+            <a:schemeClr val="accent1"/>
+          </a:fillRef>
+          <a:effectRef idx="0">
+            <a:schemeClr val="accent1"/>
+          </a:effectRef>
+          <a:fontRef idx="minor">
+            <a:schemeClr val="lt1"/>
+          </a:fontRef>
+        </p:style>
+        <p:txBody>
+          <a:bodyPr rtlCol="0" anchor="ctr"/>
+          <a:lstStyle/>
+          <a:p>
+            <a:pPr algn="ctr"/>
+            <a:endParaRPr lang="en-GB"/>
+          </a:p>
+        </p:txBody>
+      </p:sp>
+      <p:sp>
+        <p:nvSpPr>
+          <p:cNvPr id="42" name="Flowchart: Magnetic Disk 41">
+            <a:extLst>
+              <a:ext uri="{FF2B5EF4-FFF2-40B4-BE49-F238E27FC236}">
+                <a16:creationId xmlns:a16="http://schemas.microsoft.com/office/drawing/2014/main" id="{586576F4-5B67-456A-A102-5A818425B831}"/>
+              </a:ext>
+            </a:extLst>
+          </p:cNvPr>
+          <p:cNvSpPr/>
+          <p:nvPr/>
+        </p:nvSpPr>
+        <p:spPr>
+          <a:xfrm>
+            <a:off x="6579505" y="5530289"/>
+            <a:ext cx="318280" cy="355549"/>
+          </a:xfrm>
+          <a:prstGeom prst="flowChartMagneticDisk">
+            <a:avLst/>
+          </a:prstGeom>
+          <a:solidFill>
+            <a:srgbClr val="BF9000"/>
+          </a:solidFill>
+          <a:ln w="28575">
+            <a:solidFill>
+              <a:schemeClr val="tx1"/>
+            </a:solidFill>
+          </a:ln>
+        </p:spPr>
+        <p:style>
+          <a:lnRef idx="2">
+            <a:schemeClr val="accent1">
+              <a:shade val="50000"/>
+            </a:schemeClr>
+          </a:lnRef>
+          <a:fillRef idx="1">
+            <a:schemeClr val="accent1"/>
+          </a:fillRef>
+          <a:effectRef idx="0">
+            <a:schemeClr val="accent1"/>
+          </a:effectRef>
+          <a:fontRef idx="minor">
+            <a:schemeClr val="lt1"/>
+          </a:fontRef>
+        </p:style>
+        <p:txBody>
+          <a:bodyPr rtlCol="0" anchor="ctr"/>
+          <a:lstStyle/>
+          <a:p>
+            <a:pPr algn="ctr"/>
+            <a:endParaRPr lang="en-GB"/>
+          </a:p>
+        </p:txBody>
+      </p:sp>
+      <p:sp>
+        <p:nvSpPr>
+          <p:cNvPr id="44" name="Flowchart: Magnetic Disk 43">
+            <a:extLst>
+              <a:ext uri="{FF2B5EF4-FFF2-40B4-BE49-F238E27FC236}">
+                <a16:creationId xmlns:a16="http://schemas.microsoft.com/office/drawing/2014/main" id="{7BCAA9D3-5B99-4CE2-A165-F06FC12FC4E4}"/>
+              </a:ext>
+            </a:extLst>
+          </p:cNvPr>
+          <p:cNvSpPr/>
+          <p:nvPr/>
+        </p:nvSpPr>
+        <p:spPr>
+          <a:xfrm>
+            <a:off x="618293" y="4448586"/>
+            <a:ext cx="747046" cy="834521"/>
+          </a:xfrm>
+          <a:prstGeom prst="flowChartMagneticDisk">
+            <a:avLst/>
+          </a:prstGeom>
+          <a:solidFill>
+            <a:srgbClr val="BF9000"/>
+          </a:solidFill>
+          <a:ln w="79375">
+            <a:solidFill>
+              <a:schemeClr val="tx1"/>
+            </a:solidFill>
+          </a:ln>
+        </p:spPr>
+        <p:style>
+          <a:lnRef idx="2">
+            <a:schemeClr val="accent1">
+              <a:shade val="50000"/>
+            </a:schemeClr>
+          </a:lnRef>
+          <a:fillRef idx="1">
+            <a:schemeClr val="accent1"/>
+          </a:fillRef>
+          <a:effectRef idx="0">
+            <a:schemeClr val="accent1"/>
+          </a:effectRef>
+          <a:fontRef idx="minor">
+            <a:schemeClr val="lt1"/>
+          </a:fontRef>
+        </p:style>
+        <p:txBody>
+          <a:bodyPr rtlCol="0" anchor="ctr"/>
+          <a:lstStyle/>
+          <a:p>
+            <a:pPr algn="ctr"/>
+            <a:endParaRPr lang="en-GB"/>
+          </a:p>
+        </p:txBody>
+      </p:sp>
+    </p:spTree>
+    <p:extLst>
+      <p:ext uri="{BB962C8B-B14F-4D97-AF65-F5344CB8AC3E}">
+        <p14:creationId xmlns:p14="http://schemas.microsoft.com/office/powerpoint/2010/main" val="927458044"/>
+      </p:ext>
+    </p:extLst>
+  </p:cSld>
+  <p:clrMapOvr>
+    <a:masterClrMapping/>
+  </p:clrMapOvr>
+</p:sld>
+</file>
+
 <file path=ppt/slides/slide2.xml><?xml version="1.0" encoding="utf-8"?>
 <p:sld xmlns:a="http://schemas.openxmlformats.org/drawingml/2006/main" xmlns:r="http://schemas.openxmlformats.org/officeDocument/2006/relationships" xmlns:p="http://schemas.openxmlformats.org/presentationml/2006/main">
   <p:cSld>
@@ -15704,10 +17130,10 @@
       </p:grpSp>
       <p:grpSp>
         <p:nvGrpSpPr>
-          <p:cNvPr id="9" name="Group 8">
-            <a:extLst>
-              <a:ext uri="{FF2B5EF4-FFF2-40B4-BE49-F238E27FC236}">
-                <a16:creationId xmlns:a16="http://schemas.microsoft.com/office/drawing/2014/main" id="{DD455374-D670-4B42-9266-E62317AF30B9}"/>
+          <p:cNvPr id="22" name="Group 21">
+            <a:extLst>
+              <a:ext uri="{FF2B5EF4-FFF2-40B4-BE49-F238E27FC236}">
+                <a16:creationId xmlns:a16="http://schemas.microsoft.com/office/drawing/2014/main" id="{0FBF282B-844F-4803-ADDB-96897D49E684}"/>
               </a:ext>
             </a:extLst>
           </p:cNvPr>
@@ -15716,10 +17142,10 @@
         </p:nvGrpSpPr>
         <p:grpSpPr>
           <a:xfrm>
-            <a:off x="6230933" y="3556406"/>
-            <a:ext cx="5625142" cy="544506"/>
-            <a:chOff x="6409351" y="3556406"/>
-            <a:chExt cx="5625142" cy="544506"/>
+            <a:off x="6230933" y="3504578"/>
+            <a:ext cx="5948295" cy="592154"/>
+            <a:chOff x="6230933" y="3504578"/>
+            <a:chExt cx="5948295" cy="592154"/>
           </a:xfrm>
         </p:grpSpPr>
         <p:sp>
@@ -15736,7 +17162,7 @@
           </p:nvSpPr>
           <p:spPr>
             <a:xfrm>
-              <a:off x="6409351" y="3556406"/>
+              <a:off x="6230933" y="3528402"/>
               <a:ext cx="653143" cy="544506"/>
             </a:xfrm>
             <a:prstGeom prst="snip1Rect">
@@ -15794,7 +17220,7 @@
           </p:nvSpPr>
           <p:spPr>
             <a:xfrm>
-              <a:off x="7367076" y="3644077"/>
+              <a:off x="7188658" y="3615989"/>
               <a:ext cx="4667417" cy="369332"/>
             </a:xfrm>
             <a:prstGeom prst="rect">
@@ -15831,13 +17257,95 @@
             </a:p>
           </p:txBody>
         </p:sp>
+        <p:pic>
+          <p:nvPicPr>
+            <p:cNvPr id="19" name="Picture 18">
+              <a:extLst>
+                <a:ext uri="{FF2B5EF4-FFF2-40B4-BE49-F238E27FC236}">
+                  <a16:creationId xmlns:a16="http://schemas.microsoft.com/office/drawing/2014/main" id="{F2A544EB-6799-46EC-B784-23EA73C8A328}"/>
+                </a:ext>
+              </a:extLst>
+            </p:cNvPr>
+            <p:cNvPicPr>
+              <a:picLocks noChangeAspect="1"/>
+            </p:cNvPicPr>
+            <p:nvPr/>
+          </p:nvPicPr>
+          <p:blipFill>
+            <a:blip r:embed="rId4">
+              <a:clrChange>
+                <a:clrFrom>
+                  <a:srgbClr val="000000"/>
+                </a:clrFrom>
+                <a:clrTo>
+                  <a:srgbClr val="000000">
+                    <a:alpha val="0"/>
+                  </a:srgbClr>
+                </a:clrTo>
+              </a:clrChange>
+            </a:blip>
+            <a:stretch>
+              <a:fillRect/>
+            </a:stretch>
+          </p:blipFill>
+          <p:spPr>
+            <a:xfrm>
+              <a:off x="11600845" y="3581998"/>
+              <a:ext cx="578383" cy="437314"/>
+            </a:xfrm>
+            <a:prstGeom prst="rect">
+              <a:avLst/>
+            </a:prstGeom>
+          </p:spPr>
+        </p:pic>
+        <p:pic>
+          <p:nvPicPr>
+            <p:cNvPr id="21" name="Picture 20">
+              <a:extLst>
+                <a:ext uri="{FF2B5EF4-FFF2-40B4-BE49-F238E27FC236}">
+                  <a16:creationId xmlns:a16="http://schemas.microsoft.com/office/drawing/2014/main" id="{5C7680B6-A05C-4B84-AF24-EFB261846F35}"/>
+                </a:ext>
+              </a:extLst>
+            </p:cNvPr>
+            <p:cNvPicPr>
+              <a:picLocks noChangeAspect="1"/>
+            </p:cNvPicPr>
+            <p:nvPr/>
+          </p:nvPicPr>
+          <p:blipFill>
+            <a:blip r:embed="rId5">
+              <a:clrChange>
+                <a:clrFrom>
+                  <a:srgbClr val="000000"/>
+                </a:clrFrom>
+                <a:clrTo>
+                  <a:srgbClr val="000000">
+                    <a:alpha val="0"/>
+                  </a:srgbClr>
+                </a:clrTo>
+              </a:clrChange>
+            </a:blip>
+            <a:stretch>
+              <a:fillRect/>
+            </a:stretch>
+          </p:blipFill>
+          <p:spPr>
+            <a:xfrm>
+              <a:off x="10955385" y="3504578"/>
+              <a:ext cx="578383" cy="592154"/>
+            </a:xfrm>
+            <a:prstGeom prst="rect">
+              <a:avLst/>
+            </a:prstGeom>
+          </p:spPr>
+        </p:pic>
       </p:grpSp>
       <p:grpSp>
         <p:nvGrpSpPr>
-          <p:cNvPr id="12" name="Group 11">
-            <a:extLst>
-              <a:ext uri="{FF2B5EF4-FFF2-40B4-BE49-F238E27FC236}">
-                <a16:creationId xmlns:a16="http://schemas.microsoft.com/office/drawing/2014/main" id="{D70306DB-B081-4DDB-9FBF-D090B1DBC835}"/>
+          <p:cNvPr id="23" name="Group 22">
+            <a:extLst>
+              <a:ext uri="{FF2B5EF4-FFF2-40B4-BE49-F238E27FC236}">
+                <a16:creationId xmlns:a16="http://schemas.microsoft.com/office/drawing/2014/main" id="{79374F05-60FC-4032-A290-324D0AD38A84}"/>
               </a:ext>
             </a:extLst>
           </p:cNvPr>
@@ -15846,10 +17354,10 @@
         </p:nvGrpSpPr>
         <p:grpSpPr>
           <a:xfrm>
-            <a:off x="6230933" y="2436467"/>
-            <a:ext cx="5659104" cy="544506"/>
-            <a:chOff x="6409351" y="2436467"/>
-            <a:chExt cx="5659104" cy="544506"/>
+            <a:off x="6230933" y="2445090"/>
+            <a:ext cx="5884307" cy="592154"/>
+            <a:chOff x="6230933" y="2445090"/>
+            <a:chExt cx="5884307" cy="592154"/>
           </a:xfrm>
         </p:grpSpPr>
         <p:sp>
@@ -15866,7 +17374,7 @@
           </p:nvSpPr>
           <p:spPr>
             <a:xfrm>
-              <a:off x="6409351" y="2436467"/>
+              <a:off x="6230933" y="2468914"/>
               <a:ext cx="653143" cy="544506"/>
             </a:xfrm>
             <a:prstGeom prst="snip1Rect">
@@ -15923,7 +17431,7 @@
           </p:nvSpPr>
           <p:spPr>
             <a:xfrm>
-              <a:off x="7401038" y="2524054"/>
+              <a:off x="7222620" y="2556501"/>
               <a:ext cx="4667417" cy="369332"/>
             </a:xfrm>
             <a:prstGeom prst="rect">
@@ -15966,6 +17474,88 @@
             </a:p>
           </p:txBody>
         </p:sp>
+        <p:pic>
+          <p:nvPicPr>
+            <p:cNvPr id="37" name="Picture 36">
+              <a:extLst>
+                <a:ext uri="{FF2B5EF4-FFF2-40B4-BE49-F238E27FC236}">
+                  <a16:creationId xmlns:a16="http://schemas.microsoft.com/office/drawing/2014/main" id="{62C047CA-2ECB-4D56-9196-D835BF911512}"/>
+                </a:ext>
+              </a:extLst>
+            </p:cNvPr>
+            <p:cNvPicPr>
+              <a:picLocks noChangeAspect="1"/>
+            </p:cNvPicPr>
+            <p:nvPr/>
+          </p:nvPicPr>
+          <p:blipFill>
+            <a:blip r:embed="rId4">
+              <a:clrChange>
+                <a:clrFrom>
+                  <a:srgbClr val="000000"/>
+                </a:clrFrom>
+                <a:clrTo>
+                  <a:srgbClr val="000000">
+                    <a:alpha val="0"/>
+                  </a:srgbClr>
+                </a:clrTo>
+              </a:clrChange>
+            </a:blip>
+            <a:stretch>
+              <a:fillRect/>
+            </a:stretch>
+          </p:blipFill>
+          <p:spPr>
+            <a:xfrm>
+              <a:off x="11536857" y="2522510"/>
+              <a:ext cx="578383" cy="437314"/>
+            </a:xfrm>
+            <a:prstGeom prst="rect">
+              <a:avLst/>
+            </a:prstGeom>
+          </p:spPr>
+        </p:pic>
+        <p:pic>
+          <p:nvPicPr>
+            <p:cNvPr id="38" name="Picture 37">
+              <a:extLst>
+                <a:ext uri="{FF2B5EF4-FFF2-40B4-BE49-F238E27FC236}">
+                  <a16:creationId xmlns:a16="http://schemas.microsoft.com/office/drawing/2014/main" id="{E746759A-7190-40D6-A94F-601AE3D7902A}"/>
+                </a:ext>
+              </a:extLst>
+            </p:cNvPr>
+            <p:cNvPicPr>
+              <a:picLocks noChangeAspect="1"/>
+            </p:cNvPicPr>
+            <p:nvPr/>
+          </p:nvPicPr>
+          <p:blipFill>
+            <a:blip r:embed="rId5">
+              <a:clrChange>
+                <a:clrFrom>
+                  <a:srgbClr val="000000"/>
+                </a:clrFrom>
+                <a:clrTo>
+                  <a:srgbClr val="000000">
+                    <a:alpha val="0"/>
+                  </a:srgbClr>
+                </a:clrTo>
+              </a:clrChange>
+            </a:blip>
+            <a:stretch>
+              <a:fillRect/>
+            </a:stretch>
+          </p:blipFill>
+          <p:spPr>
+            <a:xfrm>
+              <a:off x="10891397" y="2445090"/>
+              <a:ext cx="578383" cy="592154"/>
+            </a:xfrm>
+            <a:prstGeom prst="rect">
+              <a:avLst/>
+            </a:prstGeom>
+          </p:spPr>
+        </p:pic>
       </p:grpSp>
     </p:spTree>
     <p:extLst>
@@ -16056,7 +17646,7 @@
                                           </p:stCondLst>
                                         </p:cTn>
                                         <p:tgtEl>
-                                          <p:spTgt spid="9"/>
+                                          <p:spTgt spid="22"/>
                                         </p:tgtEl>
                                         <p:attrNameLst>
                                           <p:attrName>style.visibility</p:attrName>
@@ -16101,7 +17691,7 @@
                                           </p:stCondLst>
                                         </p:cTn>
                                         <p:tgtEl>
-                                          <p:spTgt spid="12"/>
+                                          <p:spTgt spid="23"/>
                                         </p:tgtEl>
                                         <p:attrNameLst>
                                           <p:attrName>style.visibility</p:attrName>
@@ -16583,7 +18173,7 @@
                   <a:schemeClr val="bg1"/>
                 </a:solidFill>
               </a:rPr>
-              <a:t>Non deterministic </a:t>
+              <a:t>Complex setups</a:t>
             </a:r>
           </a:p>
         </p:txBody>
@@ -16954,10 +18544,10 @@
         </p:nvGrpSpPr>
         <p:grpSpPr>
           <a:xfrm>
-            <a:off x="4193946" y="4141009"/>
-            <a:ext cx="5372079" cy="1620097"/>
-            <a:chOff x="4193946" y="4141009"/>
-            <a:chExt cx="5372079" cy="1620097"/>
+            <a:off x="4193946" y="4110232"/>
+            <a:ext cx="5372079" cy="1650870"/>
+            <a:chOff x="4193946" y="4110232"/>
+            <a:chExt cx="5372079" cy="1650870"/>
           </a:xfrm>
         </p:grpSpPr>
         <p:sp>
@@ -16974,8 +18564,8 @@
           </p:nvSpPr>
           <p:spPr>
             <a:xfrm>
-              <a:off x="4193946" y="4141009"/>
-              <a:ext cx="2895663" cy="830997"/>
+              <a:off x="4193946" y="4110232"/>
+              <a:ext cx="2895663" cy="892552"/>
             </a:xfrm>
             <a:prstGeom prst="rect">
               <a:avLst/>
@@ -16999,7 +18589,55 @@
                   </a:solidFill>
                   <a:latin typeface="DK More Or Less" pitchFamily="50" charset="0"/>
                 </a:rPr>
-                <a:t>We tend to overlook some boring but crucial areas like adapters code</a:t>
+                <a:t>Because We tend to overlook some boring but crucial areas </a:t>
+              </a:r>
+              <a:r>
+                <a:rPr lang="en-US" sz="2000" dirty="0">
+                  <a:solidFill>
+                    <a:schemeClr val="accent5">
+                      <a:lumMod val="40000"/>
+                      <a:lumOff val="60000"/>
+                    </a:schemeClr>
+                  </a:solidFill>
+                  <a:latin typeface="DK More Or Less" pitchFamily="50" charset="0"/>
+                </a:rPr>
+                <a:t>(</a:t>
+              </a:r>
+              <a:r>
+                <a:rPr lang="en-US" sz="1600" dirty="0">
+                  <a:solidFill>
+                    <a:schemeClr val="accent5">
+                      <a:lumMod val="40000"/>
+                      <a:lumOff val="60000"/>
+                    </a:schemeClr>
+                  </a:solidFill>
+                  <a:latin typeface="DK More Or Less" pitchFamily="50" charset="0"/>
+                </a:rPr>
+                <a:t> like adapters code </a:t>
+              </a:r>
+              <a:r>
+                <a:rPr lang="en-US" dirty="0">
+                  <a:solidFill>
+                    <a:schemeClr val="accent5">
+                      <a:lumMod val="40000"/>
+                      <a:lumOff val="60000"/>
+                    </a:schemeClr>
+                  </a:solidFill>
+                  <a:latin typeface="DK More Or Less" pitchFamily="50" charset="0"/>
+                </a:rPr>
+                <a:t>)</a:t>
+              </a:r>
+              <a:r>
+                <a:rPr lang="en-US" sz="1600" dirty="0">
+                  <a:solidFill>
+                    <a:schemeClr val="accent5">
+                      <a:lumMod val="40000"/>
+                      <a:lumOff val="60000"/>
+                    </a:schemeClr>
+                  </a:solidFill>
+                  <a:latin typeface="DK More Or Less" pitchFamily="50" charset="0"/>
+                </a:rPr>
+                <a:t> </a:t>
               </a:r>
               <a:endParaRPr lang="en-GB" sz="1600" dirty="0">
                 <a:solidFill>
@@ -17030,8 +18668,8 @@
           </p:nvCxnSpPr>
           <p:spPr>
             <a:xfrm rot="16200000" flipH="1">
-              <a:off x="7209351" y="3404433"/>
-              <a:ext cx="789101" cy="3924246"/>
+              <a:off x="7224742" y="3419819"/>
+              <a:ext cx="758319" cy="3924247"/>
             </a:xfrm>
             <a:prstGeom prst="curvedConnector2">
               <a:avLst/>
@@ -17075,10 +18713,10 @@
         </p:nvGrpSpPr>
         <p:grpSpPr>
           <a:xfrm>
-            <a:off x="2511911" y="5882819"/>
-            <a:ext cx="6076169" cy="338554"/>
-            <a:chOff x="2511911" y="5882819"/>
-            <a:chExt cx="6076169" cy="338554"/>
+            <a:off x="2823061" y="5882819"/>
+            <a:ext cx="5949169" cy="338554"/>
+            <a:chOff x="4010511" y="5882819"/>
+            <a:chExt cx="5949169" cy="338554"/>
           </a:xfrm>
         </p:grpSpPr>
         <p:sp>
@@ -17095,8 +18733,8 @@
           </p:nvSpPr>
           <p:spPr>
             <a:xfrm>
-              <a:off x="2511911" y="5882819"/>
-              <a:ext cx="4016061" cy="338554"/>
+              <a:off x="4010511" y="5882819"/>
+              <a:ext cx="3768239" cy="338554"/>
             </a:xfrm>
             <a:prstGeom prst="rect">
               <a:avLst/>
@@ -17109,7 +18747,7 @@
             </a:bodyPr>
             <a:lstStyle/>
             <a:p>
-              <a:pPr algn="ctr"/>
+              <a:pPr algn="r"/>
               <a:r>
                 <a:rPr lang="en-US" sz="1600" dirty="0">
                   <a:solidFill>
@@ -17117,7 +18755,7 @@
                   </a:solidFill>
                   <a:latin typeface="DK More Or Less" pitchFamily="50" charset="0"/>
                 </a:rPr>
-                <a:t>The team must be confident in their tests</a:t>
+                <a:t>cognitive overload reduce stamina</a:t>
               </a:r>
               <a:endParaRPr lang="en-GB" sz="1600" dirty="0">
                 <a:solidFill>
@@ -17143,7 +18781,7 @@
           </p:nvCxnSpPr>
           <p:spPr>
             <a:xfrm>
-              <a:off x="6434181" y="6070081"/>
+              <a:off x="7805781" y="6070081"/>
               <a:ext cx="2153899" cy="126646"/>
             </a:xfrm>
             <a:prstGeom prst="curvedConnector3">
@@ -18726,6 +20364,43 @@
           </a:p>
         </p:txBody>
       </p:sp>
+      <p:sp>
+        <p:nvSpPr>
+          <p:cNvPr id="4" name="TextBox 3">
+            <a:extLst>
+              <a:ext uri="{FF2B5EF4-FFF2-40B4-BE49-F238E27FC236}">
+                <a16:creationId xmlns:a16="http://schemas.microsoft.com/office/drawing/2014/main" id="{9E4BFB4A-61EF-4081-A2FF-BEF9469591ED}"/>
+              </a:ext>
+            </a:extLst>
+          </p:cNvPr>
+          <p:cNvSpPr txBox="1"/>
+          <p:nvPr/>
+        </p:nvSpPr>
+        <p:spPr>
+          <a:xfrm>
+            <a:off x="9988550" y="2508250"/>
+            <a:ext cx="596900" cy="369332"/>
+          </a:xfrm>
+          <a:prstGeom prst="rect">
+            <a:avLst/>
+          </a:prstGeom>
+          <a:noFill/>
+        </p:spPr>
+        <p:txBody>
+          <a:bodyPr wrap="square" rtlCol="0">
+            <a:spAutoFit/>
+          </a:bodyPr>
+          <a:lstStyle/>
+          <a:p>
+            <a:r>
+              <a:rPr lang="en-GB" b="1" dirty="0">
+                <a:latin typeface="Alte Haas Grotesk" panose="02000503000000020004" pitchFamily="2" charset="0"/>
+              </a:rPr>
+              <a:t>API</a:t>
+            </a:r>
+          </a:p>
+        </p:txBody>
+      </p:sp>
     </p:spTree>
     <p:extLst>
       <p:ext uri="{BB962C8B-B14F-4D97-AF65-F5344CB8AC3E}">
@@ -20859,6 +22534,43 @@
           </a:p>
         </p:txBody>
       </p:sp>
+      <p:sp>
+        <p:nvSpPr>
+          <p:cNvPr id="45" name="TextBox 44">
+            <a:extLst>
+              <a:ext uri="{FF2B5EF4-FFF2-40B4-BE49-F238E27FC236}">
+                <a16:creationId xmlns:a16="http://schemas.microsoft.com/office/drawing/2014/main" id="{9E919CFF-3B4C-4E1A-ADD7-12B3AD0EFF06}"/>
+              </a:ext>
+            </a:extLst>
+          </p:cNvPr>
+          <p:cNvSpPr txBox="1"/>
+          <p:nvPr/>
+        </p:nvSpPr>
+        <p:spPr>
+          <a:xfrm>
+            <a:off x="9988550" y="2508250"/>
+            <a:ext cx="596900" cy="369332"/>
+          </a:xfrm>
+          <a:prstGeom prst="rect">
+            <a:avLst/>
+          </a:prstGeom>
+          <a:noFill/>
+        </p:spPr>
+        <p:txBody>
+          <a:bodyPr wrap="square" rtlCol="0">
+            <a:spAutoFit/>
+          </a:bodyPr>
+          <a:lstStyle/>
+          <a:p>
+            <a:r>
+              <a:rPr lang="en-GB" b="1" dirty="0">
+                <a:latin typeface="Alte Haas Grotesk" panose="02000503000000020004" pitchFamily="2" charset="0"/>
+              </a:rPr>
+              <a:t>API</a:t>
+            </a:r>
+          </a:p>
+        </p:txBody>
+      </p:sp>
     </p:spTree>
     <p:extLst>
       <p:ext uri="{BB962C8B-B14F-4D97-AF65-F5344CB8AC3E}">
@@ -22917,6 +24629,43 @@
           </a:p>
         </p:txBody>
       </p:sp>
+      <p:sp>
+        <p:nvSpPr>
+          <p:cNvPr id="45" name="TextBox 44">
+            <a:extLst>
+              <a:ext uri="{FF2B5EF4-FFF2-40B4-BE49-F238E27FC236}">
+                <a16:creationId xmlns:a16="http://schemas.microsoft.com/office/drawing/2014/main" id="{E13E515B-FD17-4528-B4DE-B8D790A5A8E0}"/>
+              </a:ext>
+            </a:extLst>
+          </p:cNvPr>
+          <p:cNvSpPr txBox="1"/>
+          <p:nvPr/>
+        </p:nvSpPr>
+        <p:spPr>
+          <a:xfrm>
+            <a:off x="9988550" y="2508250"/>
+            <a:ext cx="596900" cy="369332"/>
+          </a:xfrm>
+          <a:prstGeom prst="rect">
+            <a:avLst/>
+          </a:prstGeom>
+          <a:noFill/>
+        </p:spPr>
+        <p:txBody>
+          <a:bodyPr wrap="square" rtlCol="0">
+            <a:spAutoFit/>
+          </a:bodyPr>
+          <a:lstStyle/>
+          <a:p>
+            <a:r>
+              <a:rPr lang="en-GB" b="1" dirty="0">
+                <a:latin typeface="Alte Haas Grotesk" panose="02000503000000020004" pitchFamily="2" charset="0"/>
+              </a:rPr>
+              <a:t>API</a:t>
+            </a:r>
+          </a:p>
+        </p:txBody>
+      </p:sp>
     </p:spTree>
     <p:extLst>
       <p:ext uri="{BB962C8B-B14F-4D97-AF65-F5344CB8AC3E}">
@@ -24993,6 +26742,43 @@
             <a:r>
               <a:rPr lang="en-GB" dirty="0"/>
               <a:t>uses</a:t>
+            </a:r>
+          </a:p>
+        </p:txBody>
+      </p:sp>
+      <p:sp>
+        <p:nvSpPr>
+          <p:cNvPr id="45" name="TextBox 44">
+            <a:extLst>
+              <a:ext uri="{FF2B5EF4-FFF2-40B4-BE49-F238E27FC236}">
+                <a16:creationId xmlns:a16="http://schemas.microsoft.com/office/drawing/2014/main" id="{4600C009-8F38-44AA-B043-C73B5EBCA926}"/>
+              </a:ext>
+            </a:extLst>
+          </p:cNvPr>
+          <p:cNvSpPr txBox="1"/>
+          <p:nvPr/>
+        </p:nvSpPr>
+        <p:spPr>
+          <a:xfrm>
+            <a:off x="9988550" y="2508250"/>
+            <a:ext cx="596900" cy="369332"/>
+          </a:xfrm>
+          <a:prstGeom prst="rect">
+            <a:avLst/>
+          </a:prstGeom>
+          <a:noFill/>
+        </p:spPr>
+        <p:txBody>
+          <a:bodyPr wrap="square" rtlCol="0">
+            <a:spAutoFit/>
+          </a:bodyPr>
+          <a:lstStyle/>
+          <a:p>
+            <a:r>
+              <a:rPr lang="en-GB" b="1" dirty="0">
+                <a:latin typeface="Alte Haas Grotesk" panose="02000503000000020004" pitchFamily="2" charset="0"/>
+              </a:rPr>
+              <a:t>API</a:t>
             </a:r>
           </a:p>
         </p:txBody>

</xml_diff>

<commit_message>
Refactor the 'Beware of' slide and improve the 'fragile tests' slides
</commit_message>
<xml_diff>
--- a/Outside-In-Diamond TDD.pptx
+++ b/Outside-In-Diamond TDD.pptx
@@ -8195,6 +8195,42 @@
           </a:p>
         </p:txBody>
       </p:sp>
+      <p:sp>
+        <p:nvSpPr>
+          <p:cNvPr id="52" name="TextBox 51">
+            <a:extLst>
+              <a:ext uri="{FF2B5EF4-FFF2-40B4-BE49-F238E27FC236}">
+                <a16:creationId xmlns:a16="http://schemas.microsoft.com/office/drawing/2014/main" id="{F35873C5-3B22-4772-8AD2-39C7AD51B28C}"/>
+              </a:ext>
+            </a:extLst>
+          </p:cNvPr>
+          <p:cNvSpPr txBox="1"/>
+          <p:nvPr/>
+        </p:nvSpPr>
+        <p:spPr>
+          <a:xfrm>
+            <a:off x="2743026" y="4470596"/>
+            <a:ext cx="744491" cy="461665"/>
+          </a:xfrm>
+          <a:prstGeom prst="rect">
+            <a:avLst/>
+          </a:prstGeom>
+          <a:noFill/>
+        </p:spPr>
+        <p:txBody>
+          <a:bodyPr wrap="square">
+            <a:spAutoFit/>
+          </a:bodyPr>
+          <a:lstStyle/>
+          <a:p>
+            <a:r>
+              <a:rPr lang="fr-FR" sz="2400" dirty="0"/>
+              <a:t>😕</a:t>
+            </a:r>
+            <a:endParaRPr lang="en-GB" sz="2400" dirty="0"/>
+          </a:p>
+        </p:txBody>
+      </p:sp>
     </p:spTree>
     <p:extLst>
       <p:ext uri="{BB962C8B-B14F-4D97-AF65-F5344CB8AC3E}">
@@ -10480,6 +10516,42 @@
                 <a:schemeClr val="bg1"/>
               </a:solidFill>
             </a:endParaRPr>
+          </a:p>
+        </p:txBody>
+      </p:sp>
+      <p:sp>
+        <p:nvSpPr>
+          <p:cNvPr id="52" name="TextBox 51">
+            <a:extLst>
+              <a:ext uri="{FF2B5EF4-FFF2-40B4-BE49-F238E27FC236}">
+                <a16:creationId xmlns:a16="http://schemas.microsoft.com/office/drawing/2014/main" id="{91CC2099-59EB-4B87-A7E0-EAD83A77017E}"/>
+              </a:ext>
+            </a:extLst>
+          </p:cNvPr>
+          <p:cNvSpPr txBox="1"/>
+          <p:nvPr/>
+        </p:nvSpPr>
+        <p:spPr>
+          <a:xfrm>
+            <a:off x="2743026" y="4470596"/>
+            <a:ext cx="744491" cy="461665"/>
+          </a:xfrm>
+          <a:prstGeom prst="rect">
+            <a:avLst/>
+          </a:prstGeom>
+          <a:noFill/>
+        </p:spPr>
+        <p:txBody>
+          <a:bodyPr wrap="square">
+            <a:spAutoFit/>
+          </a:bodyPr>
+          <a:lstStyle/>
+          <a:p>
+            <a:r>
+              <a:rPr lang="fr-FR" sz="2400" dirty="0"/>
+              <a:t>😕</a:t>
+            </a:r>
+            <a:endParaRPr lang="en-GB" sz="2400" dirty="0"/>
           </a:p>
         </p:txBody>
       </p:sp>
@@ -19531,10 +19603,10 @@
       </p:grpSp>
       <p:grpSp>
         <p:nvGrpSpPr>
-          <p:cNvPr id="29" name="Group 28">
-            <a:extLst>
-              <a:ext uri="{FF2B5EF4-FFF2-40B4-BE49-F238E27FC236}">
-                <a16:creationId xmlns:a16="http://schemas.microsoft.com/office/drawing/2014/main" id="{991BBC39-FA17-47BD-988A-5E90E33F8E1C}"/>
+          <p:cNvPr id="18" name="Group 17">
+            <a:extLst>
+              <a:ext uri="{FF2B5EF4-FFF2-40B4-BE49-F238E27FC236}">
+                <a16:creationId xmlns:a16="http://schemas.microsoft.com/office/drawing/2014/main" id="{D921B70A-DA0F-4187-9C0D-52B64FA44AC2}"/>
               </a:ext>
             </a:extLst>
           </p:cNvPr>
@@ -19543,10 +19615,10 @@
         </p:nvGrpSpPr>
         <p:grpSpPr>
           <a:xfrm>
-            <a:off x="5741693" y="2395376"/>
-            <a:ext cx="3470153" cy="3352586"/>
-            <a:chOff x="5692417" y="2367386"/>
-            <a:chExt cx="3914969" cy="3393721"/>
+            <a:off x="6182727" y="3950518"/>
+            <a:ext cx="3029118" cy="1797443"/>
+            <a:chOff x="6182727" y="3950518"/>
+            <a:chExt cx="3029118" cy="1797443"/>
           </a:xfrm>
         </p:grpSpPr>
         <p:sp>
@@ -19563,8 +19635,8 @@
           </p:nvSpPr>
           <p:spPr>
             <a:xfrm>
-              <a:off x="5692417" y="2367386"/>
-              <a:ext cx="2895663" cy="994026"/>
+              <a:off x="6182727" y="3950518"/>
+              <a:ext cx="2566660" cy="981977"/>
             </a:xfrm>
             <a:prstGeom prst="rect">
               <a:avLst/>
@@ -19738,13 +19810,14 @@
             </p:cNvPr>
             <p:cNvCxnSpPr>
               <a:cxnSpLocks/>
+              <a:stCxn id="12" idx="2"/>
             </p:cNvCxnSpPr>
             <p:nvPr/>
           </p:nvCxnSpPr>
           <p:spPr>
             <a:xfrm rot="16200000" flipH="1">
-              <a:off x="7198949" y="3352670"/>
-              <a:ext cx="2359124" cy="2457750"/>
+              <a:off x="7931218" y="4467334"/>
+              <a:ext cx="815466" cy="1745788"/>
             </a:xfrm>
             <a:prstGeom prst="curvedConnector2">
               <a:avLst/>
@@ -19776,10 +19849,10 @@
       </p:grpSp>
       <p:grpSp>
         <p:nvGrpSpPr>
-          <p:cNvPr id="30" name="Group 29">
-            <a:extLst>
-              <a:ext uri="{FF2B5EF4-FFF2-40B4-BE49-F238E27FC236}">
-                <a16:creationId xmlns:a16="http://schemas.microsoft.com/office/drawing/2014/main" id="{E639B539-A4FE-4E8B-932E-C63290B2585F}"/>
+          <p:cNvPr id="31" name="Group 30">
+            <a:extLst>
+              <a:ext uri="{FF2B5EF4-FFF2-40B4-BE49-F238E27FC236}">
+                <a16:creationId xmlns:a16="http://schemas.microsoft.com/office/drawing/2014/main" id="{228D1D88-5597-4E26-9CD3-FDB3698AC3EF}"/>
               </a:ext>
             </a:extLst>
           </p:cNvPr>
@@ -19788,10 +19861,136 @@
         </p:nvGrpSpPr>
         <p:grpSpPr>
           <a:xfrm>
-            <a:off x="4243222" y="4018377"/>
-            <a:ext cx="4968623" cy="1767572"/>
-            <a:chOff x="4193946" y="4019739"/>
-            <a:chExt cx="5372078" cy="1741358"/>
+            <a:off x="2417882" y="5714997"/>
+            <a:ext cx="5949169" cy="674200"/>
+            <a:chOff x="4010511" y="5714997"/>
+            <a:chExt cx="5949169" cy="674200"/>
+          </a:xfrm>
+        </p:grpSpPr>
+        <p:sp>
+          <p:nvSpPr>
+            <p:cNvPr id="23" name="TextBox 22">
+              <a:extLst>
+                <a:ext uri="{FF2B5EF4-FFF2-40B4-BE49-F238E27FC236}">
+                  <a16:creationId xmlns:a16="http://schemas.microsoft.com/office/drawing/2014/main" id="{84AB31DD-9C8A-4DD1-A000-D97975DFF162}"/>
+                </a:ext>
+              </a:extLst>
+            </p:cNvPr>
+            <p:cNvSpPr txBox="1"/>
+            <p:nvPr/>
+          </p:nvSpPr>
+          <p:spPr>
+            <a:xfrm>
+              <a:off x="4010511" y="5714997"/>
+              <a:ext cx="3768239" cy="674200"/>
+            </a:xfrm>
+            <a:prstGeom prst="rect">
+              <a:avLst/>
+            </a:prstGeom>
+            <a:solidFill>
+              <a:schemeClr val="tx1">
+                <a:alpha val="31000"/>
+              </a:schemeClr>
+            </a:solidFill>
+          </p:spPr>
+          <p:txBody>
+            <a:bodyPr wrap="square" tIns="90000" bIns="90000" rtlCol="0" anchor="ctr">
+              <a:spAutoFit/>
+            </a:bodyPr>
+            <a:lstStyle/>
+            <a:p>
+              <a:pPr algn="r"/>
+              <a:r>
+                <a:rPr lang="en-US" sz="1600" dirty="0">
+                  <a:solidFill>
+                    <a:schemeClr val="bg1"/>
+                  </a:solidFill>
+                  <a:latin typeface="DK More Or Less" pitchFamily="50" charset="0"/>
+                </a:rPr>
+                <a:t>cognitive overload reduces stamina </a:t>
+              </a:r>
+            </a:p>
+            <a:p>
+              <a:pPr algn="r"/>
+              <a:r>
+                <a:rPr lang="en-US" sz="1600" dirty="0">
+                  <a:solidFill>
+                    <a:schemeClr val="bg1"/>
+                  </a:solidFill>
+                  <a:latin typeface="DK More Or Less" pitchFamily="50" charset="0"/>
+                </a:rPr>
+                <a:t>and engagement</a:t>
+              </a:r>
+              <a:endParaRPr lang="en-GB" sz="1600" dirty="0">
+                <a:solidFill>
+                  <a:schemeClr val="bg1"/>
+                </a:solidFill>
+              </a:endParaRPr>
+            </a:p>
+          </p:txBody>
+        </p:sp>
+        <p:cxnSp>
+          <p:nvCxnSpPr>
+            <p:cNvPr id="24" name="Connector: Curved 23">
+              <a:extLst>
+                <a:ext uri="{FF2B5EF4-FFF2-40B4-BE49-F238E27FC236}">
+                  <a16:creationId xmlns:a16="http://schemas.microsoft.com/office/drawing/2014/main" id="{716D702A-7524-4DF8-A5FE-66318DCD382D}"/>
+                </a:ext>
+              </a:extLst>
+            </p:cNvPr>
+            <p:cNvCxnSpPr>
+              <a:cxnSpLocks/>
+            </p:cNvCxnSpPr>
+            <p:nvPr/>
+          </p:nvCxnSpPr>
+          <p:spPr>
+            <a:xfrm>
+              <a:off x="7805781" y="6070081"/>
+              <a:ext cx="2153899" cy="126646"/>
+            </a:xfrm>
+            <a:prstGeom prst="curvedConnector3">
+              <a:avLst/>
+            </a:prstGeom>
+            <a:ln w="19050">
+              <a:solidFill>
+                <a:schemeClr val="bg1"/>
+              </a:solidFill>
+            </a:ln>
+          </p:spPr>
+          <p:style>
+            <a:lnRef idx="1">
+              <a:schemeClr val="accent1"/>
+            </a:lnRef>
+            <a:fillRef idx="0">
+              <a:schemeClr val="accent1"/>
+            </a:fillRef>
+            <a:effectRef idx="0">
+              <a:schemeClr val="accent1"/>
+            </a:effectRef>
+            <a:fontRef idx="minor">
+              <a:schemeClr val="tx1"/>
+            </a:fontRef>
+          </p:style>
+        </p:cxnSp>
+      </p:grpSp>
+      <p:grpSp>
+        <p:nvGrpSpPr>
+          <p:cNvPr id="19" name="Group 18">
+            <a:extLst>
+              <a:ext uri="{FF2B5EF4-FFF2-40B4-BE49-F238E27FC236}">
+                <a16:creationId xmlns:a16="http://schemas.microsoft.com/office/drawing/2014/main" id="{DADA0CFB-EF71-49E2-89FF-D6479A0F829A}"/>
+              </a:ext>
+            </a:extLst>
+          </p:cNvPr>
+          <p:cNvGrpSpPr/>
+          <p:nvPr/>
+        </p:nvGrpSpPr>
+        <p:grpSpPr>
+          <a:xfrm>
+            <a:off x="5808611" y="2366615"/>
+            <a:ext cx="2848594" cy="1654987"/>
+            <a:chOff x="5808611" y="2366615"/>
+            <a:chExt cx="2848594" cy="1654987"/>
           </a:xfrm>
         </p:grpSpPr>
         <p:sp>
@@ -19808,8 +20007,8 @@
           </p:nvSpPr>
           <p:spPr>
             <a:xfrm>
-              <a:off x="4193946" y="4019739"/>
-              <a:ext cx="3079901" cy="1073539"/>
+              <a:off x="5808611" y="2366615"/>
+              <a:ext cx="2848594" cy="1089700"/>
             </a:xfrm>
             <a:prstGeom prst="rect">
               <a:avLst/>
@@ -19912,140 +20111,10 @@
         </p:sp>
         <p:cxnSp>
           <p:nvCxnSpPr>
-            <p:cNvPr id="17" name="Connector: Curved 16">
+            <p:cNvPr id="25" name="Connector: Curved 24">
               <a:extLst>
                 <a:ext uri="{FF2B5EF4-FFF2-40B4-BE49-F238E27FC236}">
-                  <a16:creationId xmlns:a16="http://schemas.microsoft.com/office/drawing/2014/main" id="{8219ED84-7AA9-4C8C-A84E-4D3370519A58}"/>
-                </a:ext>
-              </a:extLst>
-            </p:cNvPr>
-            <p:cNvCxnSpPr>
-              <a:cxnSpLocks/>
-              <a:stCxn id="16" idx="2"/>
-            </p:cNvCxnSpPr>
-            <p:nvPr/>
-          </p:nvCxnSpPr>
-          <p:spPr>
-            <a:xfrm rot="16200000" flipH="1">
-              <a:off x="7316049" y="3511123"/>
-              <a:ext cx="667823" cy="3832126"/>
-            </a:xfrm>
-            <a:prstGeom prst="curvedConnector2">
-              <a:avLst/>
-            </a:prstGeom>
-            <a:ln w="19050">
-              <a:solidFill>
-                <a:schemeClr val="accent5">
-                  <a:lumMod val="40000"/>
-                  <a:lumOff val="60000"/>
-                </a:schemeClr>
-              </a:solidFill>
-            </a:ln>
-          </p:spPr>
-          <p:style>
-            <a:lnRef idx="1">
-              <a:schemeClr val="accent1"/>
-            </a:lnRef>
-            <a:fillRef idx="0">
-              <a:schemeClr val="accent1"/>
-            </a:fillRef>
-            <a:effectRef idx="0">
-              <a:schemeClr val="accent1"/>
-            </a:effectRef>
-            <a:fontRef idx="minor">
-              <a:schemeClr val="tx1"/>
-            </a:fontRef>
-          </p:style>
-        </p:cxnSp>
-      </p:grpSp>
-      <p:grpSp>
-        <p:nvGrpSpPr>
-          <p:cNvPr id="31" name="Group 30">
-            <a:extLst>
-              <a:ext uri="{FF2B5EF4-FFF2-40B4-BE49-F238E27FC236}">
-                <a16:creationId xmlns:a16="http://schemas.microsoft.com/office/drawing/2014/main" id="{228D1D88-5597-4E26-9CD3-FDB3698AC3EF}"/>
-              </a:ext>
-            </a:extLst>
-          </p:cNvPr>
-          <p:cNvGrpSpPr/>
-          <p:nvPr/>
-        </p:nvGrpSpPr>
-        <p:grpSpPr>
-          <a:xfrm>
-            <a:off x="2417882" y="5714997"/>
-            <a:ext cx="5949169" cy="674200"/>
-            <a:chOff x="4010511" y="5714997"/>
-            <a:chExt cx="5949169" cy="674200"/>
-          </a:xfrm>
-        </p:grpSpPr>
-        <p:sp>
-          <p:nvSpPr>
-            <p:cNvPr id="23" name="TextBox 22">
-              <a:extLst>
-                <a:ext uri="{FF2B5EF4-FFF2-40B4-BE49-F238E27FC236}">
-                  <a16:creationId xmlns:a16="http://schemas.microsoft.com/office/drawing/2014/main" id="{84AB31DD-9C8A-4DD1-A000-D97975DFF162}"/>
-                </a:ext>
-              </a:extLst>
-            </p:cNvPr>
-            <p:cNvSpPr txBox="1"/>
-            <p:nvPr/>
-          </p:nvSpPr>
-          <p:spPr>
-            <a:xfrm>
-              <a:off x="4010511" y="5714997"/>
-              <a:ext cx="3768239" cy="674200"/>
-            </a:xfrm>
-            <a:prstGeom prst="rect">
-              <a:avLst/>
-            </a:prstGeom>
-            <a:solidFill>
-              <a:schemeClr val="tx1">
-                <a:alpha val="31000"/>
-              </a:schemeClr>
-            </a:solidFill>
-          </p:spPr>
-          <p:txBody>
-            <a:bodyPr wrap="square" tIns="90000" bIns="90000" rtlCol="0" anchor="ctr">
-              <a:spAutoFit/>
-            </a:bodyPr>
-            <a:lstStyle/>
-            <a:p>
-              <a:pPr algn="r"/>
-              <a:r>
-                <a:rPr lang="en-US" sz="1600" dirty="0">
-                  <a:solidFill>
-                    <a:schemeClr val="bg1"/>
-                  </a:solidFill>
-                  <a:latin typeface="DK More Or Less" pitchFamily="50" charset="0"/>
-                </a:rPr>
-                <a:t>cognitive overload reduces stamina </a:t>
-              </a:r>
-            </a:p>
-            <a:p>
-              <a:pPr algn="r"/>
-              <a:r>
-                <a:rPr lang="en-US" sz="1600" dirty="0">
-                  <a:solidFill>
-                    <a:schemeClr val="bg1"/>
-                  </a:solidFill>
-                  <a:latin typeface="DK More Or Less" pitchFamily="50" charset="0"/>
-                </a:rPr>
-                <a:t>and engagement</a:t>
-              </a:r>
-              <a:endParaRPr lang="en-GB" sz="1600" dirty="0">
-                <a:solidFill>
-                  <a:schemeClr val="bg1"/>
-                </a:solidFill>
-              </a:endParaRPr>
-            </a:p>
-          </p:txBody>
-        </p:sp>
-        <p:cxnSp>
-          <p:nvCxnSpPr>
-            <p:cNvPr id="24" name="Connector: Curved 23">
-              <a:extLst>
-                <a:ext uri="{FF2B5EF4-FFF2-40B4-BE49-F238E27FC236}">
-                  <a16:creationId xmlns:a16="http://schemas.microsoft.com/office/drawing/2014/main" id="{716D702A-7524-4DF8-A5FE-66318DCD382D}"/>
+                  <a16:creationId xmlns:a16="http://schemas.microsoft.com/office/drawing/2014/main" id="{F4E5D844-8B30-4580-9C7F-3DE9993C4503}"/>
                 </a:ext>
               </a:extLst>
             </p:cNvPr>
@@ -20055,16 +20124,21 @@
             <p:nvPr/>
           </p:nvCxnSpPr>
           <p:spPr>
-            <a:xfrm>
-              <a:off x="7805781" y="6070081"/>
-              <a:ext cx="2153899" cy="126646"/>
+            <a:xfrm rot="16200000" flipH="1">
+              <a:off x="6822011" y="3563813"/>
+              <a:ext cx="614446" cy="301132"/>
             </a:xfrm>
             <a:prstGeom prst="curvedConnector3">
-              <a:avLst/>
+              <a:avLst>
+                <a:gd name="adj1" fmla="val 50000"/>
+              </a:avLst>
             </a:prstGeom>
             <a:ln w="19050">
               <a:solidFill>
-                <a:schemeClr val="bg1"/>
+                <a:schemeClr val="accent5">
+                  <a:lumMod val="40000"/>
+                  <a:lumOff val="60000"/>
+                </a:schemeClr>
               </a:solidFill>
             </a:ln>
           </p:spPr>
@@ -20271,7 +20345,7 @@
                                           </p:stCondLst>
                                         </p:cTn>
                                         <p:tgtEl>
-                                          <p:spTgt spid="29"/>
+                                          <p:spTgt spid="18"/>
                                         </p:tgtEl>
                                         <p:attrNameLst>
                                           <p:attrName>style.visibility</p:attrName>
@@ -20316,7 +20390,7 @@
                                           </p:stCondLst>
                                         </p:cTn>
                                         <p:tgtEl>
-                                          <p:spTgt spid="30"/>
+                                          <p:spTgt spid="19"/>
                                         </p:tgtEl>
                                         <p:attrNameLst>
                                           <p:attrName>style.visibility</p:attrName>

</xml_diff>

<commit_message>
Add blind spot slide (with pic)
</commit_message>
<xml_diff>
--- a/Outside-In-Diamond TDD.pptx
+++ b/Outside-In-Diamond TDD.pptx
@@ -5,7 +5,7 @@
     <p:sldMasterId id="2147483648" r:id="rId1"/>
   </p:sldMasterIdLst>
   <p:notesMasterIdLst>
-    <p:notesMasterId r:id="rId18"/>
+    <p:notesMasterId r:id="rId19"/>
   </p:notesMasterIdLst>
   <p:sldIdLst>
     <p:sldId id="264" r:id="rId2"/>
@@ -19,11 +19,12 @@
     <p:sldId id="271" r:id="rId10"/>
     <p:sldId id="272" r:id="rId11"/>
     <p:sldId id="275" r:id="rId12"/>
-    <p:sldId id="257" r:id="rId13"/>
-    <p:sldId id="258" r:id="rId14"/>
-    <p:sldId id="262" r:id="rId15"/>
-    <p:sldId id="260" r:id="rId16"/>
-    <p:sldId id="274" r:id="rId17"/>
+    <p:sldId id="276" r:id="rId13"/>
+    <p:sldId id="257" r:id="rId14"/>
+    <p:sldId id="258" r:id="rId15"/>
+    <p:sldId id="262" r:id="rId16"/>
+    <p:sldId id="260" r:id="rId17"/>
+    <p:sldId id="274" r:id="rId18"/>
   </p:sldIdLst>
   <p:sldSz cx="12192000" cy="6858000"/>
   <p:notesSz cx="6858000" cy="9144000"/>
@@ -802,7 +803,10 @@
           <a:bodyPr/>
           <a:lstStyle/>
           <a:p>
-            <a:endParaRPr lang="en-GB" dirty="0"/>
+            <a:r>
+              <a:rPr lang="en-GB" dirty="0"/>
+              <a:t>Image : https://insights-images.thoughtworks.com/pairprogramming_f0d3ae7ef121e981e150bfcae4ecb995.jpg</a:t>
+            </a:r>
           </a:p>
         </p:txBody>
       </p:sp>
@@ -813,7 +817,7 @@
             <a:spLocks noGrp="1"/>
           </p:cNvSpPr>
           <p:nvPr>
-            <p:ph type="sldNum" sz="quarter" idx="10"/>
+            <p:ph type="sldNum" sz="quarter" idx="5"/>
           </p:nvPr>
         </p:nvSpPr>
         <p:spPr/>
@@ -832,7 +836,7 @@
     </p:spTree>
     <p:extLst>
       <p:ext uri="{BB962C8B-B14F-4D97-AF65-F5344CB8AC3E}">
-        <p14:creationId xmlns:p14="http://schemas.microsoft.com/office/powerpoint/2010/main" val="1968859658"/>
+        <p14:creationId xmlns:p14="http://schemas.microsoft.com/office/powerpoint/2010/main" val="630228085"/>
       </p:ext>
     </p:extLst>
   </p:cSld>
@@ -886,54 +890,7 @@
           <a:bodyPr/>
           <a:lstStyle/>
           <a:p>
-            <a:r>
-              <a:rPr lang="en-GB" dirty="0"/>
-              <a:t>Blind spots of lots of test strategies is due to the fact that dev doesn’t take lot of time to code integration tests (vs. unit ones)</a:t>
-            </a:r>
-          </a:p>
-          <a:p>
-            <a:r>
-              <a:rPr lang="en-GB" dirty="0"/>
-              <a:t>We trade off former approaches (UT x IT) in </a:t>
-            </a:r>
-            <a:r>
-              <a:rPr lang="en-GB" dirty="0" err="1"/>
-              <a:t>favor</a:t>
-            </a:r>
-            <a:r>
-              <a:rPr lang="en-GB" dirty="0"/>
-              <a:t> of quietness in production whatever the dev team.</a:t>
-            </a:r>
-          </a:p>
-          <a:p>
             <a:endParaRPr lang="en-GB" dirty="0"/>
-          </a:p>
-          <a:p>
-            <a:endParaRPr lang="en-GB" dirty="0"/>
-          </a:p>
-          <a:p>
-            <a:endParaRPr lang="en-GB" dirty="0"/>
-          </a:p>
-          <a:p>
-            <a:endParaRPr lang="en-GB" dirty="0"/>
-          </a:p>
-          <a:p>
-            <a:r>
-              <a:rPr lang="en-GB" dirty="0"/>
-              <a:t>Realizing that We realized that dev took more time to unit test than to integration tests</a:t>
-            </a:r>
-          </a:p>
-          <a:p>
-            <a:endParaRPr lang="en-GB" dirty="0"/>
-          </a:p>
-          <a:p>
-            <a:endParaRPr lang="en-GB" dirty="0"/>
-          </a:p>
-          <a:p>
-            <a:r>
-              <a:rPr lang="en-GB" dirty="0"/>
-              <a:t>Dev dedicate a lot more times to unit test than integration tests</a:t>
-            </a:r>
           </a:p>
         </p:txBody>
       </p:sp>
@@ -944,7 +901,7 @@
             <a:spLocks noGrp="1"/>
           </p:cNvSpPr>
           <p:nvPr>
-            <p:ph type="sldNum" sz="quarter" idx="5"/>
+            <p:ph type="sldNum" sz="quarter" idx="10"/>
           </p:nvPr>
         </p:nvSpPr>
         <p:spPr/>
@@ -954,7 +911,7 @@
           <a:p>
             <a:fld id="{438FB828-7FE4-42D1-BEA2-6A733FD1B12E}" type="slidenum">
               <a:rPr lang="en-GB" smtClean="0"/>
-              <a:t>14</a:t>
+              <a:t>13</a:t>
             </a:fld>
             <a:endParaRPr lang="en-GB"/>
           </a:p>
@@ -963,7 +920,7 @@
     </p:spTree>
     <p:extLst>
       <p:ext uri="{BB962C8B-B14F-4D97-AF65-F5344CB8AC3E}">
-        <p14:creationId xmlns:p14="http://schemas.microsoft.com/office/powerpoint/2010/main" val="1284500631"/>
+        <p14:creationId xmlns:p14="http://schemas.microsoft.com/office/powerpoint/2010/main" val="1968859658"/>
       </p:ext>
     </p:extLst>
   </p:cSld>
@@ -1017,7 +974,54 @@
           <a:bodyPr/>
           <a:lstStyle/>
           <a:p>
+            <a:r>
+              <a:rPr lang="en-GB" dirty="0"/>
+              <a:t>Blind spots of lots of test strategies is due to the fact that dev doesn’t take lot of time to code integration tests (vs. unit ones)</a:t>
+            </a:r>
+          </a:p>
+          <a:p>
+            <a:r>
+              <a:rPr lang="en-GB" dirty="0"/>
+              <a:t>We trade off former approaches (UT x IT) in </a:t>
+            </a:r>
+            <a:r>
+              <a:rPr lang="en-GB" dirty="0" err="1"/>
+              <a:t>favor</a:t>
+            </a:r>
+            <a:r>
+              <a:rPr lang="en-GB" dirty="0"/>
+              <a:t> of quietness in production whatever the dev team.</a:t>
+            </a:r>
+          </a:p>
+          <a:p>
             <a:endParaRPr lang="en-GB" dirty="0"/>
+          </a:p>
+          <a:p>
+            <a:endParaRPr lang="en-GB" dirty="0"/>
+          </a:p>
+          <a:p>
+            <a:endParaRPr lang="en-GB" dirty="0"/>
+          </a:p>
+          <a:p>
+            <a:endParaRPr lang="en-GB" dirty="0"/>
+          </a:p>
+          <a:p>
+            <a:r>
+              <a:rPr lang="en-GB" dirty="0"/>
+              <a:t>Realizing that We realized that dev took more time to unit test than to integration tests</a:t>
+            </a:r>
+          </a:p>
+          <a:p>
+            <a:endParaRPr lang="en-GB" dirty="0"/>
+          </a:p>
+          <a:p>
+            <a:endParaRPr lang="en-GB" dirty="0"/>
+          </a:p>
+          <a:p>
+            <a:r>
+              <a:rPr lang="en-GB" dirty="0"/>
+              <a:t>Dev dedicate a lot more times to unit test than integration tests</a:t>
+            </a:r>
           </a:p>
         </p:txBody>
       </p:sp>
@@ -1038,7 +1042,91 @@
           <a:p>
             <a:fld id="{438FB828-7FE4-42D1-BEA2-6A733FD1B12E}" type="slidenum">
               <a:rPr lang="en-GB" smtClean="0"/>
-              <a:t>16</a:t>
+              <a:t>15</a:t>
+            </a:fld>
+            <a:endParaRPr lang="en-GB"/>
+          </a:p>
+        </p:txBody>
+      </p:sp>
+    </p:spTree>
+    <p:extLst>
+      <p:ext uri="{BB962C8B-B14F-4D97-AF65-F5344CB8AC3E}">
+        <p14:creationId xmlns:p14="http://schemas.microsoft.com/office/powerpoint/2010/main" val="1284500631"/>
+      </p:ext>
+    </p:extLst>
+  </p:cSld>
+  <p:clrMapOvr>
+    <a:masterClrMapping/>
+  </p:clrMapOvr>
+</p:notes>
+</file>
+
+<file path=ppt/notesSlides/notesSlide15.xml><?xml version="1.0" encoding="utf-8"?>
+<p:notes xmlns:a="http://schemas.openxmlformats.org/drawingml/2006/main" xmlns:r="http://schemas.openxmlformats.org/officeDocument/2006/relationships" xmlns:p="http://schemas.openxmlformats.org/presentationml/2006/main">
+  <p:cSld>
+    <p:spTree>
+      <p:nvGrpSpPr>
+        <p:cNvPr id="1" name=""/>
+        <p:cNvGrpSpPr/>
+        <p:nvPr/>
+      </p:nvGrpSpPr>
+      <p:grpSpPr>
+        <a:xfrm>
+          <a:off x="0" y="0"/>
+          <a:ext cx="0" cy="0"/>
+          <a:chOff x="0" y="0"/>
+          <a:chExt cx="0" cy="0"/>
+        </a:xfrm>
+      </p:grpSpPr>
+      <p:sp>
+        <p:nvSpPr>
+          <p:cNvPr id="2" name="Slide Image Placeholder 1"/>
+          <p:cNvSpPr>
+            <a:spLocks noGrp="1" noRot="1" noChangeAspect="1"/>
+          </p:cNvSpPr>
+          <p:nvPr>
+            <p:ph type="sldImg"/>
+          </p:nvPr>
+        </p:nvSpPr>
+        <p:spPr/>
+      </p:sp>
+      <p:sp>
+        <p:nvSpPr>
+          <p:cNvPr id="3" name="Notes Placeholder 2"/>
+          <p:cNvSpPr>
+            <a:spLocks noGrp="1"/>
+          </p:cNvSpPr>
+          <p:nvPr>
+            <p:ph type="body" idx="1"/>
+          </p:nvPr>
+        </p:nvSpPr>
+        <p:spPr/>
+        <p:txBody>
+          <a:bodyPr/>
+          <a:lstStyle/>
+          <a:p>
+            <a:endParaRPr lang="en-GB" dirty="0"/>
+          </a:p>
+        </p:txBody>
+      </p:sp>
+      <p:sp>
+        <p:nvSpPr>
+          <p:cNvPr id="4" name="Slide Number Placeholder 3"/>
+          <p:cNvSpPr>
+            <a:spLocks noGrp="1"/>
+          </p:cNvSpPr>
+          <p:nvPr>
+            <p:ph type="sldNum" sz="quarter" idx="5"/>
+          </p:nvPr>
+        </p:nvSpPr>
+        <p:spPr/>
+        <p:txBody>
+          <a:bodyPr/>
+          <a:lstStyle/>
+          <a:p>
+            <a:fld id="{438FB828-7FE4-42D1-BEA2-6A733FD1B12E}" type="slidenum">
+              <a:rPr lang="en-GB" smtClean="0"/>
+              <a:t>17</a:t>
             </a:fld>
             <a:endParaRPr lang="en-GB"/>
           </a:p>
@@ -1544,6 +1632,57 @@
                 </a:solidFill>
               </a:rPr>
               <a:t>https://www.welcometothejungle.com/en/articles/cognitive-overload-at-work</a:t>
+            </a:r>
+          </a:p>
+          <a:p>
+            <a:pPr marL="0" marR="0" lvl="0" indent="0" algn="l" defTabSz="914400" rtl="0" eaLnBrk="1" fontAlgn="auto" latinLnBrk="0" hangingPunct="1">
+              <a:lnSpc>
+                <a:spcPct val="100000"/>
+              </a:lnSpc>
+              <a:spcBef>
+                <a:spcPts val="0"/>
+              </a:spcBef>
+              <a:spcAft>
+                <a:spcPts val="0"/>
+              </a:spcAft>
+              <a:buClrTx/>
+              <a:buSzTx/>
+              <a:buFontTx/>
+              <a:buNone/>
+              <a:tabLst/>
+              <a:defRPr/>
+            </a:pPr>
+            <a:endParaRPr lang="en-US" sz="1200" dirty="0">
+              <a:solidFill>
+                <a:schemeClr val="bg1"/>
+              </a:solidFill>
+            </a:endParaRPr>
+          </a:p>
+          <a:p>
+            <a:pPr marL="0" marR="0" lvl="0" indent="0" algn="l" defTabSz="914400" rtl="0" eaLnBrk="1" fontAlgn="auto" latinLnBrk="0" hangingPunct="1">
+              <a:lnSpc>
+                <a:spcPct val="100000"/>
+              </a:lnSpc>
+              <a:spcBef>
+                <a:spcPts val="0"/>
+              </a:spcBef>
+              <a:spcAft>
+                <a:spcPts val="0"/>
+              </a:spcAft>
+              <a:buClrTx/>
+              <a:buSzTx/>
+              <a:buFontTx/>
+              <a:buNone/>
+              <a:tabLst/>
+              <a:defRPr/>
+            </a:pPr>
+            <a:r>
+              <a:rPr lang="en-US" sz="1200" dirty="0">
+                <a:solidFill>
+                  <a:schemeClr val="bg1"/>
+                </a:solidFill>
+              </a:rPr>
+              <a:t>Image : https://encrypted-tbn0.gstatic.com/images?q=tbn:ANd9GcRUkEI7a62LZWV7URYcN5jClByl0GkP6ReZvA&amp;usqp=CAU</a:t>
             </a:r>
           </a:p>
           <a:p>
@@ -10585,6 +10724,357 @@
           <a:chExt cx="0" cy="0"/>
         </a:xfrm>
       </p:grpSpPr>
+      <p:pic>
+        <p:nvPicPr>
+          <p:cNvPr id="9" name="Picture 8">
+            <a:extLst>
+              <a:ext uri="{FF2B5EF4-FFF2-40B4-BE49-F238E27FC236}">
+                <a16:creationId xmlns:a16="http://schemas.microsoft.com/office/drawing/2014/main" id="{BF92AEEA-AF61-4CDE-B1A4-0C0D67133943}"/>
+              </a:ext>
+            </a:extLst>
+          </p:cNvPr>
+          <p:cNvPicPr>
+            <a:picLocks noChangeAspect="1"/>
+          </p:cNvPicPr>
+          <p:nvPr/>
+        </p:nvPicPr>
+        <p:blipFill>
+          <a:blip r:embed="rId3">
+            <a:extLst>
+              <a:ext uri="{28A0092B-C50C-407E-A947-70E740481C1C}">
+                <a14:useLocalDpi xmlns:a14="http://schemas.microsoft.com/office/drawing/2010/main" val="0"/>
+              </a:ext>
+            </a:extLst>
+          </a:blip>
+          <a:stretch>
+            <a:fillRect/>
+          </a:stretch>
+        </p:blipFill>
+        <p:spPr>
+          <a:xfrm>
+            <a:off x="727023" y="-793082"/>
+            <a:ext cx="14772395" cy="8314748"/>
+          </a:xfrm>
+          <a:prstGeom prst="rect">
+            <a:avLst/>
+          </a:prstGeom>
+        </p:spPr>
+      </p:pic>
+      <p:sp>
+        <p:nvSpPr>
+          <p:cNvPr id="43" name="Rectangle 42">
+            <a:extLst>
+              <a:ext uri="{FF2B5EF4-FFF2-40B4-BE49-F238E27FC236}">
+                <a16:creationId xmlns:a16="http://schemas.microsoft.com/office/drawing/2014/main" id="{B06DF77F-F685-46CC-AEA0-A2F93299DF0E}"/>
+              </a:ext>
+            </a:extLst>
+          </p:cNvPr>
+          <p:cNvSpPr/>
+          <p:nvPr/>
+        </p:nvSpPr>
+        <p:spPr>
+          <a:xfrm>
+            <a:off x="1154244" y="-341285"/>
+            <a:ext cx="11782268" cy="7411154"/>
+          </a:xfrm>
+          <a:prstGeom prst="rect">
+            <a:avLst/>
+          </a:prstGeom>
+          <a:solidFill>
+            <a:schemeClr val="tx1">
+              <a:alpha val="57000"/>
+            </a:schemeClr>
+          </a:solidFill>
+          <a:ln>
+            <a:noFill/>
+          </a:ln>
+        </p:spPr>
+        <p:style>
+          <a:lnRef idx="2">
+            <a:schemeClr val="accent1">
+              <a:shade val="50000"/>
+            </a:schemeClr>
+          </a:lnRef>
+          <a:fillRef idx="1">
+            <a:schemeClr val="accent1"/>
+          </a:fillRef>
+          <a:effectRef idx="0">
+            <a:schemeClr val="accent1"/>
+          </a:effectRef>
+          <a:fontRef idx="minor">
+            <a:schemeClr val="lt1"/>
+          </a:fontRef>
+        </p:style>
+        <p:txBody>
+          <a:bodyPr rtlCol="0" anchor="ctr"/>
+          <a:lstStyle/>
+          <a:p>
+            <a:pPr algn="ctr"/>
+            <a:endParaRPr lang="en-GB"/>
+          </a:p>
+        </p:txBody>
+      </p:sp>
+      <p:sp>
+        <p:nvSpPr>
+          <p:cNvPr id="26" name="Right Triangle 25">
+            <a:extLst>
+              <a:ext uri="{FF2B5EF4-FFF2-40B4-BE49-F238E27FC236}">
+                <a16:creationId xmlns:a16="http://schemas.microsoft.com/office/drawing/2014/main" id="{2E000F22-633A-4FCB-BE40-19CE29ACB096}"/>
+              </a:ext>
+            </a:extLst>
+          </p:cNvPr>
+          <p:cNvSpPr/>
+          <p:nvPr/>
+        </p:nvSpPr>
+        <p:spPr>
+          <a:xfrm flipV="1">
+            <a:off x="-1004970" y="-2187981"/>
+            <a:ext cx="11455541" cy="11802707"/>
+          </a:xfrm>
+          <a:prstGeom prst="rtTriangle">
+            <a:avLst/>
+          </a:prstGeom>
+          <a:solidFill>
+            <a:schemeClr val="tx1"/>
+          </a:solidFill>
+          <a:ln>
+            <a:noFill/>
+          </a:ln>
+        </p:spPr>
+        <p:style>
+          <a:lnRef idx="2">
+            <a:schemeClr val="accent1">
+              <a:shade val="50000"/>
+            </a:schemeClr>
+          </a:lnRef>
+          <a:fillRef idx="1">
+            <a:schemeClr val="accent1"/>
+          </a:fillRef>
+          <a:effectRef idx="0">
+            <a:schemeClr val="accent1"/>
+          </a:effectRef>
+          <a:fontRef idx="minor">
+            <a:schemeClr val="lt1"/>
+          </a:fontRef>
+        </p:style>
+        <p:txBody>
+          <a:bodyPr rtlCol="0" anchor="ctr"/>
+          <a:lstStyle/>
+          <a:p>
+            <a:pPr algn="ctr"/>
+            <a:endParaRPr lang="en-GB"/>
+          </a:p>
+        </p:txBody>
+      </p:sp>
+      <p:sp>
+        <p:nvSpPr>
+          <p:cNvPr id="5" name="Subtitle 4">
+            <a:extLst>
+              <a:ext uri="{FF2B5EF4-FFF2-40B4-BE49-F238E27FC236}">
+                <a16:creationId xmlns:a16="http://schemas.microsoft.com/office/drawing/2014/main" id="{656E8172-EA62-43D4-BC99-784C1B085A76}"/>
+              </a:ext>
+            </a:extLst>
+          </p:cNvPr>
+          <p:cNvSpPr>
+            <a:spLocks noGrp="1"/>
+          </p:cNvSpPr>
+          <p:nvPr>
+            <p:ph type="subTitle" idx="4294967295"/>
+          </p:nvPr>
+        </p:nvSpPr>
+        <p:spPr>
+          <a:xfrm>
+            <a:off x="360238" y="5720588"/>
+            <a:ext cx="2521507" cy="831850"/>
+          </a:xfrm>
+        </p:spPr>
+        <p:txBody>
+          <a:bodyPr>
+            <a:normAutofit/>
+          </a:bodyPr>
+          <a:lstStyle/>
+          <a:p>
+            <a:r>
+              <a:rPr lang="en-GB" sz="1100" dirty="0"/>
+              <a:t>THOMAS PIERRAIN (</a:t>
+            </a:r>
+            <a:r>
+              <a:rPr lang="cs-CZ" sz="1100" dirty="0"/>
+              <a:t>@</a:t>
+            </a:r>
+            <a:r>
+              <a:rPr lang="en-GB" sz="1100" dirty="0"/>
+              <a:t>TPIERRAIN)</a:t>
+            </a:r>
+          </a:p>
+        </p:txBody>
+      </p:sp>
+      <p:sp>
+        <p:nvSpPr>
+          <p:cNvPr id="11" name="Title 3">
+            <a:extLst>
+              <a:ext uri="{FF2B5EF4-FFF2-40B4-BE49-F238E27FC236}">
+                <a16:creationId xmlns:a16="http://schemas.microsoft.com/office/drawing/2014/main" id="{602ACB4C-FD32-44AA-8680-CD5BCE6DA11E}"/>
+              </a:ext>
+            </a:extLst>
+          </p:cNvPr>
+          <p:cNvSpPr txBox="1">
+            <a:spLocks/>
+          </p:cNvSpPr>
+          <p:nvPr/>
+        </p:nvSpPr>
+        <p:spPr>
+          <a:xfrm>
+            <a:off x="727023" y="124769"/>
+            <a:ext cx="4773892" cy="3304231"/>
+          </a:xfrm>
+          <a:prstGeom prst="rect">
+            <a:avLst/>
+          </a:prstGeom>
+        </p:spPr>
+        <p:txBody>
+          <a:bodyPr vert="horz" lIns="91440" tIns="45720" rIns="91440" bIns="45720" rtlCol="0" anchor="t">
+            <a:noAutofit/>
+          </a:bodyPr>
+          <a:lstStyle>
+            <a:lvl1pPr algn="l" defTabSz="914400" rtl="0" eaLnBrk="1" latinLnBrk="0" hangingPunct="1">
+              <a:lnSpc>
+                <a:spcPct val="90000"/>
+              </a:lnSpc>
+              <a:spcBef>
+                <a:spcPct val="0"/>
+              </a:spcBef>
+              <a:buNone/>
+              <a:defRPr sz="4400" b="1" kern="1200">
+                <a:solidFill>
+                  <a:schemeClr val="tx1"/>
+                </a:solidFill>
+                <a:latin typeface="Alte Haas Grotesk" panose="02000503000000020004" pitchFamily="2" charset="0"/>
+                <a:ea typeface="+mj-ea"/>
+                <a:cs typeface="+mj-cs"/>
+              </a:defRPr>
+            </a:lvl1pPr>
+          </a:lstStyle>
+          <a:p>
+            <a:r>
+              <a:rPr lang="en-US" sz="7200" cap="all" dirty="0">
+                <a:solidFill>
+                  <a:srgbClr val="2E8EE4"/>
+                </a:solidFill>
+              </a:rPr>
+              <a:t>Test Driven</a:t>
+            </a:r>
+          </a:p>
+          <a:p>
+            <a:r>
+              <a:rPr lang="en-US" sz="7200" cap="all" dirty="0">
+                <a:solidFill>
+                  <a:srgbClr val="2E8EE4"/>
+                </a:solidFill>
+              </a:rPr>
+              <a:t>development</a:t>
+            </a:r>
+            <a:endParaRPr lang="en-GB" sz="7200" dirty="0">
+              <a:solidFill>
+                <a:schemeClr val="bg1"/>
+              </a:solidFill>
+            </a:endParaRPr>
+          </a:p>
+        </p:txBody>
+      </p:sp>
+      <p:sp>
+        <p:nvSpPr>
+          <p:cNvPr id="51" name="Title 3">
+            <a:extLst>
+              <a:ext uri="{FF2B5EF4-FFF2-40B4-BE49-F238E27FC236}">
+                <a16:creationId xmlns:a16="http://schemas.microsoft.com/office/drawing/2014/main" id="{26680EDF-544B-47A5-94E0-2EE1815FBE04}"/>
+              </a:ext>
+            </a:extLst>
+          </p:cNvPr>
+          <p:cNvSpPr txBox="1">
+            <a:spLocks/>
+          </p:cNvSpPr>
+          <p:nvPr/>
+        </p:nvSpPr>
+        <p:spPr>
+          <a:xfrm>
+            <a:off x="781318" y="4689447"/>
+            <a:ext cx="6045004" cy="1196804"/>
+          </a:xfrm>
+          <a:prstGeom prst="rect">
+            <a:avLst/>
+          </a:prstGeom>
+        </p:spPr>
+        <p:txBody>
+          <a:bodyPr vert="horz" lIns="91440" tIns="45720" rIns="91440" bIns="45720" rtlCol="0" anchor="t">
+            <a:normAutofit/>
+          </a:bodyPr>
+          <a:lstStyle>
+            <a:lvl1pPr algn="l" defTabSz="914400" rtl="0" eaLnBrk="1" latinLnBrk="0" hangingPunct="1">
+              <a:lnSpc>
+                <a:spcPct val="90000"/>
+              </a:lnSpc>
+              <a:spcBef>
+                <a:spcPct val="0"/>
+              </a:spcBef>
+              <a:buNone/>
+              <a:defRPr sz="4400" b="1" kern="1200">
+                <a:solidFill>
+                  <a:schemeClr val="tx1"/>
+                </a:solidFill>
+                <a:latin typeface="Alte Haas Grotesk" panose="02000503000000020004" pitchFamily="2" charset="0"/>
+                <a:ea typeface="+mj-ea"/>
+                <a:cs typeface="+mj-cs"/>
+              </a:defRPr>
+            </a:lvl1pPr>
+          </a:lstStyle>
+          <a:p>
+            <a:r>
+              <a:rPr lang="en-US" sz="2800">
+                <a:solidFill>
+                  <a:schemeClr val="bg1"/>
+                </a:solidFill>
+              </a:rPr>
+              <a:t>Blind spots</a:t>
+            </a:r>
+            <a:endParaRPr lang="en-US" sz="2800" dirty="0">
+              <a:solidFill>
+                <a:schemeClr val="bg1"/>
+              </a:solidFill>
+            </a:endParaRPr>
+          </a:p>
+        </p:txBody>
+      </p:sp>
+    </p:spTree>
+    <p:extLst>
+      <p:ext uri="{BB962C8B-B14F-4D97-AF65-F5344CB8AC3E}">
+        <p14:creationId xmlns:p14="http://schemas.microsoft.com/office/powerpoint/2010/main" val="2381001186"/>
+      </p:ext>
+    </p:extLst>
+  </p:cSld>
+  <p:clrMapOvr>
+    <a:masterClrMapping/>
+  </p:clrMapOvr>
+</p:sld>
+</file>
+
+<file path=ppt/slides/slide13.xml><?xml version="1.0" encoding="utf-8"?>
+<p:sld xmlns:a="http://schemas.openxmlformats.org/drawingml/2006/main" xmlns:r="http://schemas.openxmlformats.org/officeDocument/2006/relationships" xmlns:p="http://schemas.openxmlformats.org/presentationml/2006/main">
+  <p:cSld>
+    <p:spTree>
+      <p:nvGrpSpPr>
+        <p:cNvPr id="1" name=""/>
+        <p:cNvGrpSpPr/>
+        <p:nvPr/>
+      </p:nvGrpSpPr>
+      <p:grpSpPr>
+        <a:xfrm>
+          <a:off x="0" y="0"/>
+          <a:ext cx="0" cy="0"/>
+          <a:chOff x="0" y="0"/>
+          <a:chExt cx="0" cy="0"/>
+        </a:xfrm>
+      </p:grpSpPr>
       <p:sp>
         <p:nvSpPr>
           <p:cNvPr id="57" name="Isosceles Triangle 56">
@@ -12742,7 +13232,7 @@
 </p:sld>
 </file>
 
-<file path=ppt/slides/slide13.xml><?xml version="1.0" encoding="utf-8"?>
+<file path=ppt/slides/slide14.xml><?xml version="1.0" encoding="utf-8"?>
 <p:sld xmlns:a="http://schemas.openxmlformats.org/drawingml/2006/main" xmlns:r="http://schemas.openxmlformats.org/officeDocument/2006/relationships" xmlns:p="http://schemas.openxmlformats.org/presentationml/2006/main">
   <p:cSld>
     <p:spTree>
@@ -13311,7 +13801,7 @@
 </p:sld>
 </file>
 
-<file path=ppt/slides/slide14.xml><?xml version="1.0" encoding="utf-8"?>
+<file path=ppt/slides/slide15.xml><?xml version="1.0" encoding="utf-8"?>
 <p:sld xmlns:a="http://schemas.openxmlformats.org/drawingml/2006/main" xmlns:r="http://schemas.openxmlformats.org/officeDocument/2006/relationships" xmlns:p="http://schemas.openxmlformats.org/presentationml/2006/main">
   <p:cSld>
     <p:spTree>
@@ -14922,7 +15412,7 @@
 </p:sld>
 </file>
 
-<file path=ppt/slides/slide15.xml><?xml version="1.0" encoding="utf-8"?>
+<file path=ppt/slides/slide16.xml><?xml version="1.0" encoding="utf-8"?>
 <p:sld xmlns:a="http://schemas.openxmlformats.org/drawingml/2006/main" xmlns:r="http://schemas.openxmlformats.org/officeDocument/2006/relationships" xmlns:p="http://schemas.openxmlformats.org/presentationml/2006/main">
   <p:cSld>
     <p:spTree>
@@ -15050,7 +15540,7 @@
 </p:sld>
 </file>
 
-<file path=ppt/slides/slide16.xml><?xml version="1.0" encoding="utf-8"?>
+<file path=ppt/slides/slide17.xml><?xml version="1.0" encoding="utf-8"?>
 <p:sld xmlns:a="http://schemas.openxmlformats.org/drawingml/2006/main" xmlns:r="http://schemas.openxmlformats.org/officeDocument/2006/relationships" xmlns:p="http://schemas.openxmlformats.org/presentationml/2006/main">
   <p:cSld>
     <p:bg>
@@ -16101,7 +16591,7 @@
         </p:nvSpPr>
         <p:spPr>
           <a:xfrm>
-            <a:off x="838200" y="1868000"/>
+            <a:off x="838200" y="439247"/>
             <a:ext cx="10515600" cy="1561000"/>
           </a:xfrm>
         </p:spPr>
@@ -16134,12 +16624,12 @@
         </p:nvSpPr>
         <p:spPr>
           <a:xfrm>
-            <a:off x="838200" y="3479006"/>
-            <a:ext cx="10515600" cy="2527500"/>
+            <a:off x="838200" y="1843088"/>
+            <a:ext cx="10515600" cy="4057650"/>
           </a:xfrm>
         </p:spPr>
         <p:txBody>
-          <a:bodyPr>
+          <a:bodyPr anchor="ctr">
             <a:noAutofit/>
           </a:bodyPr>
           <a:lstStyle/>
@@ -16151,6 +16641,9 @@
               <a:spcBef>
                 <a:spcPts val="0"/>
               </a:spcBef>
+              <a:spcAft>
+                <a:spcPts val="1800"/>
+              </a:spcAft>
             </a:pPr>
             <a:r>
               <a:rPr lang="en-GB" sz="3600" dirty="0">
@@ -16173,6 +16666,9 @@
               <a:spcBef>
                 <a:spcPts val="0"/>
               </a:spcBef>
+              <a:spcAft>
+                <a:spcPts val="1800"/>
+              </a:spcAft>
             </a:pPr>
             <a:endParaRPr lang="en-GB" sz="1600" b="0" dirty="0"/>
           </a:p>
@@ -16184,8 +16680,22 @@
               <a:spcBef>
                 <a:spcPts val="0"/>
               </a:spcBef>
+              <a:spcAft>
+                <a:spcPts val="1800"/>
+              </a:spcAft>
             </a:pPr>
-            <a:endParaRPr lang="en-GB" sz="1600" b="0" dirty="0"/>
+            <a:r>
+              <a:rPr lang="en-GB" sz="1600" b="0" dirty="0"/>
+              <a:t>As long as you can </a:t>
+            </a:r>
+            <a:r>
+              <a:rPr lang="en-GB" sz="3600" dirty="0">
+                <a:solidFill>
+                  <a:schemeClr val="bg1"/>
+                </a:solidFill>
+              </a:rPr>
+              <a:t>explain your trade-offs</a:t>
+            </a:r>
           </a:p>
           <a:p>
             <a:pPr algn="just">
@@ -16195,6 +16705,23 @@
               <a:spcBef>
                 <a:spcPts val="0"/>
               </a:spcBef>
+              <a:spcAft>
+                <a:spcPts val="1800"/>
+              </a:spcAft>
+            </a:pPr>
+            <a:endParaRPr lang="en-GB" sz="1600" b="0" dirty="0"/>
+          </a:p>
+          <a:p>
+            <a:pPr algn="just">
+              <a:lnSpc>
+                <a:spcPct val="120000"/>
+              </a:lnSpc>
+              <a:spcBef>
+                <a:spcPts val="0"/>
+              </a:spcBef>
+              <a:spcAft>
+                <a:spcPts val="1800"/>
+              </a:spcAft>
             </a:pPr>
             <a:r>
               <a:rPr lang="en-GB" sz="1600" b="0" dirty="0"/>
@@ -17783,7 +18310,7 @@
                   <a:schemeClr val="bg1"/>
                 </a:solidFill>
               </a:rPr>
-              <a:t>Legend</a:t>
+              <a:t>Tests?</a:t>
             </a:r>
             <a:endParaRPr lang="en-GB" sz="1800" dirty="0">
               <a:solidFill>

</xml_diff>